<commit_message>
Edited References and other minor edits
</commit_message>
<xml_diff>
--- a/p-poster.pptx
+++ b/p-poster.pptx
@@ -2936,286 +2936,6 @@
       </p:sp>
       <p:sp>
         <p:nvSpPr>
-          <p:cNvPr id="26" name="TextBox 25"/>
-          <p:cNvSpPr txBox="1"/>
-          <p:nvPr/>
-        </p:nvSpPr>
-        <p:spPr>
-          <a:xfrm>
-            <a:off x="13716000" y="16687799"/>
-            <a:ext cx="12192000" cy="1219200"/>
-          </a:xfrm>
-          <a:prstGeom prst="rect">
-            <a:avLst/>
-          </a:prstGeom>
-          <a:noFill/>
-        </p:spPr>
-        <p:txBody>
-          <a:bodyPr wrap="square" lIns="40809" tIns="40809" rIns="40809" bIns="40809" numCol="1" spcCol="244855" rtlCol="0">
-            <a:noAutofit/>
-          </a:bodyPr>
-          <a:lstStyle/>
-          <a:p>
-            <a:r>
-              <a:rPr lang="en-US" sz="750" dirty="0"/>
-              <a:t>[1] N. Al-</a:t>
-            </a:r>
-            <a:r>
-              <a:rPr lang="en-US" sz="750" dirty="0" err="1"/>
-              <a:t>Obaidi</a:t>
-            </a:r>
-            <a:r>
-              <a:rPr lang="en-US" sz="750" dirty="0"/>
-              <a:t>. MEU-Mobile KSD Data Set. UCI Machine Learning Repository, 2016.</a:t>
-            </a:r>
-          </a:p>
-          <a:p>
-            <a:r>
-              <a:rPr lang="en-US" sz="750" dirty="0"/>
-              <a:t>[2] I. de </a:t>
-            </a:r>
-            <a:r>
-              <a:rPr lang="en-US" sz="750" dirty="0" err="1"/>
-              <a:t>Mendizabal</a:t>
-            </a:r>
-            <a:r>
-              <a:rPr lang="en-US" sz="750" dirty="0"/>
-              <a:t>-Vazquez, D. de Santos-Sierra, J. Guerra-Casanova, and C. Sanchez-Avila. Supervised classification methods applied to</a:t>
-            </a:r>
-          </a:p>
-          <a:p>
-            <a:r>
-              <a:rPr lang="en-US" sz="750" dirty="0"/>
-              <a:t>Keystroke Dynamics through Mobile Devices. </a:t>
-            </a:r>
-            <a:r>
-              <a:rPr lang="en-US" sz="750" i="1" dirty="0"/>
-              <a:t>ICCST</a:t>
-            </a:r>
-            <a:r>
-              <a:rPr lang="en-US" sz="750" dirty="0"/>
-              <a:t>, 2014.</a:t>
-            </a:r>
-          </a:p>
-          <a:p>
-            <a:r>
-              <a:rPr lang="en-US" sz="750" dirty="0"/>
-              <a:t>[3] T. Cho. Pattern Classification Methods for Keystroke Analysis. </a:t>
-            </a:r>
-            <a:r>
-              <a:rPr lang="en-US" sz="750" i="1" dirty="0"/>
-              <a:t>SICE-ICASE</a:t>
-            </a:r>
-            <a:r>
-              <a:rPr lang="en-US" sz="750" dirty="0"/>
-              <a:t>, 2006.</a:t>
-            </a:r>
-          </a:p>
-          <a:p>
-            <a:r>
-              <a:rPr lang="en-US" sz="750" dirty="0"/>
-              <a:t>[4] L.J.P. van der </a:t>
-            </a:r>
-            <a:r>
-              <a:rPr lang="en-US" sz="750" dirty="0" err="1"/>
-              <a:t>Maaten</a:t>
-            </a:r>
-            <a:r>
-              <a:rPr lang="en-US" sz="750" dirty="0"/>
-              <a:t>. Accelerating t-SNE using Tree-Based Algorithms. </a:t>
-            </a:r>
-            <a:r>
-              <a:rPr lang="en-US" sz="750" i="1" dirty="0"/>
-              <a:t>Journal of Machine Learning Research</a:t>
-            </a:r>
-            <a:r>
-              <a:rPr lang="en-US" sz="750" dirty="0"/>
-              <a:t>, 2014.</a:t>
-            </a:r>
-          </a:p>
-          <a:p>
-            <a:r>
-              <a:rPr lang="en-US" sz="750" dirty="0"/>
-              <a:t>[5] A. </a:t>
-            </a:r>
-            <a:r>
-              <a:rPr lang="en-US" sz="750" dirty="0" err="1"/>
-              <a:t>Fawzi</a:t>
-            </a:r>
-            <a:r>
-              <a:rPr lang="en-US" sz="750" dirty="0"/>
-              <a:t>, S. </a:t>
-            </a:r>
-            <a:r>
-              <a:rPr lang="en-US" sz="750" dirty="0" err="1"/>
-              <a:t>Moosavi-Dezfooli</a:t>
-            </a:r>
-            <a:r>
-              <a:rPr lang="en-US" sz="750" dirty="0"/>
-              <a:t>, P. </a:t>
-            </a:r>
-            <a:r>
-              <a:rPr lang="en-US" sz="750" dirty="0" err="1"/>
-              <a:t>Frossard</a:t>
-            </a:r>
-            <a:r>
-              <a:rPr lang="en-US" sz="750" dirty="0"/>
-              <a:t>. Robustness of classifiers: from adversarial to random noise. </a:t>
-            </a:r>
-            <a:r>
-              <a:rPr lang="en-US" sz="750" i="1" dirty="0"/>
-              <a:t>NIPS</a:t>
-            </a:r>
-            <a:r>
-              <a:rPr lang="en-US" sz="750" dirty="0"/>
-              <a:t>, 2016.</a:t>
-            </a:r>
-          </a:p>
-          <a:p>
-            <a:r>
-              <a:rPr lang="en-US" sz="750" dirty="0"/>
-              <a:t>[6] C. </a:t>
-            </a:r>
-            <a:r>
-              <a:rPr lang="en-US" sz="750" dirty="0" err="1"/>
-              <a:t>Dwork</a:t>
-            </a:r>
-            <a:r>
-              <a:rPr lang="en-US" sz="750" dirty="0"/>
-              <a:t>, A. Roth. Differential privacy. </a:t>
-            </a:r>
-            <a:r>
-              <a:rPr lang="en-US" sz="750" i="1" dirty="0"/>
-              <a:t>Foundations and Trends in Computer Science</a:t>
-            </a:r>
-            <a:r>
-              <a:rPr lang="en-US" sz="750" dirty="0"/>
-              <a:t>, 2014.</a:t>
-            </a:r>
-          </a:p>
-          <a:p>
-            <a:r>
-              <a:rPr lang="en-US" sz="750" dirty="0"/>
-              <a:t>[7] Y. Gal, Z. </a:t>
-            </a:r>
-            <a:r>
-              <a:rPr lang="en-US" sz="750" dirty="0" err="1"/>
-              <a:t>Ghahramani</a:t>
-            </a:r>
-            <a:r>
-              <a:rPr lang="en-US" sz="750" dirty="0"/>
-              <a:t>. Bayesian Convolutional Neural Networks with Bernoulli Approximate </a:t>
-            </a:r>
-            <a:r>
-              <a:rPr lang="en-US" sz="750" dirty="0" err="1"/>
-              <a:t>Variational</a:t>
-            </a:r>
-            <a:r>
-              <a:rPr lang="en-US" sz="750" dirty="0"/>
-              <a:t> Inference. </a:t>
-            </a:r>
-            <a:r>
-              <a:rPr lang="en-US" sz="750" i="1" dirty="0"/>
-              <a:t>arXiv:1506.02158</a:t>
-            </a:r>
-            <a:r>
-              <a:rPr lang="en-US" sz="750" dirty="0"/>
-              <a:t>, 2016. </a:t>
-            </a:r>
-          </a:p>
-          <a:p>
-            <a:r>
-              <a:rPr lang="en-US" sz="750" dirty="0"/>
-              <a:t>[8] P.S. </a:t>
-            </a:r>
-            <a:r>
-              <a:rPr lang="en-US" sz="750" dirty="0" err="1"/>
-              <a:t>Teh</a:t>
-            </a:r>
-            <a:r>
-              <a:rPr lang="en-US" sz="750" dirty="0"/>
-              <a:t>, N. Zhang, A.B.J. Teoh, K. Chen. A survey on touch dynamics authentication in mobile devices. </a:t>
-            </a:r>
-            <a:r>
-              <a:rPr lang="en-US" sz="750" i="1" dirty="0"/>
-              <a:t>Computers &amp; Security</a:t>
-            </a:r>
-            <a:r>
-              <a:rPr lang="en-US" sz="750" dirty="0"/>
-              <a:t>,</a:t>
-            </a:r>
-            <a:r>
-              <a:rPr lang="en-US" sz="750" i="1" dirty="0"/>
-              <a:t> </a:t>
-            </a:r>
-            <a:r>
-              <a:rPr lang="en-US" sz="750" dirty="0"/>
-              <a:t>2016.</a:t>
-            </a:r>
-          </a:p>
-          <a:p>
-            <a:r>
-              <a:rPr lang="en-US" sz="750" dirty="0"/>
-              <a:t>[9] H. Bae, S. Monti, M. Montano, M.H. Steinberg, T.T. </a:t>
-            </a:r>
-            <a:r>
-              <a:rPr lang="en-US" sz="750" dirty="0" err="1"/>
-              <a:t>Perls</a:t>
-            </a:r>
-            <a:r>
-              <a:rPr lang="en-US" sz="750" dirty="0"/>
-              <a:t>, P. </a:t>
-            </a:r>
-            <a:r>
-              <a:rPr lang="en-US" sz="750" dirty="0" err="1"/>
-              <a:t>Sebastiani</a:t>
-            </a:r>
-            <a:r>
-              <a:rPr lang="en-US" sz="750" dirty="0"/>
-              <a:t>. Learning Bayesian Networks from Correlated Data. </a:t>
-            </a:r>
-            <a:r>
-              <a:rPr lang="en-US" sz="750" i="1" dirty="0"/>
-              <a:t>Nature Scientific Reports, </a:t>
-            </a:r>
-            <a:r>
-              <a:rPr lang="en-US" sz="750" dirty="0"/>
-              <a:t>2016.</a:t>
-            </a:r>
-          </a:p>
-        </p:txBody>
-      </p:sp>
-      <p:sp>
-        <p:nvSpPr>
-          <p:cNvPr id="27" name="TextBox 26"/>
-          <p:cNvSpPr txBox="1"/>
-          <p:nvPr/>
-        </p:nvSpPr>
-        <p:spPr>
-          <a:xfrm>
-            <a:off x="13716002" y="16192501"/>
-            <a:ext cx="1635982" cy="451642"/>
-          </a:xfrm>
-          <a:prstGeom prst="rect">
-            <a:avLst/>
-          </a:prstGeom>
-          <a:noFill/>
-        </p:spPr>
-        <p:txBody>
-          <a:bodyPr wrap="none" lIns="40809" tIns="20405" rIns="40809" bIns="20405" rtlCol="0">
-            <a:spAutoFit/>
-          </a:bodyPr>
-          <a:lstStyle/>
-          <a:p>
-            <a:r>
-              <a:rPr lang="en-US" sz="2667" b="1" dirty="0"/>
-              <a:t>References</a:t>
-            </a:r>
-          </a:p>
-        </p:txBody>
-      </p:sp>
-      <p:sp>
-        <p:nvSpPr>
           <p:cNvPr id="10" name="Text Box 189"/>
           <p:cNvSpPr txBox="1">
             <a:spLocks noChangeArrowheads="1"/>
@@ -3566,8 +3286,8 @@
           </a:p>
         </p:txBody>
       </p:sp>
-      <mc:AlternateContent xmlns:mc="http://schemas.openxmlformats.org/markup-compatibility/2006" xmlns:a14="http://schemas.microsoft.com/office/drawing/2010/main">
-        <mc:Choice Requires="a14">
+      <mc:AlternateContent xmlns:mc="http://schemas.openxmlformats.org/markup-compatibility/2006">
+        <mc:Choice xmlns:a14="http://schemas.microsoft.com/office/drawing/2010/main" Requires="a14">
           <p:sp>
             <p:nvSpPr>
               <p:cNvPr id="13" name="Text Box 192"/>
@@ -3872,8 +3592,23 @@
                   <a:rPr lang="en-US" sz="1667" dirty="0">
                     <a:latin typeface="Calibri" pitchFamily="34" charset="0"/>
                   </a:rPr>
-                  <a:t>centroids determined upon convergence become the basis for our adversarial example generation.</a:t>
+                  <a:t>centroids determined upon convergence become the basis for our adversarial example generation</a:t>
                 </a:r>
+                <a:r>
+                  <a:rPr lang="en-US" sz="1667" dirty="0" smtClean="0">
+                    <a:latin typeface="Calibri" pitchFamily="34" charset="0"/>
+                  </a:rPr>
+                  <a:t>. Small (&lt;5) clusters are </a:t>
+                </a:r>
+                <a:r>
+                  <a:rPr lang="en-US" sz="1667" smtClean="0">
+                    <a:latin typeface="Calibri" pitchFamily="34" charset="0"/>
+                  </a:rPr>
+                  <a:t>considered outliers.</a:t>
+                </a:r>
+                <a:endParaRPr lang="en-US" sz="1667" dirty="0">
+                  <a:latin typeface="Calibri" pitchFamily="34" charset="0"/>
+                </a:endParaRPr>
               </a:p>
               <a:p>
                 <a:pPr marL="285750" indent="-285750" eaLnBrk="1" hangingPunct="1">
@@ -4961,7 +4696,7 @@
             </p:txBody>
           </p:sp>
         </mc:Choice>
-        <mc:Fallback xmlns="">
+        <mc:Fallback>
           <p:sp>
             <p:nvSpPr>
               <p:cNvPr id="13" name="Text Box 192"/>
@@ -5295,7 +5030,19 @@
               <a:rPr lang="en-US" sz="1667" dirty="0">
                 <a:latin typeface="Calibri" pitchFamily="34" charset="0"/>
               </a:rPr>
-              <a:t>). This means that nearly 80% of the time, our </a:t>
+              <a:t>). This means that </a:t>
+            </a:r>
+            <a:r>
+              <a:rPr lang="en-US" sz="1667" dirty="0" smtClean="0">
+                <a:latin typeface="Calibri" pitchFamily="34" charset="0"/>
+              </a:rPr>
+              <a:t>77% </a:t>
+            </a:r>
+            <a:r>
+              <a:rPr lang="en-US" sz="1667" dirty="0">
+                <a:latin typeface="Calibri" pitchFamily="34" charset="0"/>
+              </a:rPr>
+              <a:t>of the time, our </a:t>
             </a:r>
             <a:r>
               <a:rPr lang="en-US" sz="1667" b="1" dirty="0">
@@ -5998,7 +5745,7 @@
           <p:cNvPr id="1026" name="Picture 2" descr="K-mean center attack success rate.png">
             <a:extLst>
               <a:ext uri="{FF2B5EF4-FFF2-40B4-BE49-F238E27FC236}">
-                <a16:creationId xmlns:a16="http://schemas.microsoft.com/office/drawing/2014/main" xmlns="" id="{255D51AD-28C3-4E52-B2FD-0A20AD600D10}"/>
+                <a16:creationId xmlns="" xmlns:a16="http://schemas.microsoft.com/office/drawing/2014/main" id="{255D51AD-28C3-4E52-B2FD-0A20AD600D10}"/>
               </a:ext>
             </a:extLst>
           </p:cNvPr>
@@ -6045,7 +5792,7 @@
           <p:cNvPr id="1028" name="Picture 4" descr="K cluster Gaussian attack success rate.png">
             <a:extLst>
               <a:ext uri="{FF2B5EF4-FFF2-40B4-BE49-F238E27FC236}">
-                <a16:creationId xmlns:a16="http://schemas.microsoft.com/office/drawing/2014/main" xmlns="" id="{DF6C01D2-3451-4044-A5E5-DBF262E84660}"/>
+                <a16:creationId xmlns="" xmlns:a16="http://schemas.microsoft.com/office/drawing/2014/main" id="{DF6C01D2-3451-4044-A5E5-DBF262E84660}"/>
               </a:ext>
             </a:extLst>
           </p:cNvPr>
@@ -6251,28 +5998,28 @@
                   <a:gridCol w="1508878">
                     <a:extLst>
                       <a:ext uri="{9D8B030D-6E8A-4147-A177-3AD203B41FA5}">
-                        <a16:colId xmlns:a16="http://schemas.microsoft.com/office/drawing/2014/main" xmlns="" val="20000"/>
+                        <a16:colId xmlns="" xmlns:a16="http://schemas.microsoft.com/office/drawing/2014/main" val="20000"/>
                       </a:ext>
                     </a:extLst>
                   </a:gridCol>
                   <a:gridCol w="1508878">
                     <a:extLst>
                       <a:ext uri="{9D8B030D-6E8A-4147-A177-3AD203B41FA5}">
-                        <a16:colId xmlns:a16="http://schemas.microsoft.com/office/drawing/2014/main" xmlns="" val="20001"/>
+                        <a16:colId xmlns="" xmlns:a16="http://schemas.microsoft.com/office/drawing/2014/main" val="20001"/>
                       </a:ext>
                     </a:extLst>
                   </a:gridCol>
                   <a:gridCol w="1508878">
                     <a:extLst>
                       <a:ext uri="{9D8B030D-6E8A-4147-A177-3AD203B41FA5}">
-                        <a16:colId xmlns:a16="http://schemas.microsoft.com/office/drawing/2014/main" xmlns="" val="20002"/>
+                        <a16:colId xmlns="" xmlns:a16="http://schemas.microsoft.com/office/drawing/2014/main" val="20002"/>
                       </a:ext>
                     </a:extLst>
                   </a:gridCol>
                   <a:gridCol w="1508878">
                     <a:extLst>
                       <a:ext uri="{9D8B030D-6E8A-4147-A177-3AD203B41FA5}">
-                        <a16:colId xmlns:a16="http://schemas.microsoft.com/office/drawing/2014/main" xmlns="" val="20003"/>
+                        <a16:colId xmlns="" xmlns:a16="http://schemas.microsoft.com/office/drawing/2014/main" val="20003"/>
                       </a:ext>
                     </a:extLst>
                   </a:gridCol>
@@ -6361,7 +6108,7 @@
                   </a:tc>
                   <a:extLst>
                     <a:ext uri="{0D108BD9-81ED-4DB2-BD59-A6C34878D82A}">
-                      <a16:rowId xmlns:a16="http://schemas.microsoft.com/office/drawing/2014/main" xmlns="" val="10000"/>
+                      <a16:rowId xmlns="" xmlns:a16="http://schemas.microsoft.com/office/drawing/2014/main" val="10000"/>
                     </a:ext>
                   </a:extLst>
                 </a:tr>
@@ -6424,7 +6171,7 @@
                   </a:tc>
                   <a:extLst>
                     <a:ext uri="{0D108BD9-81ED-4DB2-BD59-A6C34878D82A}">
-                      <a16:rowId xmlns:a16="http://schemas.microsoft.com/office/drawing/2014/main" xmlns="" val="10001"/>
+                      <a16:rowId xmlns="" xmlns:a16="http://schemas.microsoft.com/office/drawing/2014/main" val="10001"/>
                     </a:ext>
                   </a:extLst>
                 </a:tr>
@@ -6487,7 +6234,7 @@
                   </a:tc>
                   <a:extLst>
                     <a:ext uri="{0D108BD9-81ED-4DB2-BD59-A6C34878D82A}">
-                      <a16:rowId xmlns:a16="http://schemas.microsoft.com/office/drawing/2014/main" xmlns="" val="10002"/>
+                      <a16:rowId xmlns="" xmlns:a16="http://schemas.microsoft.com/office/drawing/2014/main" val="10002"/>
                     </a:ext>
                   </a:extLst>
                 </a:tr>
@@ -6550,7 +6297,7 @@
                   </a:tc>
                   <a:extLst>
                     <a:ext uri="{0D108BD9-81ED-4DB2-BD59-A6C34878D82A}">
-                      <a16:rowId xmlns:a16="http://schemas.microsoft.com/office/drawing/2014/main" xmlns="" val="10003"/>
+                      <a16:rowId xmlns="" xmlns:a16="http://schemas.microsoft.com/office/drawing/2014/main" val="10003"/>
                     </a:ext>
                   </a:extLst>
                 </a:tr>
@@ -7146,7 +6893,7 @@
           <p:cNvPr id="45" name="Text Box 180">
             <a:extLst>
               <a:ext uri="{FF2B5EF4-FFF2-40B4-BE49-F238E27FC236}">
-                <a16:creationId xmlns:a16="http://schemas.microsoft.com/office/drawing/2014/main" xmlns="" id="{B5035870-ADA2-4595-8A86-153C0D15B18F}"/>
+                <a16:creationId xmlns="" xmlns:a16="http://schemas.microsoft.com/office/drawing/2014/main" id="{B5035870-ADA2-4595-8A86-153C0D15B18F}"/>
               </a:ext>
             </a:extLst>
           </p:cNvPr>
@@ -7345,7 +7092,7 @@
           <p:cNvPr id="46" name="Content Placeholder 114" descr="Sample table with 4 columns, 7 rows." title="Sample Table">
             <a:extLst>
               <a:ext uri="{FF2B5EF4-FFF2-40B4-BE49-F238E27FC236}">
-                <a16:creationId xmlns:a16="http://schemas.microsoft.com/office/drawing/2014/main" xmlns="" id="{60CBE95C-D1AC-4C3F-BFC0-D21F55A094E3}"/>
+                <a16:creationId xmlns="" xmlns:a16="http://schemas.microsoft.com/office/drawing/2014/main" id="{60CBE95C-D1AC-4C3F-BFC0-D21F55A094E3}"/>
               </a:ext>
             </a:extLst>
           </p:cNvPr>
@@ -7374,42 +7121,42 @@
                 <a:gridCol w="1371600">
                   <a:extLst>
                     <a:ext uri="{9D8B030D-6E8A-4147-A177-3AD203B41FA5}">
-                      <a16:colId xmlns:a16="http://schemas.microsoft.com/office/drawing/2014/main" xmlns="" val="20000"/>
+                      <a16:colId xmlns="" xmlns:a16="http://schemas.microsoft.com/office/drawing/2014/main" val="20000"/>
                     </a:ext>
                   </a:extLst>
                 </a:gridCol>
                 <a:gridCol w="1371600">
                   <a:extLst>
                     <a:ext uri="{9D8B030D-6E8A-4147-A177-3AD203B41FA5}">
-                      <a16:colId xmlns:a16="http://schemas.microsoft.com/office/drawing/2014/main" xmlns="" val="20001"/>
+                      <a16:colId xmlns="" xmlns:a16="http://schemas.microsoft.com/office/drawing/2014/main" val="20001"/>
                     </a:ext>
                   </a:extLst>
                 </a:gridCol>
                 <a:gridCol w="1371600">
                   <a:extLst>
                     <a:ext uri="{9D8B030D-6E8A-4147-A177-3AD203B41FA5}">
-                      <a16:colId xmlns:a16="http://schemas.microsoft.com/office/drawing/2014/main" xmlns="" val="20002"/>
+                      <a16:colId xmlns="" xmlns:a16="http://schemas.microsoft.com/office/drawing/2014/main" val="20002"/>
                     </a:ext>
                   </a:extLst>
                 </a:gridCol>
                 <a:gridCol w="1371600">
                   <a:extLst>
                     <a:ext uri="{9D8B030D-6E8A-4147-A177-3AD203B41FA5}">
-                      <a16:colId xmlns:a16="http://schemas.microsoft.com/office/drawing/2014/main" xmlns="" val="20003"/>
+                      <a16:colId xmlns="" xmlns:a16="http://schemas.microsoft.com/office/drawing/2014/main" val="20003"/>
                     </a:ext>
                   </a:extLst>
                 </a:gridCol>
                 <a:gridCol w="1371600">
                   <a:extLst>
                     <a:ext uri="{9D8B030D-6E8A-4147-A177-3AD203B41FA5}">
-                      <a16:colId xmlns:a16="http://schemas.microsoft.com/office/drawing/2014/main" xmlns="" val="886844001"/>
+                      <a16:colId xmlns="" xmlns:a16="http://schemas.microsoft.com/office/drawing/2014/main" val="886844001"/>
                     </a:ext>
                   </a:extLst>
                 </a:gridCol>
                 <a:gridCol w="1371600">
                   <a:extLst>
                     <a:ext uri="{9D8B030D-6E8A-4147-A177-3AD203B41FA5}">
-                      <a16:colId xmlns:a16="http://schemas.microsoft.com/office/drawing/2014/main" xmlns="" val="1355434412"/>
+                      <a16:colId xmlns="" xmlns:a16="http://schemas.microsoft.com/office/drawing/2014/main" val="1355434412"/>
                     </a:ext>
                   </a:extLst>
                 </a:gridCol>
@@ -7579,7 +7326,7 @@
                 </a:tc>
                 <a:extLst>
                   <a:ext uri="{0D108BD9-81ED-4DB2-BD59-A6C34878D82A}">
-                    <a16:rowId xmlns:a16="http://schemas.microsoft.com/office/drawing/2014/main" xmlns="" val="10000"/>
+                    <a16:rowId xmlns="" xmlns:a16="http://schemas.microsoft.com/office/drawing/2014/main" val="10000"/>
                   </a:ext>
                 </a:extLst>
               </a:tr>
@@ -7919,7 +7666,7 @@
                 </a:tc>
                 <a:extLst>
                   <a:ext uri="{0D108BD9-81ED-4DB2-BD59-A6C34878D82A}">
-                    <a16:rowId xmlns:a16="http://schemas.microsoft.com/office/drawing/2014/main" xmlns="" val="10001"/>
+                    <a16:rowId xmlns="" xmlns:a16="http://schemas.microsoft.com/office/drawing/2014/main" val="10001"/>
                   </a:ext>
                 </a:extLst>
               </a:tr>
@@ -8262,7 +8009,7 @@
                 </a:tc>
                 <a:extLst>
                   <a:ext uri="{0D108BD9-81ED-4DB2-BD59-A6C34878D82A}">
-                    <a16:rowId xmlns:a16="http://schemas.microsoft.com/office/drawing/2014/main" xmlns="" val="10002"/>
+                    <a16:rowId xmlns="" xmlns:a16="http://schemas.microsoft.com/office/drawing/2014/main" val="10002"/>
                   </a:ext>
                 </a:extLst>
               </a:tr>
@@ -8275,7 +8022,7 @@
           <p:cNvPr id="47" name="Text Box 180">
             <a:extLst>
               <a:ext uri="{FF2B5EF4-FFF2-40B4-BE49-F238E27FC236}">
-                <a16:creationId xmlns:a16="http://schemas.microsoft.com/office/drawing/2014/main" xmlns="" id="{B68CCE3C-71F5-47D9-BF5F-CCAFD9C77C0F}"/>
+                <a16:creationId xmlns="" xmlns:a16="http://schemas.microsoft.com/office/drawing/2014/main" id="{B68CCE3C-71F5-47D9-BF5F-CCAFD9C77C0F}"/>
               </a:ext>
             </a:extLst>
           </p:cNvPr>
@@ -8883,6 +8630,286 @@
                 <a:latin typeface="Calibri" pitchFamily="34" charset="0"/>
               </a:rPr>
               <a:t> </a:t>
+            </a:r>
+          </a:p>
+        </p:txBody>
+      </p:sp>
+      <p:sp>
+        <p:nvSpPr>
+          <p:cNvPr id="48" name="TextBox 47"/>
+          <p:cNvSpPr txBox="1"/>
+          <p:nvPr/>
+        </p:nvSpPr>
+        <p:spPr>
+          <a:xfrm>
+            <a:off x="8534399" y="16687799"/>
+            <a:ext cx="17646767" cy="1219200"/>
+          </a:xfrm>
+          <a:prstGeom prst="rect">
+            <a:avLst/>
+          </a:prstGeom>
+          <a:noFill/>
+        </p:spPr>
+        <p:txBody>
+          <a:bodyPr wrap="square" lIns="40809" tIns="40809" rIns="40809" bIns="40809" numCol="2" spcCol="244855" rtlCol="0">
+            <a:noAutofit/>
+          </a:bodyPr>
+          <a:lstStyle/>
+          <a:p>
+            <a:r>
+              <a:rPr lang="en-US" sz="1200" dirty="0"/>
+              <a:t>[1] N. Al-</a:t>
+            </a:r>
+            <a:r>
+              <a:rPr lang="en-US" sz="1200" dirty="0" err="1"/>
+              <a:t>Obaidi</a:t>
+            </a:r>
+            <a:r>
+              <a:rPr lang="en-US" sz="1200" dirty="0"/>
+              <a:t>. MEU-Mobile KSD Data Set. UCI Machine Learning Repository, 2016.</a:t>
+            </a:r>
+          </a:p>
+          <a:p>
+            <a:r>
+              <a:rPr lang="en-US" sz="1200" dirty="0"/>
+              <a:t>[2] I. de </a:t>
+            </a:r>
+            <a:r>
+              <a:rPr lang="en-US" sz="1200" dirty="0" err="1"/>
+              <a:t>Mendizabal</a:t>
+            </a:r>
+            <a:r>
+              <a:rPr lang="en-US" sz="1200" dirty="0"/>
+              <a:t>-Vazquez, D. de Santos-Sierra, J. Guerra-Casanova, and C. Sanchez-Avila. Supervised classification methods applied to</a:t>
+            </a:r>
+          </a:p>
+          <a:p>
+            <a:r>
+              <a:rPr lang="en-US" sz="1200" dirty="0"/>
+              <a:t>Keystroke Dynamics through Mobile Devices. </a:t>
+            </a:r>
+            <a:r>
+              <a:rPr lang="en-US" sz="1200" i="1" dirty="0"/>
+              <a:t>ICCST</a:t>
+            </a:r>
+            <a:r>
+              <a:rPr lang="en-US" sz="1200" dirty="0"/>
+              <a:t>, 2014.</a:t>
+            </a:r>
+          </a:p>
+          <a:p>
+            <a:r>
+              <a:rPr lang="en-US" sz="1200" dirty="0"/>
+              <a:t>[3] T. Cho. Pattern Classification Methods for Keystroke Analysis. </a:t>
+            </a:r>
+            <a:r>
+              <a:rPr lang="en-US" sz="1200" i="1" dirty="0"/>
+              <a:t>SICE-ICASE</a:t>
+            </a:r>
+            <a:r>
+              <a:rPr lang="en-US" sz="1200" dirty="0"/>
+              <a:t>, 2006.</a:t>
+            </a:r>
+          </a:p>
+          <a:p>
+            <a:r>
+              <a:rPr lang="en-US" sz="1200" dirty="0"/>
+              <a:t>[4] L.J.P. van der </a:t>
+            </a:r>
+            <a:r>
+              <a:rPr lang="en-US" sz="1200" dirty="0" err="1"/>
+              <a:t>Maaten</a:t>
+            </a:r>
+            <a:r>
+              <a:rPr lang="en-US" sz="1200" dirty="0"/>
+              <a:t>. Accelerating t-SNE using Tree-Based Algorithms. </a:t>
+            </a:r>
+            <a:r>
+              <a:rPr lang="en-US" sz="1200" i="1" dirty="0"/>
+              <a:t>Journal of Machine Learning Research</a:t>
+            </a:r>
+            <a:r>
+              <a:rPr lang="en-US" sz="1200" dirty="0"/>
+              <a:t>, 2014.</a:t>
+            </a:r>
+          </a:p>
+          <a:p>
+            <a:r>
+              <a:rPr lang="en-US" sz="1200" dirty="0"/>
+              <a:t>[5] A. </a:t>
+            </a:r>
+            <a:r>
+              <a:rPr lang="en-US" sz="1200" dirty="0" err="1"/>
+              <a:t>Fawzi</a:t>
+            </a:r>
+            <a:r>
+              <a:rPr lang="en-US" sz="1200" dirty="0"/>
+              <a:t>, S. </a:t>
+            </a:r>
+            <a:r>
+              <a:rPr lang="en-US" sz="1200" dirty="0" err="1"/>
+              <a:t>Moosavi-Dezfooli</a:t>
+            </a:r>
+            <a:r>
+              <a:rPr lang="en-US" sz="1200" dirty="0"/>
+              <a:t>, P. </a:t>
+            </a:r>
+            <a:r>
+              <a:rPr lang="en-US" sz="1200" dirty="0" err="1"/>
+              <a:t>Frossard</a:t>
+            </a:r>
+            <a:r>
+              <a:rPr lang="en-US" sz="1200" dirty="0"/>
+              <a:t>. Robustness of classifiers: from adversarial to random noise. </a:t>
+            </a:r>
+            <a:r>
+              <a:rPr lang="en-US" sz="1200" i="1" dirty="0"/>
+              <a:t>NIPS</a:t>
+            </a:r>
+            <a:r>
+              <a:rPr lang="en-US" sz="1200" dirty="0"/>
+              <a:t>, 2016.</a:t>
+            </a:r>
+          </a:p>
+          <a:p>
+            <a:r>
+              <a:rPr lang="en-US" sz="1200" dirty="0"/>
+              <a:t>[6] C. </a:t>
+            </a:r>
+            <a:r>
+              <a:rPr lang="en-US" sz="1200" dirty="0" err="1"/>
+              <a:t>Dwork</a:t>
+            </a:r>
+            <a:r>
+              <a:rPr lang="en-US" sz="1200" dirty="0"/>
+              <a:t>, A. Roth. Differential privacy. </a:t>
+            </a:r>
+            <a:r>
+              <a:rPr lang="en-US" sz="1200" i="1" dirty="0"/>
+              <a:t>Foundations and Trends in Computer Science</a:t>
+            </a:r>
+            <a:r>
+              <a:rPr lang="en-US" sz="1200" dirty="0"/>
+              <a:t>, 2014.</a:t>
+            </a:r>
+          </a:p>
+          <a:p>
+            <a:r>
+              <a:rPr lang="en-US" sz="1200" dirty="0"/>
+              <a:t>[7] Y. Gal, Z. </a:t>
+            </a:r>
+            <a:r>
+              <a:rPr lang="en-US" sz="1200" dirty="0" err="1"/>
+              <a:t>Ghahramani</a:t>
+            </a:r>
+            <a:r>
+              <a:rPr lang="en-US" sz="1200" dirty="0"/>
+              <a:t>. Bayesian Convolutional Neural Networks with Bernoulli Approximate </a:t>
+            </a:r>
+            <a:r>
+              <a:rPr lang="en-US" sz="1200" dirty="0" err="1"/>
+              <a:t>Variational</a:t>
+            </a:r>
+            <a:r>
+              <a:rPr lang="en-US" sz="1200" dirty="0"/>
+              <a:t> Inference. </a:t>
+            </a:r>
+            <a:r>
+              <a:rPr lang="en-US" sz="1200" i="1" dirty="0"/>
+              <a:t>arXiv:1506.02158</a:t>
+            </a:r>
+            <a:r>
+              <a:rPr lang="en-US" sz="1200" dirty="0"/>
+              <a:t>, 2016. </a:t>
+            </a:r>
+          </a:p>
+          <a:p>
+            <a:r>
+              <a:rPr lang="en-US" sz="1200" dirty="0"/>
+              <a:t>[8] P.S. </a:t>
+            </a:r>
+            <a:r>
+              <a:rPr lang="en-US" sz="1200" dirty="0" err="1"/>
+              <a:t>Teh</a:t>
+            </a:r>
+            <a:r>
+              <a:rPr lang="en-US" sz="1200" dirty="0"/>
+              <a:t>, N. Zhang, A.B.J. Teoh, K. Chen. A survey on touch dynamics authentication in mobile devices. </a:t>
+            </a:r>
+            <a:r>
+              <a:rPr lang="en-US" sz="1200" i="1" dirty="0"/>
+              <a:t>Computers &amp; Security</a:t>
+            </a:r>
+            <a:r>
+              <a:rPr lang="en-US" sz="1200" dirty="0"/>
+              <a:t>,</a:t>
+            </a:r>
+            <a:r>
+              <a:rPr lang="en-US" sz="1200" i="1" dirty="0"/>
+              <a:t> </a:t>
+            </a:r>
+            <a:r>
+              <a:rPr lang="en-US" sz="1200" dirty="0"/>
+              <a:t>2016.</a:t>
+            </a:r>
+          </a:p>
+          <a:p>
+            <a:r>
+              <a:rPr lang="en-US" sz="1200" dirty="0"/>
+              <a:t>[9] H. Bae, S. Monti, M. Montano, M.H. Steinberg, T.T. </a:t>
+            </a:r>
+            <a:r>
+              <a:rPr lang="en-US" sz="1200" dirty="0" err="1"/>
+              <a:t>Perls</a:t>
+            </a:r>
+            <a:r>
+              <a:rPr lang="en-US" sz="1200" dirty="0"/>
+              <a:t>, P. </a:t>
+            </a:r>
+            <a:r>
+              <a:rPr lang="en-US" sz="1200" dirty="0" err="1"/>
+              <a:t>Sebastiani</a:t>
+            </a:r>
+            <a:r>
+              <a:rPr lang="en-US" sz="1200" dirty="0"/>
+              <a:t>. Learning Bayesian Networks from Correlated Data. </a:t>
+            </a:r>
+            <a:r>
+              <a:rPr lang="en-US" sz="1200" i="1" dirty="0"/>
+              <a:t>Nature Scientific Reports, </a:t>
+            </a:r>
+            <a:r>
+              <a:rPr lang="en-US" sz="1200" dirty="0"/>
+              <a:t>2016.</a:t>
+            </a:r>
+          </a:p>
+        </p:txBody>
+      </p:sp>
+      <p:sp>
+        <p:nvSpPr>
+          <p:cNvPr id="51" name="TextBox 50"/>
+          <p:cNvSpPr txBox="1"/>
+          <p:nvPr/>
+        </p:nvSpPr>
+        <p:spPr>
+          <a:xfrm>
+            <a:off x="8547099" y="16192501"/>
+            <a:ext cx="1635982" cy="451642"/>
+          </a:xfrm>
+          <a:prstGeom prst="rect">
+            <a:avLst/>
+          </a:prstGeom>
+          <a:noFill/>
+        </p:spPr>
+        <p:txBody>
+          <a:bodyPr wrap="none" lIns="40809" tIns="20405" rIns="40809" bIns="20405" rtlCol="0">
+            <a:spAutoFit/>
+          </a:bodyPr>
+          <a:lstStyle/>
+          <a:p>
+            <a:r>
+              <a:rPr lang="en-US" sz="2667" b="1" dirty="0"/>
+              <a:t>References</a:t>
             </a:r>
           </a:p>
         </p:txBody>

</xml_diff>

<commit_message>
added diagrams to poster
</commit_message>
<xml_diff>
--- a/p-poster.pptx
+++ b/p-poster.pptx
@@ -226,7 +226,7 @@
           <a:p>
             <a:fld id="{FF66CDD7-09B6-4BB3-9069-2B95837CCCB2}" type="datetimeFigureOut">
               <a:rPr lang="en-US" smtClean="0"/>
-              <a:t>12/4/2017</a:t>
+              <a:t>12/4/17</a:t>
             </a:fld>
             <a:endParaRPr lang="en-US"/>
           </a:p>
@@ -1902,7 +1902,7 @@
           <a:p>
             <a:fld id="{985D6BDF-9D0E-4E2B-85B8-D8F4790360C9}" type="datetimeFigureOut">
               <a:rPr lang="en-US" smtClean="0"/>
-              <a:t>12/4/2017</a:t>
+              <a:t>12/4/17</a:t>
             </a:fld>
             <a:endParaRPr lang="en-US" dirty="0"/>
           </a:p>
@@ -2113,7 +2113,7 @@
           <a:p>
             <a:fld id="{985D6BDF-9D0E-4E2B-85B8-D8F4790360C9}" type="datetimeFigureOut">
               <a:rPr lang="en-US" smtClean="0"/>
-              <a:t>12/4/2017</a:t>
+              <a:t>12/4/17</a:t>
             </a:fld>
             <a:endParaRPr lang="en-US" dirty="0"/>
           </a:p>
@@ -3442,8 +3442,8 @@
           </a:p>
         </p:txBody>
       </p:sp>
-      <mc:AlternateContent xmlns:mc="http://schemas.openxmlformats.org/markup-compatibility/2006" xmlns:a14="http://schemas.microsoft.com/office/drawing/2010/main">
-        <mc:Choice Requires="a14">
+      <mc:AlternateContent xmlns:mc="http://schemas.openxmlformats.org/markup-compatibility/2006">
+        <mc:Choice xmlns:a14="http://schemas.microsoft.com/office/drawing/2010/main" Requires="a14">
           <p:sp>
             <p:nvSpPr>
               <p:cNvPr id="13" name="Text Box 192"/>
@@ -3455,7 +3455,7 @@
             <p:spPr bwMode="auto">
               <a:xfrm>
                 <a:off x="9601200" y="3048000"/>
-                <a:ext cx="8229600" cy="12729167"/>
+                <a:ext cx="8229600" cy="12472623"/>
               </a:xfrm>
               <a:prstGeom prst="rect">
                 <a:avLst/>
@@ -3579,122 +3579,23 @@
                   <a:buFont typeface="Arial" panose="020B0604020202020204" pitchFamily="34" charset="0"/>
                   <a:buChar char="•"/>
                 </a:pPr>
-                <a:endParaRPr lang="en-US" sz="1667" b="1" i="1" dirty="0">
-                  <a:latin typeface="Calibri" pitchFamily="34" charset="0"/>
-                </a:endParaRPr>
-              </a:p>
-              <a:p>
-                <a:pPr marL="285750" indent="-285750" eaLnBrk="1" hangingPunct="1">
-                  <a:buFont typeface="Arial" panose="020B0604020202020204" pitchFamily="34" charset="0"/>
-                  <a:buChar char="•"/>
-                </a:pPr>
-                <a:endParaRPr lang="en-US" sz="1667" b="1" i="1" dirty="0">
-                  <a:latin typeface="Calibri" pitchFamily="34" charset="0"/>
-                </a:endParaRPr>
-              </a:p>
-              <a:p>
-                <a:pPr marL="285750" indent="-285750" eaLnBrk="1" hangingPunct="1">
-                  <a:buFont typeface="Arial" panose="020B0604020202020204" pitchFamily="34" charset="0"/>
-                  <a:buChar char="•"/>
-                </a:pPr>
-                <a:endParaRPr lang="en-US" sz="1667" b="1" i="1" dirty="0">
-                  <a:latin typeface="Calibri" pitchFamily="34" charset="0"/>
-                </a:endParaRPr>
-              </a:p>
-              <a:p>
-                <a:pPr marL="285750" indent="-285750" eaLnBrk="1" hangingPunct="1">
-                  <a:buFont typeface="Arial" panose="020B0604020202020204" pitchFamily="34" charset="0"/>
-                  <a:buChar char="•"/>
-                </a:pPr>
-                <a:endParaRPr lang="en-US" sz="1667" b="1" i="1" dirty="0">
-                  <a:latin typeface="Calibri" pitchFamily="34" charset="0"/>
-                </a:endParaRPr>
-              </a:p>
-              <a:p>
-                <a:pPr marL="285750" indent="-285750" eaLnBrk="1" hangingPunct="1">
-                  <a:buFont typeface="Arial" panose="020B0604020202020204" pitchFamily="34" charset="0"/>
-                  <a:buChar char="•"/>
-                </a:pPr>
-                <a:endParaRPr lang="en-US" sz="1667" b="1" i="1" dirty="0">
-                  <a:latin typeface="Calibri" pitchFamily="34" charset="0"/>
-                </a:endParaRPr>
-              </a:p>
-              <a:p>
-                <a:pPr marL="285750" indent="-285750" eaLnBrk="1" hangingPunct="1">
-                  <a:buFont typeface="Arial" panose="020B0604020202020204" pitchFamily="34" charset="0"/>
-                  <a:buChar char="•"/>
-                </a:pPr>
-                <a:endParaRPr lang="en-US" sz="1667" b="1" i="1" dirty="0">
-                  <a:latin typeface="Calibri" pitchFamily="34" charset="0"/>
-                </a:endParaRPr>
-              </a:p>
-              <a:p>
-                <a:pPr marL="285750" indent="-285750" eaLnBrk="1" hangingPunct="1">
-                  <a:buFont typeface="Arial" panose="020B0604020202020204" pitchFamily="34" charset="0"/>
-                  <a:buChar char="•"/>
-                </a:pPr>
-                <a:endParaRPr lang="en-US" sz="1667" b="1" i="1" dirty="0">
-                  <a:latin typeface="Calibri" pitchFamily="34" charset="0"/>
-                </a:endParaRPr>
-              </a:p>
-              <a:p>
-                <a:pPr marL="285750" indent="-285750" eaLnBrk="1" hangingPunct="1">
-                  <a:buFont typeface="Arial" panose="020B0604020202020204" pitchFamily="34" charset="0"/>
-                  <a:buChar char="•"/>
-                </a:pPr>
-                <a:endParaRPr lang="en-US" sz="1667" b="1" i="1" dirty="0">
-                  <a:latin typeface="Calibri" pitchFamily="34" charset="0"/>
-                </a:endParaRPr>
-              </a:p>
-              <a:p>
-                <a:pPr marL="285750" indent="-285750" eaLnBrk="1" hangingPunct="1">
-                  <a:buFont typeface="Arial" panose="020B0604020202020204" pitchFamily="34" charset="0"/>
-                  <a:buChar char="•"/>
-                </a:pPr>
-                <a:endParaRPr lang="en-US" sz="1667" b="1" i="1" dirty="0">
-                  <a:latin typeface="Calibri" pitchFamily="34" charset="0"/>
-                </a:endParaRPr>
-              </a:p>
-              <a:p>
-                <a:pPr marL="285750" indent="-285750" eaLnBrk="1" hangingPunct="1">
-                  <a:buFont typeface="Arial" panose="020B0604020202020204" pitchFamily="34" charset="0"/>
-                  <a:buChar char="•"/>
-                </a:pPr>
-                <a:endParaRPr lang="en-US" sz="1667" b="1" i="1" dirty="0">
-                  <a:latin typeface="Calibri" pitchFamily="34" charset="0"/>
-                </a:endParaRPr>
-              </a:p>
-              <a:p>
-                <a:pPr eaLnBrk="1" hangingPunct="1"/>
-                <a:endParaRPr lang="en-US" sz="1667" b="1" i="1" dirty="0">
-                  <a:latin typeface="Calibri" pitchFamily="34" charset="0"/>
-                </a:endParaRPr>
-              </a:p>
-              <a:p>
-                <a:pPr marL="285750" indent="-285750" eaLnBrk="1" hangingPunct="1">
-                  <a:buFont typeface="Arial" panose="020B0604020202020204" pitchFamily="34" charset="0"/>
-                  <a:buChar char="•"/>
-                </a:pPr>
-                <a:endParaRPr lang="en-US" sz="1667" b="1" i="1" dirty="0">
-                  <a:latin typeface="Calibri" pitchFamily="34" charset="0"/>
-                </a:endParaRPr>
-              </a:p>
-              <a:p>
-                <a:pPr marL="285750" indent="-285750" eaLnBrk="1" hangingPunct="1">
-                  <a:buFont typeface="Arial" panose="020B0604020202020204" pitchFamily="34" charset="0"/>
-                  <a:buChar char="•"/>
-                </a:pPr>
                 <a:r>
-                  <a:rPr lang="en-US" sz="1667" b="1" i="1" dirty="0">
+                  <a:rPr lang="en-US" sz="1667" b="1" i="1" dirty="0" smtClean="0">
                     <a:latin typeface="Calibri" pitchFamily="34" charset="0"/>
                   </a:rPr>
                   <a:t>k</a:t>
                 </a:r>
                 <a:r>
+                  <a:rPr lang="en-US" sz="1667" b="1" dirty="0" smtClean="0">
+                    <a:latin typeface="Calibri" pitchFamily="34" charset="0"/>
+                  </a:rPr>
+                  <a:t>-means</a:t>
+                </a:r>
+                <a:r>
                   <a:rPr lang="en-US" sz="1667" b="1" dirty="0">
                     <a:latin typeface="Calibri" pitchFamily="34" charset="0"/>
                   </a:rPr>
-                  <a:t>-means. </a:t>
+                  <a:t>. </a:t>
                 </a:r>
                 <a:r>
                   <a:rPr lang="en-US" sz="1667" dirty="0">
@@ -3787,7 +3688,19 @@
                   <a:rPr lang="en-US" sz="1667" dirty="0">
                     <a:latin typeface="Calibri" pitchFamily="34" charset="0"/>
                   </a:rPr>
-                  <a:t>-means as multivariate Gaussian distributions. Modeling the clusters as multivariate Gaussian distributions over the random variable set </a:t>
+                  <a:t>-means as multivariate Gaussian </a:t>
+                </a:r>
+                <a:r>
+                  <a:rPr lang="en-US" sz="1667" dirty="0" smtClean="0">
+                    <a:latin typeface="Calibri" pitchFamily="34" charset="0"/>
+                  </a:rPr>
+                  <a:t>distributions over </a:t>
+                </a:r>
+                <a:r>
+                  <a:rPr lang="en-US" sz="1667" dirty="0">
+                    <a:latin typeface="Calibri" pitchFamily="34" charset="0"/>
+                  </a:rPr>
+                  <a:t>the random variable set </a:t>
                 </a:r>
                 <a14:m>
                   <m:oMath xmlns:m="http://schemas.openxmlformats.org/officeDocument/2006/math">
@@ -3807,7 +3720,7 @@
                       <m:sSubPr>
                         <m:ctrlPr>
                           <a:rPr lang="en-US" sz="1667" b="0" i="1" smtClean="0">
-                            <a:latin typeface="Cambria Math" panose="02040503050406030204" pitchFamily="18" charset="0"/>
+                            <a:latin typeface="Cambria Math" charset="0"/>
                           </a:rPr>
                         </m:ctrlPr>
                       </m:sSubPr>
@@ -3838,7 +3751,7 @@
                       <m:sSubPr>
                         <m:ctrlPr>
                           <a:rPr lang="en-US" sz="1667" b="0" i="1" smtClean="0">
-                            <a:latin typeface="Cambria Math" panose="02040503050406030204" pitchFamily="18" charset="0"/>
+                            <a:latin typeface="Cambria Math" charset="0"/>
                           </a:rPr>
                         </m:ctrlPr>
                       </m:sSubPr>
@@ -3871,7 +3784,19 @@
                   <a:rPr lang="en-US" sz="1667" dirty="0">
                     <a:latin typeface="Calibri" pitchFamily="34" charset="0"/>
                   </a:rPr>
-                  <a:t>, the density function:</a:t>
+                  <a:t>, </a:t>
+                </a:r>
+                <a:r>
+                  <a:rPr lang="en-US" sz="1667" dirty="0" smtClean="0">
+                    <a:latin typeface="Calibri" pitchFamily="34" charset="0"/>
+                  </a:rPr>
+                  <a:t> with the </a:t>
+                </a:r>
+                <a:r>
+                  <a:rPr lang="en-US" sz="1667" dirty="0">
+                    <a:latin typeface="Calibri" pitchFamily="34" charset="0"/>
+                  </a:rPr>
+                  <a:t>density function:</a:t>
                 </a:r>
               </a:p>
               <a:p>
@@ -3892,7 +3817,7 @@
                         <m:dPr>
                           <m:ctrlPr>
                             <a:rPr lang="en-US" sz="1667" b="0" i="1" smtClean="0">
-                              <a:latin typeface="Cambria Math" panose="02040503050406030204" pitchFamily="18" charset="0"/>
+                              <a:latin typeface="Cambria Math" charset="0"/>
                             </a:rPr>
                           </m:ctrlPr>
                         </m:dPr>
@@ -3942,7 +3867,7 @@
                         <m:fPr>
                           <m:ctrlPr>
                             <a:rPr lang="en-US" sz="1667" b="0" i="1" smtClean="0">
-                              <a:latin typeface="Cambria Math" panose="02040503050406030204" pitchFamily="18" charset="0"/>
+                              <a:latin typeface="Cambria Math" charset="0"/>
                             </a:rPr>
                           </m:ctrlPr>
                         </m:fPr>
@@ -3961,7 +3886,7 @@
                               <m:endChr m:val="|"/>
                               <m:ctrlPr>
                                 <a:rPr lang="en-US" sz="1667" i="1">
-                                  <a:latin typeface="Cambria Math" panose="02040503050406030204" pitchFamily="18" charset="0"/>
+                                  <a:latin typeface="Cambria Math" charset="0"/>
                                 </a:rPr>
                               </m:ctrlPr>
                             </m:dPr>
@@ -3981,7 +3906,7 @@
                             <m:sSupPr>
                               <m:ctrlPr>
                                 <a:rPr lang="en-US" sz="1667" i="1">
-                                  <a:latin typeface="Cambria Math" panose="02040503050406030204" pitchFamily="18" charset="0"/>
+                                  <a:latin typeface="Cambria Math" charset="0"/>
                                 </a:rPr>
                               </m:ctrlPr>
                             </m:sSupPr>
@@ -3990,7 +3915,7 @@
                                 <m:dPr>
                                   <m:ctrlPr>
                                     <a:rPr lang="en-US" sz="1667" i="1">
-                                      <a:latin typeface="Cambria Math" panose="02040503050406030204" pitchFamily="18" charset="0"/>
+                                      <a:latin typeface="Cambria Math" charset="0"/>
                                     </a:rPr>
                                   </m:ctrlPr>
                                 </m:dPr>
@@ -4025,7 +3950,7 @@
                         <m:funcPr>
                           <m:ctrlPr>
                             <a:rPr lang="en-US" sz="1667" b="0" i="1" smtClean="0">
-                              <a:latin typeface="Cambria Math" panose="02040503050406030204" pitchFamily="18" charset="0"/>
+                              <a:latin typeface="Cambria Math" charset="0"/>
                             </a:rPr>
                           </m:ctrlPr>
                         </m:funcPr>
@@ -4045,7 +3970,7 @@
                             <m:dPr>
                               <m:ctrlPr>
                                 <a:rPr lang="en-US" sz="1667" b="0" i="1" smtClean="0">
-                                  <a:latin typeface="Cambria Math" panose="02040503050406030204" pitchFamily="18" charset="0"/>
+                                  <a:latin typeface="Cambria Math" charset="0"/>
                                 </a:rPr>
                               </m:ctrlPr>
                             </m:dPr>
@@ -4060,7 +3985,7 @@
                                 <m:fPr>
                                   <m:ctrlPr>
                                     <a:rPr lang="en-US" sz="1667" b="0" i="1" smtClean="0">
-                                      <a:latin typeface="Cambria Math" panose="02040503050406030204" pitchFamily="18" charset="0"/>
+                                      <a:latin typeface="Cambria Math" charset="0"/>
                                     </a:rPr>
                                   </m:ctrlPr>
                                 </m:fPr>
@@ -4085,7 +4010,7 @@
                                 <m:sSupPr>
                                   <m:ctrlPr>
                                     <a:rPr lang="en-US" sz="1667" b="0" i="1" smtClean="0">
-                                      <a:latin typeface="Cambria Math" panose="02040503050406030204" pitchFamily="18" charset="0"/>
+                                      <a:latin typeface="Cambria Math" charset="0"/>
                                     </a:rPr>
                                   </m:ctrlPr>
                                 </m:sSupPr>
@@ -4094,7 +4019,7 @@
                                     <m:dPr>
                                       <m:ctrlPr>
                                         <a:rPr lang="en-US" sz="1667" b="0" i="1" smtClean="0">
-                                          <a:latin typeface="Cambria Math" panose="02040503050406030204" pitchFamily="18" charset="0"/>
+                                          <a:latin typeface="Cambria Math" charset="0"/>
                                         </a:rPr>
                                       </m:ctrlPr>
                                     </m:dPr>
@@ -4133,7 +4058,7 @@
                                 <m:sSupPr>
                                   <m:ctrlPr>
                                     <a:rPr lang="en-US" sz="1667" b="0" i="1" smtClean="0">
-                                      <a:latin typeface="Cambria Math" panose="02040503050406030204" pitchFamily="18" charset="0"/>
+                                      <a:latin typeface="Cambria Math" charset="0"/>
                                     </a:rPr>
                                   </m:ctrlPr>
                                 </m:sSupPr>
@@ -4161,7 +4086,7 @@
                                 <m:dPr>
                                   <m:ctrlPr>
                                     <a:rPr lang="en-US" sz="1667" b="0" i="1" smtClean="0">
-                                      <a:latin typeface="Cambria Math" panose="02040503050406030204" pitchFamily="18" charset="0"/>
+                                      <a:latin typeface="Cambria Math" charset="0"/>
                                     </a:rPr>
                                   </m:ctrlPr>
                                 </m:dPr>
@@ -4215,16 +4140,10 @@
                   <a:rPr lang="en-US" sz="1667" dirty="0">
                     <a:latin typeface="Calibri" pitchFamily="34" charset="0"/>
                   </a:rPr>
-                  <a:t>these </a:t>
+                  <a:t>these attacks </a:t>
                 </a:r>
                 <a:r>
-                  <a:rPr lang="en-US" sz="1667">
-                    <a:latin typeface="Calibri" pitchFamily="34" charset="0"/>
-                  </a:rPr>
-                  <a:t>attacks </a:t>
-                </a:r>
-                <a:r>
-                  <a:rPr lang="en-US" sz="1667" smtClean="0">
+                  <a:rPr lang="en-US" sz="1667" dirty="0" smtClean="0">
                     <a:latin typeface="Calibri" pitchFamily="34" charset="0"/>
                   </a:rPr>
                   <a:t>was then </a:t>
@@ -4263,8 +4182,77 @@
                   <a:rPr lang="en-US" sz="1667" dirty="0" smtClean="0">
                     <a:latin typeface="Calibri" pitchFamily="34" charset="0"/>
                   </a:rPr>
-                  <a:t>probabilities.</a:t>
+                  <a:t>probabilities</a:t>
                 </a:r>
+                <a:r>
+                  <a:rPr lang="en-US" sz="1667" dirty="0" smtClean="0">
+                    <a:latin typeface="Calibri" pitchFamily="34" charset="0"/>
+                  </a:rPr>
+                  <a:t>.</a:t>
+                </a:r>
+              </a:p>
+              <a:p>
+                <a:pPr marL="285750" eaLnBrk="1" hangingPunct="1"/>
+                <a:endParaRPr lang="en-US" sz="1667" dirty="0">
+                  <a:latin typeface="Calibri" pitchFamily="34" charset="0"/>
+                </a:endParaRPr>
+              </a:p>
+              <a:p>
+                <a:pPr marL="285750" eaLnBrk="1" hangingPunct="1"/>
+                <a:endParaRPr lang="en-US" sz="1667" dirty="0" smtClean="0">
+                  <a:latin typeface="Calibri" pitchFamily="34" charset="0"/>
+                </a:endParaRPr>
+              </a:p>
+              <a:p>
+                <a:pPr marL="285750" eaLnBrk="1" hangingPunct="1"/>
+                <a:endParaRPr lang="en-US" sz="1667" dirty="0" smtClean="0">
+                  <a:latin typeface="Calibri" pitchFamily="34" charset="0"/>
+                </a:endParaRPr>
+              </a:p>
+              <a:p>
+                <a:pPr marL="285750" eaLnBrk="1" hangingPunct="1"/>
+                <a:endParaRPr lang="en-US" sz="1667" dirty="0">
+                  <a:latin typeface="Calibri" pitchFamily="34" charset="0"/>
+                </a:endParaRPr>
+              </a:p>
+              <a:p>
+                <a:pPr marL="285750" eaLnBrk="1" hangingPunct="1"/>
+                <a:endParaRPr lang="en-US" sz="1667" dirty="0">
+                  <a:latin typeface="Calibri" pitchFamily="34" charset="0"/>
+                </a:endParaRPr>
+              </a:p>
+              <a:p>
+                <a:pPr marL="285750" eaLnBrk="1" hangingPunct="1"/>
+                <a:endParaRPr lang="en-US" sz="1667" dirty="0" smtClean="0">
+                  <a:latin typeface="Calibri" pitchFamily="34" charset="0"/>
+                </a:endParaRPr>
+              </a:p>
+              <a:p>
+                <a:pPr marL="285750" eaLnBrk="1" hangingPunct="1"/>
+                <a:endParaRPr lang="en-US" sz="1667" dirty="0">
+                  <a:latin typeface="Calibri" pitchFamily="34" charset="0"/>
+                </a:endParaRPr>
+              </a:p>
+              <a:p>
+                <a:pPr marL="285750" eaLnBrk="1" hangingPunct="1"/>
+                <a:endParaRPr lang="en-US" sz="1667" dirty="0" smtClean="0">
+                  <a:latin typeface="Calibri" pitchFamily="34" charset="0"/>
+                </a:endParaRPr>
+              </a:p>
+              <a:p>
+                <a:pPr marL="285750" eaLnBrk="1" hangingPunct="1"/>
+                <a:endParaRPr lang="en-US" sz="1050" dirty="0">
+                  <a:latin typeface="Calibri" pitchFamily="34" charset="0"/>
+                </a:endParaRPr>
+              </a:p>
+              <a:p>
+                <a:pPr marL="285750" eaLnBrk="1" hangingPunct="1"/>
+                <a:endParaRPr lang="en-US" sz="1667" dirty="0" smtClean="0">
+                  <a:latin typeface="Calibri" pitchFamily="34" charset="0"/>
+                </a:endParaRPr>
+              </a:p>
+              <a:p>
+                <a:pPr marL="285750" eaLnBrk="1" hangingPunct="1"/>
                 <a:endParaRPr lang="en-US" sz="1667" dirty="0">
                   <a:latin typeface="Calibri" pitchFamily="34" charset="0"/>
                 </a:endParaRPr>
@@ -4326,7 +4314,7 @@
                         <m:dPr>
                           <m:ctrlPr>
                             <a:rPr lang="en-US" sz="1667" b="0" i="1" smtClean="0">
-                              <a:latin typeface="Cambria Math" panose="02040503050406030204" pitchFamily="18" charset="0"/>
+                              <a:latin typeface="Cambria Math" charset="0"/>
                             </a:rPr>
                           </m:ctrlPr>
                         </m:dPr>
@@ -4382,7 +4370,7 @@
                           <m:chr m:val="∏"/>
                           <m:ctrlPr>
                             <a:rPr lang="en-US" sz="1667" b="0" i="1" smtClean="0">
-                              <a:latin typeface="Cambria Math" panose="02040503050406030204" pitchFamily="18" charset="0"/>
+                              <a:latin typeface="Cambria Math" charset="0"/>
                             </a:rPr>
                           </m:ctrlPr>
                         </m:naryPr>
@@ -4425,7 +4413,7 @@
                             <m:dPr>
                               <m:ctrlPr>
                                 <a:rPr lang="en-US" sz="1667" b="0" i="1" smtClean="0">
-                                  <a:latin typeface="Cambria Math" panose="02040503050406030204" pitchFamily="18" charset="0"/>
+                                  <a:latin typeface="Cambria Math" charset="0"/>
                                 </a:rPr>
                               </m:ctrlPr>
                             </m:dPr>
@@ -4434,7 +4422,7 @@
                                 <m:sSubPr>
                                   <m:ctrlPr>
                                     <a:rPr lang="en-US" sz="1667" b="0" i="1" smtClean="0">
-                                      <a:latin typeface="Cambria Math" panose="02040503050406030204" pitchFamily="18" charset="0"/>
+                                      <a:latin typeface="Cambria Math" charset="0"/>
                                     </a:rPr>
                                   </m:ctrlPr>
                                 </m:sSubPr>
@@ -4461,7 +4449,7 @@
                                 <m:sSubPr>
                                   <m:ctrlPr>
                                     <a:rPr lang="en-US" sz="1667" b="0" i="1" smtClean="0">
-                                      <a:latin typeface="Cambria Math" panose="02040503050406030204" pitchFamily="18" charset="0"/>
+                                      <a:latin typeface="Cambria Math" charset="0"/>
                                     </a:rPr>
                                   </m:ctrlPr>
                                 </m:sSubPr>
@@ -4492,7 +4480,7 @@
                                 <m:sSubPr>
                                   <m:ctrlPr>
                                     <a:rPr lang="en-US" sz="1667" b="0" i="1" smtClean="0">
-                                      <a:latin typeface="Cambria Math" panose="02040503050406030204" pitchFamily="18" charset="0"/>
+                                      <a:latin typeface="Cambria Math" charset="0"/>
                                     </a:rPr>
                                   </m:ctrlPr>
                                 </m:sSubPr>
@@ -4525,7 +4513,7 @@
                             <m:dPr>
                               <m:ctrlPr>
                                 <a:rPr lang="en-US" sz="1667" b="0" i="1" smtClean="0">
-                                  <a:latin typeface="Cambria Math" panose="02040503050406030204" pitchFamily="18" charset="0"/>
+                                  <a:latin typeface="Cambria Math" charset="0"/>
                                 </a:rPr>
                               </m:ctrlPr>
                             </m:dPr>
@@ -4534,7 +4522,7 @@
                                 <m:sSubPr>
                                   <m:ctrlPr>
                                     <a:rPr lang="en-US" sz="1667" b="0" i="1" smtClean="0">
-                                      <a:latin typeface="Cambria Math" panose="02040503050406030204" pitchFamily="18" charset="0"/>
+                                      <a:latin typeface="Cambria Math" charset="0"/>
                                     </a:rPr>
                                   </m:ctrlPr>
                                 </m:sSubPr>
@@ -4567,7 +4555,7 @@
                                 <m:dPr>
                                   <m:ctrlPr>
                                     <a:rPr lang="en-US" sz="1667" b="0" i="1" smtClean="0">
-                                      <a:latin typeface="Cambria Math" panose="02040503050406030204" pitchFamily="18" charset="0"/>
+                                      <a:latin typeface="Cambria Math" charset="0"/>
                                     </a:rPr>
                                   </m:ctrlPr>
                                 </m:dPr>
@@ -4576,7 +4564,7 @@
                                     <m:sSubPr>
                                       <m:ctrlPr>
                                         <a:rPr lang="en-US" sz="1667" b="0" i="1" smtClean="0">
-                                          <a:latin typeface="Cambria Math" panose="02040503050406030204" pitchFamily="18" charset="0"/>
+                                          <a:latin typeface="Cambria Math" charset="0"/>
                                         </a:rPr>
                                       </m:ctrlPr>
                                     </m:sSubPr>
@@ -4609,7 +4597,7 @@
                                 <m:sSubPr>
                                   <m:ctrlPr>
                                     <a:rPr lang="en-US" sz="1667" b="0" i="1" smtClean="0">
-                                      <a:latin typeface="Cambria Math" panose="02040503050406030204" pitchFamily="18" charset="0"/>
+                                      <a:latin typeface="Cambria Math" charset="0"/>
                                     </a:rPr>
                                   </m:ctrlPr>
                                 </m:sSubPr>
@@ -4640,7 +4628,7 @@
                                 <m:sSubPr>
                                   <m:ctrlPr>
                                     <a:rPr lang="en-US" sz="1667" b="0" i="1" smtClean="0">
-                                      <a:latin typeface="Cambria Math" panose="02040503050406030204" pitchFamily="18" charset="0"/>
+                                      <a:latin typeface="Cambria Math" charset="0"/>
                                     </a:rPr>
                                   </m:ctrlPr>
                                 </m:sSubPr>
@@ -4671,7 +4659,7 @@
                                 <m:sSubPr>
                                   <m:ctrlPr>
                                     <a:rPr lang="en-US" sz="1667" b="0" i="1" smtClean="0">
-                                      <a:latin typeface="Cambria Math" panose="02040503050406030204" pitchFamily="18" charset="0"/>
+                                      <a:latin typeface="Cambria Math" charset="0"/>
                                     </a:rPr>
                                   </m:ctrlPr>
                                 </m:sSubPr>
@@ -4702,7 +4690,7 @@
                                 <m:sSubPr>
                                   <m:ctrlPr>
                                     <a:rPr lang="en-US" sz="1667" b="0" i="1" smtClean="0">
-                                      <a:latin typeface="Cambria Math" panose="02040503050406030204" pitchFamily="18" charset="0"/>
+                                      <a:latin typeface="Cambria Math" charset="0"/>
                                     </a:rPr>
                                   </m:ctrlPr>
                                 </m:sSubPr>
@@ -4735,7 +4723,7 @@
                             <m:sSubPr>
                               <m:ctrlPr>
                                 <a:rPr lang="en-US" sz="1667" b="0" i="1" smtClean="0">
-                                  <a:latin typeface="Cambria Math" panose="02040503050406030204" pitchFamily="18" charset="0"/>
+                                  <a:latin typeface="Cambria Math" charset="0"/>
                                 </a:rPr>
                               </m:ctrlPr>
                             </m:sSubPr>
@@ -4915,7 +4903,7 @@
             </p:txBody>
           </p:sp>
         </mc:Choice>
-        <mc:Fallback xmlns="">
+        <mc:Fallback>
           <p:sp>
             <p:nvSpPr>
               <p:cNvPr id="13" name="Text Box 192"/>
@@ -4927,7 +4915,7 @@
             <p:spPr bwMode="auto">
               <a:xfrm>
                 <a:off x="9601200" y="3048000"/>
-                <a:ext cx="8229600" cy="12729167"/>
+                <a:ext cx="8229600" cy="12472623"/>
               </a:xfrm>
               <a:prstGeom prst="rect">
                 <a:avLst/>
@@ -5408,7 +5396,7 @@
         <p:spPr bwMode="auto">
           <a:xfrm>
             <a:off x="914400" y="6129235"/>
-            <a:ext cx="8229600" cy="3243365"/>
+            <a:ext cx="8229600" cy="2730276"/>
           </a:xfrm>
           <a:prstGeom prst="rect">
             <a:avLst/>
@@ -5536,7 +5524,19 @@
               <a:rPr lang="en-US" sz="1667" dirty="0">
                 <a:latin typeface="+mn-lt"/>
               </a:rPr>
-              <a:t>Keystroke pattern and dynamics classification is an important application of machine learning to computer security and authentication. Much of existing literature focuses on traditional computer keyboard dynamics analysis, but the massive increase in popularity and computing power of mobile devices in the last ten years has spurred significant interest in biometric-focused authentication models for </a:t>
+              <a:t>Keystroke pattern and dynamics classification is an important application of machine learning to computer security and authentication. </a:t>
+            </a:r>
+            <a:r>
+              <a:rPr lang="en-US" sz="1667" dirty="0" smtClean="0">
+                <a:latin typeface="+mn-lt"/>
+              </a:rPr>
+              <a:t>The massive </a:t>
+            </a:r>
+            <a:r>
+              <a:rPr lang="en-US" sz="1667" dirty="0">
+                <a:latin typeface="+mn-lt"/>
+              </a:rPr>
+              <a:t>increase in popularity and computing power of mobile devices in the last ten years has spurred significant interest in biometric-focused authentication models for </a:t>
             </a:r>
             <a:r>
               <a:rPr lang="en-US" sz="1667" b="1" dirty="0">
@@ -5557,10 +5557,16 @@
               <a:buChar char="•"/>
             </a:pPr>
             <a:r>
+              <a:rPr lang="en-US" sz="1667" dirty="0" smtClean="0">
+                <a:latin typeface="+mn-lt"/>
+              </a:rPr>
+              <a:t>As </a:t>
+            </a:r>
+            <a:r>
               <a:rPr lang="en-US" sz="1667" dirty="0">
                 <a:latin typeface="+mn-lt"/>
               </a:rPr>
-              <a:t>Existing literature emphasizes need for more nuanced security protocols in personal devices. As mobile devices store increasingly valuable and confidential information, learning classifiers to detect fraud is becoming ever more applicable and important. However, it still remains to be seen how robust these user verification classifiers are against general attacks by malicious agents. To this end, we generate attacks against user verification classifiers using mobile biometrics data, performing </a:t>
+              <a:t>mobile devices store increasingly valuable and confidential information, learning classifiers to detect fraud is becoming ever more applicable and important. However, it still remains to be seen how robust these user verification classifiers are against general attacks by malicious agents. To this end, we generate attacks against user verification classifiers using mobile biometrics data, performing </a:t>
             </a:r>
             <a:r>
               <a:rPr lang="en-US" sz="1667" b="1" dirty="0">
@@ -5585,7 +5591,7 @@
         </p:nvSpPr>
         <p:spPr>
           <a:xfrm>
-            <a:off x="914400" y="9596073"/>
+            <a:off x="914400" y="9054534"/>
             <a:ext cx="8229600" cy="381000"/>
           </a:xfrm>
           <a:prstGeom prst="rect">
@@ -5628,8 +5634,27 @@
                   </a:schemeClr>
                 </a:solidFill>
               </a:rPr>
-              <a:t>Data processing</a:t>
-            </a:r>
+              <a:t>Data </a:t>
+            </a:r>
+            <a:r>
+              <a:rPr lang="en-US" sz="2667" b="1" dirty="0" smtClean="0">
+                <a:solidFill>
+                  <a:schemeClr val="accent3">
+                    <a:lumMod val="20000"/>
+                    <a:lumOff val="80000"/>
+                  </a:schemeClr>
+                </a:solidFill>
+              </a:rPr>
+              <a:t> and Classifiers</a:t>
+            </a:r>
+            <a:endParaRPr lang="en-US" sz="2667" b="1" dirty="0">
+              <a:solidFill>
+                <a:schemeClr val="accent3">
+                  <a:lumMod val="20000"/>
+                  <a:lumOff val="80000"/>
+                </a:schemeClr>
+              </a:solidFill>
+            </a:endParaRPr>
           </a:p>
         </p:txBody>
       </p:sp>
@@ -5643,8 +5668,8 @@
         </p:nvSpPr>
         <p:spPr bwMode="auto">
           <a:xfrm>
-            <a:off x="914400" y="9977075"/>
-            <a:ext cx="8229600" cy="5808811"/>
+            <a:off x="914400" y="9435536"/>
+            <a:ext cx="8229600" cy="6321900"/>
           </a:xfrm>
           <a:prstGeom prst="rect">
             <a:avLst/>
@@ -5798,8 +5823,18 @@
                 <a:latin typeface="Courier New" panose="02070309020205020404" pitchFamily="49" charset="0"/>
                 <a:cs typeface="Courier New" panose="02070309020205020404" pitchFamily="49" charset="0"/>
               </a:rPr>
-              <a:t>Hold, Up-Down, Down-Down, Pressure, Finger-Area, Average Hold, Average Pressure, Average Area.</a:t>
-            </a:r>
+              <a:t>Hold, Up-Down, Down-Down, Pressure, Finger-Area, Average Hold, Average Pressure, Average Area</a:t>
+            </a:r>
+            <a:r>
+              <a:rPr lang="en-US" sz="1667" dirty="0" smtClean="0">
+                <a:latin typeface="Courier New" panose="02070309020205020404" pitchFamily="49" charset="0"/>
+                <a:cs typeface="Courier New" panose="02070309020205020404" pitchFamily="49" charset="0"/>
+              </a:rPr>
+              <a:t>.</a:t>
+            </a:r>
+            <a:endParaRPr lang="en-US" sz="1667" dirty="0" smtClean="0">
+              <a:latin typeface="+mj-lt"/>
+            </a:endParaRPr>
           </a:p>
           <a:p>
             <a:pPr marL="285750" indent="-285750" eaLnBrk="1" hangingPunct="1">
@@ -5807,52 +5842,46 @@
               <a:buChar char="•"/>
             </a:pPr>
             <a:r>
+              <a:rPr lang="en-US" sz="1667" dirty="0" smtClean="0">
+                <a:latin typeface="+mj-lt"/>
+              </a:rPr>
+              <a:t>We trained </a:t>
+            </a:r>
+            <a:r>
               <a:rPr lang="en-US" sz="1667" dirty="0">
                 <a:latin typeface="+mj-lt"/>
               </a:rPr>
-              <a:t>We implemented a </a:t>
-            </a:r>
-            <a:r>
-              <a:rPr lang="en-US" sz="1667" b="1" dirty="0">
+              <a:t>a variety of binary classifiers </a:t>
+            </a:r>
+            <a:r>
+              <a:rPr lang="en-US" sz="1667" dirty="0" smtClean="0">
                 <a:latin typeface="+mj-lt"/>
               </a:rPr>
-              <a:t>flexible resampling </a:t>
+              <a:t> to detect if the concatenation </a:t>
             </a:r>
             <a:r>
               <a:rPr lang="en-US" sz="1667" dirty="0">
                 <a:latin typeface="+mj-lt"/>
               </a:rPr>
-              <a:t>framework that can utilize a variety of </a:t>
-            </a:r>
-            <a:r>
-              <a:rPr lang="en-US" sz="1667" dirty="0" err="1">
+              <a:t>the feature vectors of two </a:t>
+            </a:r>
+            <a:r>
+              <a:rPr lang="en-US" sz="1667" dirty="0" smtClean="0">
                 <a:latin typeface="+mj-lt"/>
               </a:rPr>
-              <a:t>undersampling</a:t>
+              <a:t>data-points, forming a vector 142 features, was typed by the same user or not. </a:t>
             </a:r>
             <a:r>
               <a:rPr lang="en-US" sz="1667" dirty="0">
                 <a:latin typeface="+mj-lt"/>
               </a:rPr>
-              <a:t> and oversampling methods to </a:t>
-            </a:r>
-            <a:r>
-              <a:rPr lang="en-US" sz="1667" dirty="0" err="1">
-                <a:latin typeface="+mj-lt"/>
-              </a:rPr>
-              <a:t>undersample</a:t>
-            </a:r>
-            <a:r>
-              <a:rPr lang="en-US" sz="1667" dirty="0">
-                <a:latin typeface="+mj-lt"/>
-              </a:rPr>
-              <a:t> the majority class and oversample the minority class as necessary. This ensures parity between labels of different user and same user in the training data</a:t>
+              <a:t>This allowed us to </a:t>
             </a:r>
             <a:r>
               <a:rPr lang="en-US" sz="1667" dirty="0" smtClean="0">
                 <a:latin typeface="+mj-lt"/>
               </a:rPr>
-              <a:t>.</a:t>
+              <a:t>train one model and have it generalize user verification to any new users not from the training dataset, as long as we one at least one keystroke record for any new users.</a:t>
             </a:r>
           </a:p>
           <a:p>
@@ -5864,29 +5893,59 @@
               <a:rPr lang="en-US" sz="1667" dirty="0" smtClean="0">
                 <a:latin typeface="+mj-lt"/>
               </a:rPr>
-              <a:t>We further transformed our data by concatenating the feature vectors of two </a:t>
-            </a:r>
-            <a:r>
-              <a:rPr lang="en-US" sz="1667" dirty="0" err="1" smtClean="0">
-                <a:latin typeface="+mj-lt"/>
-              </a:rPr>
-              <a:t>datapoints</a:t>
+              <a:t>As part of data processing we </a:t>
             </a:r>
             <a:r>
               <a:rPr lang="en-US" sz="1667" dirty="0">
                 <a:latin typeface="+mj-lt"/>
               </a:rPr>
-              <a:t> </a:t>
-            </a:r>
-            <a:r>
-              <a:rPr lang="en-US" sz="1667" dirty="0" smtClean="0">
+              <a:t>implemented a flexible </a:t>
+            </a:r>
+            <a:r>
+              <a:rPr lang="en-US" sz="1667" b="1" dirty="0">
                 <a:latin typeface="+mj-lt"/>
               </a:rPr>
-              <a:t>to form a vector of 142 features. This allowed us to augment our dataset and train our model to differentiate two feature vectors.</a:t>
-            </a:r>
-          </a:p>
-          <a:p>
-            <a:pPr eaLnBrk="1" hangingPunct="1"/>
+              <a:t>resampling framework </a:t>
+            </a:r>
+            <a:r>
+              <a:rPr lang="en-US" sz="1667" dirty="0">
+                <a:latin typeface="+mj-lt"/>
+              </a:rPr>
+              <a:t>that can utilize a variety of </a:t>
+            </a:r>
+            <a:r>
+              <a:rPr lang="en-US" sz="1667" dirty="0" err="1">
+                <a:latin typeface="+mj-lt"/>
+              </a:rPr>
+              <a:t>undersampling</a:t>
+            </a:r>
+            <a:r>
+              <a:rPr lang="en-US" sz="1667" dirty="0">
+                <a:latin typeface="+mj-lt"/>
+              </a:rPr>
+              <a:t> and oversampling methods to </a:t>
+            </a:r>
+            <a:r>
+              <a:rPr lang="en-US" sz="1667" dirty="0" err="1">
+                <a:latin typeface="+mj-lt"/>
+              </a:rPr>
+              <a:t>undersample</a:t>
+            </a:r>
+            <a:r>
+              <a:rPr lang="en-US" sz="1667" dirty="0">
+                <a:latin typeface="+mj-lt"/>
+              </a:rPr>
+              <a:t> the majority class and oversample the minority class as necessary. This ensures parity between labels of different user and same user in the training data.</a:t>
+            </a:r>
+            <a:endParaRPr lang="en-US" sz="1667" dirty="0" smtClean="0">
+              <a:latin typeface="+mj-lt"/>
+            </a:endParaRPr>
+          </a:p>
+          <a:p>
+            <a:pPr marL="285750" indent="-285750" eaLnBrk="1" hangingPunct="1">
+              <a:buFont typeface="Arial" panose="020B0604020202020204" pitchFamily="34" charset="0"/>
+              <a:buChar char="•"/>
+            </a:pPr>
             <a:endParaRPr lang="en-US" sz="1667" dirty="0" smtClean="0">
               <a:latin typeface="+mj-lt"/>
             </a:endParaRPr>
@@ -6061,7 +6120,7 @@
       </p:pic>
       <p:pic>
         <p:nvPicPr>
-          <p:cNvPr id="3" name="Picture 2"/>
+          <p:cNvPr id="7" name="Picture 6"/>
           <p:cNvPicPr>
             <a:picLocks noChangeAspect="1"/>
           </p:cNvPicPr>
@@ -6081,37 +6140,7 @@
         </p:blipFill>
         <p:spPr>
           <a:xfrm>
-            <a:off x="10791825" y="2857500"/>
-            <a:ext cx="5848350" cy="3368160"/>
-          </a:xfrm>
-          <a:prstGeom prst="rect">
-            <a:avLst/>
-          </a:prstGeom>
-        </p:spPr>
-      </p:pic>
-      <p:pic>
-        <p:nvPicPr>
-          <p:cNvPr id="7" name="Picture 6"/>
-          <p:cNvPicPr>
-            <a:picLocks noChangeAspect="1"/>
-          </p:cNvPicPr>
-          <p:nvPr/>
-        </p:nvPicPr>
-        <p:blipFill>
-          <a:blip r:embed="rId6">
-            <a:extLst>
-              <a:ext uri="{28A0092B-C50C-407E-A947-70E740481C1C}">
-                <a14:useLocalDpi xmlns:a14="http://schemas.microsoft.com/office/drawing/2010/main" val="0"/>
-              </a:ext>
-            </a:extLst>
-          </a:blip>
-          <a:stretch>
-            <a:fillRect/>
-          </a:stretch>
-        </p:blipFill>
-        <p:spPr>
-          <a:xfrm>
-            <a:off x="10033940" y="12291541"/>
+            <a:off x="9827730" y="11963400"/>
             <a:ext cx="3895420" cy="3470386"/>
           </a:xfrm>
           <a:prstGeom prst="rect">
@@ -6127,7 +6156,7 @@
         </p:nvSpPr>
         <p:spPr>
           <a:xfrm>
-            <a:off x="13949680" y="12626350"/>
+            <a:off x="13933970" y="12496800"/>
             <a:ext cx="3515830" cy="2800767"/>
           </a:xfrm>
           <a:prstGeom prst="rect">
@@ -6143,7 +6172,11 @@
           <a:p>
             <a:r>
               <a:rPr lang="en-US" sz="1600" b="1" dirty="0"/>
-              <a:t>Figure 1. </a:t>
+              <a:t>Figure </a:t>
+            </a:r>
+            <a:r>
+              <a:rPr lang="en-US" sz="1600" b="1" dirty="0" smtClean="0"/>
+              <a:t>3. </a:t>
             </a:r>
             <a:r>
               <a:rPr lang="en-US" sz="1600" dirty="0"/>
@@ -6181,938 +6214,6 @@
           </a:p>
         </p:txBody>
       </p:sp>
-      <p:grpSp>
-        <p:nvGrpSpPr>
-          <p:cNvPr id="22" name="Group 21"/>
-          <p:cNvGrpSpPr/>
-          <p:nvPr/>
-        </p:nvGrpSpPr>
-        <p:grpSpPr>
-          <a:xfrm>
-            <a:off x="897300" y="13275646"/>
-            <a:ext cx="8094300" cy="2526446"/>
-            <a:chOff x="608212" y="13194445"/>
-            <a:chExt cx="8094300" cy="2526446"/>
-          </a:xfrm>
-        </p:grpSpPr>
-        <p:graphicFrame>
-          <p:nvGraphicFramePr>
-            <p:cNvPr id="37" name="Content Placeholder 114" descr="Sample table with 4 columns, 7 rows." title="Sample Table"/>
-            <p:cNvGraphicFramePr>
-              <a:graphicFrameLocks/>
-            </p:cNvGraphicFramePr>
-            <p:nvPr>
-              <p:extLst>
-                <p:ext uri="{D42A27DB-BD31-4B8C-83A1-F6EECF244321}">
-                  <p14:modId xmlns:p14="http://schemas.microsoft.com/office/powerpoint/2010/main" val="2947269841"/>
-                </p:ext>
-              </p:extLst>
-            </p:nvPr>
-          </p:nvGraphicFramePr>
-          <p:xfrm>
-            <a:off x="2667000" y="13872284"/>
-            <a:ext cx="6035512" cy="1443916"/>
-          </p:xfrm>
-          <a:graphic>
-            <a:graphicData uri="http://schemas.openxmlformats.org/drawingml/2006/table">
-              <a:tbl>
-                <a:tblPr firstRow="1" bandRow="1">
-                  <a:tableStyleId>{F5AB1C69-6EDB-4FF4-983F-18BD219EF322}</a:tableStyleId>
-                </a:tblPr>
-                <a:tblGrid>
-                  <a:gridCol w="1508878">
-                    <a:extLst>
-                      <a:ext uri="{9D8B030D-6E8A-4147-A177-3AD203B41FA5}">
-                        <a16:colId xmlns:a16="http://schemas.microsoft.com/office/drawing/2014/main" xmlns="" val="20000"/>
-                      </a:ext>
-                    </a:extLst>
-                  </a:gridCol>
-                  <a:gridCol w="1508878">
-                    <a:extLst>
-                      <a:ext uri="{9D8B030D-6E8A-4147-A177-3AD203B41FA5}">
-                        <a16:colId xmlns:a16="http://schemas.microsoft.com/office/drawing/2014/main" xmlns="" val="20001"/>
-                      </a:ext>
-                    </a:extLst>
-                  </a:gridCol>
-                  <a:gridCol w="1508878">
-                    <a:extLst>
-                      <a:ext uri="{9D8B030D-6E8A-4147-A177-3AD203B41FA5}">
-                        <a16:colId xmlns:a16="http://schemas.microsoft.com/office/drawing/2014/main" xmlns="" val="20002"/>
-                      </a:ext>
-                    </a:extLst>
-                  </a:gridCol>
-                  <a:gridCol w="1508878">
-                    <a:extLst>
-                      <a:ext uri="{9D8B030D-6E8A-4147-A177-3AD203B41FA5}">
-                        <a16:colId xmlns:a16="http://schemas.microsoft.com/office/drawing/2014/main" xmlns="" val="20003"/>
-                      </a:ext>
-                    </a:extLst>
-                  </a:gridCol>
-                </a:tblGrid>
-                <a:tr h="360979">
-                  <a:tc>
-                    <a:txBody>
-                      <a:bodyPr/>
-                      <a:lstStyle/>
-                      <a:p>
-                        <a:pPr algn="ctr"/>
-                        <a:r>
-                          <a:rPr lang="en-US" sz="2000" dirty="0"/>
-                          <a:t>Subject</a:t>
-                        </a:r>
-                      </a:p>
-                    </a:txBody>
-                    <a:tcPr marL="76200" marR="76200" marT="19051" marB="19051" anchor="ctr">
-                      <a:solidFill>
-                        <a:schemeClr val="accent1">
-                          <a:lumMod val="75000"/>
-                        </a:schemeClr>
-                      </a:solidFill>
-                    </a:tcPr>
-                  </a:tc>
-                  <a:tc>
-                    <a:txBody>
-                      <a:bodyPr/>
-                      <a:lstStyle/>
-                      <a:p>
-                        <a:pPr algn="ctr"/>
-                        <a:r>
-                          <a:rPr lang="en-US" sz="2000" dirty="0"/>
-                          <a:t>Hold .</a:t>
-                        </a:r>
-                      </a:p>
-                    </a:txBody>
-                    <a:tcPr marL="76200" marR="76200" marT="19051" marB="19051" anchor="ctr">
-                      <a:solidFill>
-                        <a:schemeClr val="accent1">
-                          <a:lumMod val="75000"/>
-                        </a:schemeClr>
-                      </a:solidFill>
-                    </a:tcPr>
-                  </a:tc>
-                  <a:tc>
-                    <a:txBody>
-                      <a:bodyPr/>
-                      <a:lstStyle/>
-                      <a:p>
-                        <a:pPr algn="ctr"/>
-                        <a:r>
-                          <a:rPr lang="en-US" sz="2000" dirty="0"/>
-                          <a:t>...</a:t>
-                        </a:r>
-                      </a:p>
-                    </a:txBody>
-                    <a:tcPr marL="76200" marR="76200" marT="19051" marB="19051" anchor="ctr">
-                      <a:solidFill>
-                        <a:schemeClr val="accent1">
-                          <a:lumMod val="75000"/>
-                        </a:schemeClr>
-                      </a:solidFill>
-                    </a:tcPr>
-                  </a:tc>
-                  <a:tc>
-                    <a:txBody>
-                      <a:bodyPr/>
-                      <a:lstStyle/>
-                      <a:p>
-                        <a:pPr algn="ctr"/>
-                        <a:r>
-                          <a:rPr lang="en-US" sz="2000" dirty="0" err="1"/>
-                          <a:t>AvA</a:t>
-                        </a:r>
-                        <a:endParaRPr lang="en-US" sz="2000" dirty="0"/>
-                      </a:p>
-                    </a:txBody>
-                    <a:tcPr marL="76200" marR="76200" marT="19051" marB="19051" anchor="ctr">
-                      <a:solidFill>
-                        <a:schemeClr val="accent1">
-                          <a:lumMod val="75000"/>
-                        </a:schemeClr>
-                      </a:solidFill>
-                    </a:tcPr>
-                  </a:tc>
-                  <a:extLst>
-                    <a:ext uri="{0D108BD9-81ED-4DB2-BD59-A6C34878D82A}">
-                      <a16:rowId xmlns:a16="http://schemas.microsoft.com/office/drawing/2014/main" xmlns="" val="10000"/>
-                    </a:ext>
-                  </a:extLst>
-                </a:tr>
-                <a:tr h="360979">
-                  <a:tc>
-                    <a:txBody>
-                      <a:bodyPr/>
-                      <a:lstStyle/>
-                      <a:p>
-                        <a:pPr algn="ctr"/>
-                        <a:r>
-                          <a:rPr lang="en-US" sz="2000" dirty="0"/>
-                          <a:t>1</a:t>
-                        </a:r>
-                      </a:p>
-                    </a:txBody>
-                    <a:tcPr marL="76200" marR="76200" marT="19051" marB="19051" anchor="ctr"/>
-                  </a:tc>
-                  <a:tc>
-                    <a:txBody>
-                      <a:bodyPr/>
-                      <a:lstStyle/>
-                      <a:p>
-                        <a:pPr algn="ctr"/>
-                        <a:r>
-                          <a:rPr lang="en-US" sz="2000" dirty="0"/>
-                          <a:t>89</a:t>
-                        </a:r>
-                      </a:p>
-                    </a:txBody>
-                    <a:tcPr marL="76200" marR="76200" marT="19051" marB="19051" anchor="ctr"/>
-                  </a:tc>
-                  <a:tc>
-                    <a:txBody>
-                      <a:bodyPr/>
-                      <a:lstStyle/>
-                      <a:p>
-                        <a:pPr algn="ctr"/>
-                        <a:r>
-                          <a:rPr lang="en-US" sz="2000" dirty="0"/>
-                          <a:t>…</a:t>
-                        </a:r>
-                      </a:p>
-                    </a:txBody>
-                    <a:tcPr marL="76200" marR="76200" marT="19051" marB="19051" anchor="ctr"/>
-                  </a:tc>
-                  <a:tc>
-                    <a:txBody>
-                      <a:bodyPr/>
-                      <a:lstStyle/>
-                      <a:p>
-                        <a:pPr algn="ctr"/>
-                        <a:r>
-                          <a:rPr lang="en-US" sz="2000" dirty="0"/>
-                          <a:t>0.288018425</a:t>
-                        </a:r>
-                      </a:p>
-                    </a:txBody>
-                    <a:tcPr marL="76200" marR="76200" marT="19051" marB="19051" anchor="ctr"/>
-                  </a:tc>
-                  <a:extLst>
-                    <a:ext uri="{0D108BD9-81ED-4DB2-BD59-A6C34878D82A}">
-                      <a16:rowId xmlns:a16="http://schemas.microsoft.com/office/drawing/2014/main" xmlns="" val="10001"/>
-                    </a:ext>
-                  </a:extLst>
-                </a:tr>
-                <a:tr h="360979">
-                  <a:tc>
-                    <a:txBody>
-                      <a:bodyPr/>
-                      <a:lstStyle/>
-                      <a:p>
-                        <a:pPr algn="ctr"/>
-                        <a:r>
-                          <a:rPr lang="en-US" sz="2000" dirty="0"/>
-                          <a:t>…</a:t>
-                        </a:r>
-                      </a:p>
-                    </a:txBody>
-                    <a:tcPr marL="76200" marR="76200" marT="19051" marB="19051" anchor="ctr"/>
-                  </a:tc>
-                  <a:tc>
-                    <a:txBody>
-                      <a:bodyPr/>
-                      <a:lstStyle/>
-                      <a:p>
-                        <a:pPr algn="ctr"/>
-                        <a:r>
-                          <a:rPr lang="en-US" sz="2000" dirty="0"/>
-                          <a:t>…</a:t>
-                        </a:r>
-                      </a:p>
-                    </a:txBody>
-                    <a:tcPr marL="76200" marR="76200" marT="19051" marB="19051" anchor="ctr"/>
-                  </a:tc>
-                  <a:tc>
-                    <a:txBody>
-                      <a:bodyPr/>
-                      <a:lstStyle/>
-                      <a:p>
-                        <a:pPr algn="ctr"/>
-                        <a:r>
-                          <a:rPr lang="en-US" sz="2000" dirty="0"/>
-                          <a:t>…</a:t>
-                        </a:r>
-                      </a:p>
-                    </a:txBody>
-                    <a:tcPr marL="76200" marR="76200" marT="19051" marB="19051" anchor="ctr"/>
-                  </a:tc>
-                  <a:tc>
-                    <a:txBody>
-                      <a:bodyPr/>
-                      <a:lstStyle/>
-                      <a:p>
-                        <a:pPr algn="ctr"/>
-                        <a:r>
-                          <a:rPr lang="en-US" sz="2000" dirty="0"/>
-                          <a:t>…</a:t>
-                        </a:r>
-                      </a:p>
-                    </a:txBody>
-                    <a:tcPr marL="76200" marR="76200" marT="19051" marB="19051" anchor="ctr"/>
-                  </a:tc>
-                  <a:extLst>
-                    <a:ext uri="{0D108BD9-81ED-4DB2-BD59-A6C34878D82A}">
-                      <a16:rowId xmlns:a16="http://schemas.microsoft.com/office/drawing/2014/main" xmlns="" val="10002"/>
-                    </a:ext>
-                  </a:extLst>
-                </a:tr>
-                <a:tr h="360979">
-                  <a:tc>
-                    <a:txBody>
-                      <a:bodyPr/>
-                      <a:lstStyle/>
-                      <a:p>
-                        <a:pPr algn="ctr"/>
-                        <a:r>
-                          <a:rPr lang="en-US" sz="2000" dirty="0"/>
-                          <a:t>56</a:t>
-                        </a:r>
-                      </a:p>
-                    </a:txBody>
-                    <a:tcPr marL="76200" marR="76200" marT="19051" marB="19051" anchor="ctr"/>
-                  </a:tc>
-                  <a:tc>
-                    <a:txBody>
-                      <a:bodyPr/>
-                      <a:lstStyle/>
-                      <a:p>
-                        <a:pPr algn="ctr"/>
-                        <a:r>
-                          <a:rPr lang="en-US" sz="2000" dirty="0"/>
-                          <a:t>80</a:t>
-                        </a:r>
-                      </a:p>
-                    </a:txBody>
-                    <a:tcPr marL="76200" marR="76200" marT="19051" marB="19051" anchor="ctr"/>
-                  </a:tc>
-                  <a:tc>
-                    <a:txBody>
-                      <a:bodyPr/>
-                      <a:lstStyle/>
-                      <a:p>
-                        <a:pPr algn="ctr"/>
-                        <a:r>
-                          <a:rPr lang="en-US" sz="2000" dirty="0"/>
-                          <a:t>…</a:t>
-                        </a:r>
-                      </a:p>
-                    </a:txBody>
-                    <a:tcPr marL="76200" marR="76200" marT="19051" marB="19051" anchor="ctr"/>
-                  </a:tc>
-                  <a:tc>
-                    <a:txBody>
-                      <a:bodyPr/>
-                      <a:lstStyle/>
-                      <a:p>
-                        <a:pPr algn="ctr"/>
-                        <a:r>
-                          <a:rPr lang="en-US" sz="2000" dirty="0"/>
-                          <a:t>0.260369</a:t>
-                        </a:r>
-                      </a:p>
-                    </a:txBody>
-                    <a:tcPr marL="76200" marR="76200" marT="19051" marB="19051" anchor="ctr"/>
-                  </a:tc>
-                  <a:extLst>
-                    <a:ext uri="{0D108BD9-81ED-4DB2-BD59-A6C34878D82A}">
-                      <a16:rowId xmlns:a16="http://schemas.microsoft.com/office/drawing/2014/main" xmlns="" val="10003"/>
-                    </a:ext>
-                  </a:extLst>
-                </a:tr>
-              </a:tbl>
-            </a:graphicData>
-          </a:graphic>
-        </p:graphicFrame>
-        <p:sp>
-          <p:nvSpPr>
-            <p:cNvPr id="40" name="Text Box 180"/>
-            <p:cNvSpPr txBox="1">
-              <a:spLocks noChangeArrowheads="1"/>
-            </p:cNvSpPr>
-            <p:nvPr/>
-          </p:nvSpPr>
-          <p:spPr bwMode="auto">
-            <a:xfrm>
-              <a:off x="1447800" y="15433461"/>
-              <a:ext cx="7254712" cy="287430"/>
-            </a:xfrm>
-            <a:prstGeom prst="rect">
-              <a:avLst/>
-            </a:prstGeom>
-            <a:noFill/>
-            <a:ln>
-              <a:noFill/>
-            </a:ln>
-            <a:effectLst/>
-            <a:extLst>
-              <a:ext uri="{909E8E84-426E-40DD-AFC4-6F175D3DCCD1}">
-                <a14:hiddenFill xmlns:a14="http://schemas.microsoft.com/office/drawing/2010/main">
-                  <a:solidFill>
-                    <a:schemeClr val="accent1"/>
-                  </a:solidFill>
-                </a14:hiddenFill>
-              </a:ext>
-              <a:ext uri="{91240B29-F687-4F45-9708-019B960494DF}">
-                <a14:hiddenLine xmlns:a14="http://schemas.microsoft.com/office/drawing/2010/main" w="9525">
-                  <a:solidFill>
-                    <a:schemeClr val="tx1"/>
-                  </a:solidFill>
-                  <a:miter lim="800000"/>
-                  <a:headEnd/>
-                  <a:tailEnd/>
-                </a14:hiddenLine>
-              </a:ext>
-              <a:ext uri="{AF507438-7753-43E0-B8FC-AC1667EBCBE1}">
-                <a14:hiddenEffects xmlns:a14="http://schemas.microsoft.com/office/drawing/2010/main">
-                  <a:effectLst>
-                    <a:outerShdw dist="35921" dir="2700000" algn="ctr" rotWithShape="0">
-                      <a:schemeClr val="bg2"/>
-                    </a:outerShdw>
-                  </a:effectLst>
-                </a14:hiddenEffects>
-              </a:ext>
-            </a:extLst>
-          </p:spPr>
-          <p:txBody>
-            <a:bodyPr wrap="square" lIns="40809" tIns="20405" rIns="40809" bIns="20405">
-              <a:spAutoFit/>
-            </a:bodyPr>
-            <a:lstStyle>
-              <a:lvl1pPr defTabSz="4389438" eaLnBrk="0" hangingPunct="0">
-                <a:defRPr sz="2200">
-                  <a:solidFill>
-                    <a:schemeClr val="tx1"/>
-                  </a:solidFill>
-                  <a:latin typeface="Arial" charset="0"/>
-                </a:defRPr>
-              </a:lvl1pPr>
-              <a:lvl2pPr marL="742950" indent="-285750" defTabSz="4389438" eaLnBrk="0" hangingPunct="0">
-                <a:defRPr sz="2200">
-                  <a:solidFill>
-                    <a:schemeClr val="tx1"/>
-                  </a:solidFill>
-                  <a:latin typeface="Arial" charset="0"/>
-                </a:defRPr>
-              </a:lvl2pPr>
-              <a:lvl3pPr marL="1143000" indent="-228600" defTabSz="4389438" eaLnBrk="0" hangingPunct="0">
-                <a:defRPr sz="2200">
-                  <a:solidFill>
-                    <a:schemeClr val="tx1"/>
-                  </a:solidFill>
-                  <a:latin typeface="Arial" charset="0"/>
-                </a:defRPr>
-              </a:lvl3pPr>
-              <a:lvl4pPr marL="1600200" indent="-228600" defTabSz="4389438" eaLnBrk="0" hangingPunct="0">
-                <a:defRPr sz="2200">
-                  <a:solidFill>
-                    <a:schemeClr val="tx1"/>
-                  </a:solidFill>
-                  <a:latin typeface="Arial" charset="0"/>
-                </a:defRPr>
-              </a:lvl4pPr>
-              <a:lvl5pPr marL="2057400" indent="-228600" defTabSz="4389438" eaLnBrk="0" hangingPunct="0">
-                <a:defRPr sz="2200">
-                  <a:solidFill>
-                    <a:schemeClr val="tx1"/>
-                  </a:solidFill>
-                  <a:latin typeface="Arial" charset="0"/>
-                </a:defRPr>
-              </a:lvl5pPr>
-              <a:lvl6pPr marL="2514600" indent="-228600" defTabSz="4389438" eaLnBrk="0" fontAlgn="base" hangingPunct="0">
-                <a:spcBef>
-                  <a:spcPct val="0"/>
-                </a:spcBef>
-                <a:spcAft>
-                  <a:spcPct val="0"/>
-                </a:spcAft>
-                <a:defRPr sz="2200">
-                  <a:solidFill>
-                    <a:schemeClr val="tx1"/>
-                  </a:solidFill>
-                  <a:latin typeface="Arial" charset="0"/>
-                </a:defRPr>
-              </a:lvl6pPr>
-              <a:lvl7pPr marL="2971800" indent="-228600" defTabSz="4389438" eaLnBrk="0" fontAlgn="base" hangingPunct="0">
-                <a:spcBef>
-                  <a:spcPct val="0"/>
-                </a:spcBef>
-                <a:spcAft>
-                  <a:spcPct val="0"/>
-                </a:spcAft>
-                <a:defRPr sz="2200">
-                  <a:solidFill>
-                    <a:schemeClr val="tx1"/>
-                  </a:solidFill>
-                  <a:latin typeface="Arial" charset="0"/>
-                </a:defRPr>
-              </a:lvl7pPr>
-              <a:lvl8pPr marL="3429000" indent="-228600" defTabSz="4389438" eaLnBrk="0" fontAlgn="base" hangingPunct="0">
-                <a:spcBef>
-                  <a:spcPct val="0"/>
-                </a:spcBef>
-                <a:spcAft>
-                  <a:spcPct val="0"/>
-                </a:spcAft>
-                <a:defRPr sz="2200">
-                  <a:solidFill>
-                    <a:schemeClr val="tx1"/>
-                  </a:solidFill>
-                  <a:latin typeface="Arial" charset="0"/>
-                </a:defRPr>
-              </a:lvl8pPr>
-              <a:lvl9pPr marL="3886200" indent="-228600" defTabSz="4389438" eaLnBrk="0" fontAlgn="base" hangingPunct="0">
-                <a:spcBef>
-                  <a:spcPct val="0"/>
-                </a:spcBef>
-                <a:spcAft>
-                  <a:spcPct val="0"/>
-                </a:spcAft>
-                <a:defRPr sz="2200">
-                  <a:solidFill>
-                    <a:schemeClr val="tx1"/>
-                  </a:solidFill>
-                  <a:latin typeface="Arial" charset="0"/>
-                </a:defRPr>
-              </a:lvl9pPr>
-            </a:lstStyle>
-            <a:p>
-              <a:pPr algn="ctr" eaLnBrk="1" hangingPunct="1"/>
-              <a:r>
-                <a:rPr lang="en-US" sz="1600" b="1" dirty="0">
-                  <a:latin typeface="Calibri" pitchFamily="34" charset="0"/>
-                </a:rPr>
-                <a:t>Table 1.</a:t>
-              </a:r>
-              <a:r>
-                <a:rPr lang="en-US" sz="1600" dirty="0">
-                  <a:latin typeface="Calibri" pitchFamily="34" charset="0"/>
-                </a:rPr>
-                <a:t> Feature vector format.</a:t>
-              </a:r>
-            </a:p>
-          </p:txBody>
-        </p:sp>
-        <p:sp>
-          <p:nvSpPr>
-            <p:cNvPr id="21" name="Left Brace 20"/>
-            <p:cNvSpPr/>
-            <p:nvPr/>
-          </p:nvSpPr>
-          <p:spPr>
-            <a:xfrm>
-              <a:off x="2328079" y="14211545"/>
-              <a:ext cx="186522" cy="1104655"/>
-            </a:xfrm>
-            <a:prstGeom prst="leftBrace">
-              <a:avLst/>
-            </a:prstGeom>
-            <a:ln w="38100"/>
-          </p:spPr>
-          <p:style>
-            <a:lnRef idx="1">
-              <a:schemeClr val="dk1"/>
-            </a:lnRef>
-            <a:fillRef idx="0">
-              <a:schemeClr val="dk1"/>
-            </a:fillRef>
-            <a:effectRef idx="0">
-              <a:schemeClr val="dk1"/>
-            </a:effectRef>
-            <a:fontRef idx="minor">
-              <a:schemeClr val="tx1"/>
-            </a:fontRef>
-          </p:style>
-          <p:txBody>
-            <a:bodyPr rtlCol="0" anchor="ctr"/>
-            <a:lstStyle/>
-            <a:p>
-              <a:pPr algn="ctr"/>
-              <a:endParaRPr lang="en-US"/>
-            </a:p>
-          </p:txBody>
-        </p:sp>
-        <p:sp>
-          <p:nvSpPr>
-            <p:cNvPr id="41" name="Text Box 180"/>
-            <p:cNvSpPr txBox="1">
-              <a:spLocks noChangeArrowheads="1"/>
-            </p:cNvSpPr>
-            <p:nvPr/>
-          </p:nvSpPr>
-          <p:spPr bwMode="auto">
-            <a:xfrm>
-              <a:off x="608212" y="14434383"/>
-              <a:ext cx="1679176" cy="533651"/>
-            </a:xfrm>
-            <a:prstGeom prst="rect">
-              <a:avLst/>
-            </a:prstGeom>
-            <a:noFill/>
-            <a:ln>
-              <a:noFill/>
-            </a:ln>
-            <a:effectLst/>
-            <a:extLst>
-              <a:ext uri="{909E8E84-426E-40DD-AFC4-6F175D3DCCD1}">
-                <a14:hiddenFill xmlns:a14="http://schemas.microsoft.com/office/drawing/2010/main">
-                  <a:solidFill>
-                    <a:schemeClr val="accent1"/>
-                  </a:solidFill>
-                </a14:hiddenFill>
-              </a:ext>
-              <a:ext uri="{91240B29-F687-4F45-9708-019B960494DF}">
-                <a14:hiddenLine xmlns:a14="http://schemas.microsoft.com/office/drawing/2010/main" w="9525">
-                  <a:solidFill>
-                    <a:schemeClr val="tx1"/>
-                  </a:solidFill>
-                  <a:miter lim="800000"/>
-                  <a:headEnd/>
-                  <a:tailEnd/>
-                </a14:hiddenLine>
-              </a:ext>
-              <a:ext uri="{AF507438-7753-43E0-B8FC-AC1667EBCBE1}">
-                <a14:hiddenEffects xmlns:a14="http://schemas.microsoft.com/office/drawing/2010/main">
-                  <a:effectLst>
-                    <a:outerShdw dist="35921" dir="2700000" algn="ctr" rotWithShape="0">
-                      <a:schemeClr val="bg2"/>
-                    </a:outerShdw>
-                  </a:effectLst>
-                </a14:hiddenEffects>
-              </a:ext>
-            </a:extLst>
-          </p:spPr>
-          <p:txBody>
-            <a:bodyPr wrap="square" lIns="40809" tIns="20405" rIns="40809" bIns="20405">
-              <a:spAutoFit/>
-            </a:bodyPr>
-            <a:lstStyle>
-              <a:lvl1pPr defTabSz="4389438" eaLnBrk="0" hangingPunct="0">
-                <a:defRPr sz="2200">
-                  <a:solidFill>
-                    <a:schemeClr val="tx1"/>
-                  </a:solidFill>
-                  <a:latin typeface="Arial" charset="0"/>
-                </a:defRPr>
-              </a:lvl1pPr>
-              <a:lvl2pPr marL="742950" indent="-285750" defTabSz="4389438" eaLnBrk="0" hangingPunct="0">
-                <a:defRPr sz="2200">
-                  <a:solidFill>
-                    <a:schemeClr val="tx1"/>
-                  </a:solidFill>
-                  <a:latin typeface="Arial" charset="0"/>
-                </a:defRPr>
-              </a:lvl2pPr>
-              <a:lvl3pPr marL="1143000" indent="-228600" defTabSz="4389438" eaLnBrk="0" hangingPunct="0">
-                <a:defRPr sz="2200">
-                  <a:solidFill>
-                    <a:schemeClr val="tx1"/>
-                  </a:solidFill>
-                  <a:latin typeface="Arial" charset="0"/>
-                </a:defRPr>
-              </a:lvl3pPr>
-              <a:lvl4pPr marL="1600200" indent="-228600" defTabSz="4389438" eaLnBrk="0" hangingPunct="0">
-                <a:defRPr sz="2200">
-                  <a:solidFill>
-                    <a:schemeClr val="tx1"/>
-                  </a:solidFill>
-                  <a:latin typeface="Arial" charset="0"/>
-                </a:defRPr>
-              </a:lvl4pPr>
-              <a:lvl5pPr marL="2057400" indent="-228600" defTabSz="4389438" eaLnBrk="0" hangingPunct="0">
-                <a:defRPr sz="2200">
-                  <a:solidFill>
-                    <a:schemeClr val="tx1"/>
-                  </a:solidFill>
-                  <a:latin typeface="Arial" charset="0"/>
-                </a:defRPr>
-              </a:lvl5pPr>
-              <a:lvl6pPr marL="2514600" indent="-228600" defTabSz="4389438" eaLnBrk="0" fontAlgn="base" hangingPunct="0">
-                <a:spcBef>
-                  <a:spcPct val="0"/>
-                </a:spcBef>
-                <a:spcAft>
-                  <a:spcPct val="0"/>
-                </a:spcAft>
-                <a:defRPr sz="2200">
-                  <a:solidFill>
-                    <a:schemeClr val="tx1"/>
-                  </a:solidFill>
-                  <a:latin typeface="Arial" charset="0"/>
-                </a:defRPr>
-              </a:lvl6pPr>
-              <a:lvl7pPr marL="2971800" indent="-228600" defTabSz="4389438" eaLnBrk="0" fontAlgn="base" hangingPunct="0">
-                <a:spcBef>
-                  <a:spcPct val="0"/>
-                </a:spcBef>
-                <a:spcAft>
-                  <a:spcPct val="0"/>
-                </a:spcAft>
-                <a:defRPr sz="2200">
-                  <a:solidFill>
-                    <a:schemeClr val="tx1"/>
-                  </a:solidFill>
-                  <a:latin typeface="Arial" charset="0"/>
-                </a:defRPr>
-              </a:lvl7pPr>
-              <a:lvl8pPr marL="3429000" indent="-228600" defTabSz="4389438" eaLnBrk="0" fontAlgn="base" hangingPunct="0">
-                <a:spcBef>
-                  <a:spcPct val="0"/>
-                </a:spcBef>
-                <a:spcAft>
-                  <a:spcPct val="0"/>
-                </a:spcAft>
-                <a:defRPr sz="2200">
-                  <a:solidFill>
-                    <a:schemeClr val="tx1"/>
-                  </a:solidFill>
-                  <a:latin typeface="Arial" charset="0"/>
-                </a:defRPr>
-              </a:lvl8pPr>
-              <a:lvl9pPr marL="3886200" indent="-228600" defTabSz="4389438" eaLnBrk="0" fontAlgn="base" hangingPunct="0">
-                <a:spcBef>
-                  <a:spcPct val="0"/>
-                </a:spcBef>
-                <a:spcAft>
-                  <a:spcPct val="0"/>
-                </a:spcAft>
-                <a:defRPr sz="2200">
-                  <a:solidFill>
-                    <a:schemeClr val="tx1"/>
-                  </a:solidFill>
-                  <a:latin typeface="Arial" charset="0"/>
-                </a:defRPr>
-              </a:lvl9pPr>
-            </a:lstStyle>
-            <a:p>
-              <a:pPr algn="ctr" eaLnBrk="1" hangingPunct="1"/>
-              <a:r>
-                <a:rPr lang="en-US" sz="1600" dirty="0">
-                  <a:latin typeface="Calibri" pitchFamily="34" charset="0"/>
-                </a:rPr>
-                <a:t>56 subjects</a:t>
-              </a:r>
-            </a:p>
-            <a:p>
-              <a:pPr algn="ctr" eaLnBrk="1" hangingPunct="1"/>
-              <a:r>
-                <a:rPr lang="en-US" sz="1600" dirty="0">
-                  <a:latin typeface="Calibri" pitchFamily="34" charset="0"/>
-                </a:rPr>
-                <a:t>51 records/subject</a:t>
-              </a:r>
-            </a:p>
-          </p:txBody>
-        </p:sp>
-        <p:sp>
-          <p:nvSpPr>
-            <p:cNvPr id="43" name="Left Brace 42"/>
-            <p:cNvSpPr/>
-            <p:nvPr/>
-          </p:nvSpPr>
-          <p:spPr>
-            <a:xfrm rot="5400000">
-              <a:off x="6294355" y="11387931"/>
-              <a:ext cx="304800" cy="4511512"/>
-            </a:xfrm>
-            <a:prstGeom prst="leftBrace">
-              <a:avLst/>
-            </a:prstGeom>
-            <a:ln w="38100"/>
-          </p:spPr>
-          <p:style>
-            <a:lnRef idx="1">
-              <a:schemeClr val="dk1"/>
-            </a:lnRef>
-            <a:fillRef idx="0">
-              <a:schemeClr val="dk1"/>
-            </a:fillRef>
-            <a:effectRef idx="0">
-              <a:schemeClr val="dk1"/>
-            </a:effectRef>
-            <a:fontRef idx="minor">
-              <a:schemeClr val="tx1"/>
-            </a:fontRef>
-          </p:style>
-          <p:txBody>
-            <a:bodyPr rtlCol="0" anchor="ctr"/>
-            <a:lstStyle/>
-            <a:p>
-              <a:pPr algn="ctr"/>
-              <a:endParaRPr lang="en-US"/>
-            </a:p>
-          </p:txBody>
-        </p:sp>
-        <p:sp>
-          <p:nvSpPr>
-            <p:cNvPr id="44" name="Text Box 180"/>
-            <p:cNvSpPr txBox="1">
-              <a:spLocks noChangeArrowheads="1"/>
-            </p:cNvSpPr>
-            <p:nvPr/>
-          </p:nvSpPr>
-          <p:spPr bwMode="auto">
-            <a:xfrm>
-              <a:off x="5607167" y="13194445"/>
-              <a:ext cx="1679176" cy="287430"/>
-            </a:xfrm>
-            <a:prstGeom prst="rect">
-              <a:avLst/>
-            </a:prstGeom>
-            <a:noFill/>
-            <a:ln>
-              <a:noFill/>
-            </a:ln>
-            <a:effectLst/>
-            <a:extLst>
-              <a:ext uri="{909E8E84-426E-40DD-AFC4-6F175D3DCCD1}">
-                <a14:hiddenFill xmlns:a14="http://schemas.microsoft.com/office/drawing/2010/main">
-                  <a:solidFill>
-                    <a:schemeClr val="accent1"/>
-                  </a:solidFill>
-                </a14:hiddenFill>
-              </a:ext>
-              <a:ext uri="{91240B29-F687-4F45-9708-019B960494DF}">
-                <a14:hiddenLine xmlns:a14="http://schemas.microsoft.com/office/drawing/2010/main" w="9525">
-                  <a:solidFill>
-                    <a:schemeClr val="tx1"/>
-                  </a:solidFill>
-                  <a:miter lim="800000"/>
-                  <a:headEnd/>
-                  <a:tailEnd/>
-                </a14:hiddenLine>
-              </a:ext>
-              <a:ext uri="{AF507438-7753-43E0-B8FC-AC1667EBCBE1}">
-                <a14:hiddenEffects xmlns:a14="http://schemas.microsoft.com/office/drawing/2010/main">
-                  <a:effectLst>
-                    <a:outerShdw dist="35921" dir="2700000" algn="ctr" rotWithShape="0">
-                      <a:schemeClr val="bg2"/>
-                    </a:outerShdw>
-                  </a:effectLst>
-                </a14:hiddenEffects>
-              </a:ext>
-            </a:extLst>
-          </p:spPr>
-          <p:txBody>
-            <a:bodyPr wrap="square" lIns="40809" tIns="20405" rIns="40809" bIns="20405">
-              <a:spAutoFit/>
-            </a:bodyPr>
-            <a:lstStyle>
-              <a:lvl1pPr defTabSz="4389438" eaLnBrk="0" hangingPunct="0">
-                <a:defRPr sz="2200">
-                  <a:solidFill>
-                    <a:schemeClr val="tx1"/>
-                  </a:solidFill>
-                  <a:latin typeface="Arial" charset="0"/>
-                </a:defRPr>
-              </a:lvl1pPr>
-              <a:lvl2pPr marL="742950" indent="-285750" defTabSz="4389438" eaLnBrk="0" hangingPunct="0">
-                <a:defRPr sz="2200">
-                  <a:solidFill>
-                    <a:schemeClr val="tx1"/>
-                  </a:solidFill>
-                  <a:latin typeface="Arial" charset="0"/>
-                </a:defRPr>
-              </a:lvl2pPr>
-              <a:lvl3pPr marL="1143000" indent="-228600" defTabSz="4389438" eaLnBrk="0" hangingPunct="0">
-                <a:defRPr sz="2200">
-                  <a:solidFill>
-                    <a:schemeClr val="tx1"/>
-                  </a:solidFill>
-                  <a:latin typeface="Arial" charset="0"/>
-                </a:defRPr>
-              </a:lvl3pPr>
-              <a:lvl4pPr marL="1600200" indent="-228600" defTabSz="4389438" eaLnBrk="0" hangingPunct="0">
-                <a:defRPr sz="2200">
-                  <a:solidFill>
-                    <a:schemeClr val="tx1"/>
-                  </a:solidFill>
-                  <a:latin typeface="Arial" charset="0"/>
-                </a:defRPr>
-              </a:lvl4pPr>
-              <a:lvl5pPr marL="2057400" indent="-228600" defTabSz="4389438" eaLnBrk="0" hangingPunct="0">
-                <a:defRPr sz="2200">
-                  <a:solidFill>
-                    <a:schemeClr val="tx1"/>
-                  </a:solidFill>
-                  <a:latin typeface="Arial" charset="0"/>
-                </a:defRPr>
-              </a:lvl5pPr>
-              <a:lvl6pPr marL="2514600" indent="-228600" defTabSz="4389438" eaLnBrk="0" fontAlgn="base" hangingPunct="0">
-                <a:spcBef>
-                  <a:spcPct val="0"/>
-                </a:spcBef>
-                <a:spcAft>
-                  <a:spcPct val="0"/>
-                </a:spcAft>
-                <a:defRPr sz="2200">
-                  <a:solidFill>
-                    <a:schemeClr val="tx1"/>
-                  </a:solidFill>
-                  <a:latin typeface="Arial" charset="0"/>
-                </a:defRPr>
-              </a:lvl6pPr>
-              <a:lvl7pPr marL="2971800" indent="-228600" defTabSz="4389438" eaLnBrk="0" fontAlgn="base" hangingPunct="0">
-                <a:spcBef>
-                  <a:spcPct val="0"/>
-                </a:spcBef>
-                <a:spcAft>
-                  <a:spcPct val="0"/>
-                </a:spcAft>
-                <a:defRPr sz="2200">
-                  <a:solidFill>
-                    <a:schemeClr val="tx1"/>
-                  </a:solidFill>
-                  <a:latin typeface="Arial" charset="0"/>
-                </a:defRPr>
-              </a:lvl7pPr>
-              <a:lvl8pPr marL="3429000" indent="-228600" defTabSz="4389438" eaLnBrk="0" fontAlgn="base" hangingPunct="0">
-                <a:spcBef>
-                  <a:spcPct val="0"/>
-                </a:spcBef>
-                <a:spcAft>
-                  <a:spcPct val="0"/>
-                </a:spcAft>
-                <a:defRPr sz="2200">
-                  <a:solidFill>
-                    <a:schemeClr val="tx1"/>
-                  </a:solidFill>
-                  <a:latin typeface="Arial" charset="0"/>
-                </a:defRPr>
-              </a:lvl8pPr>
-              <a:lvl9pPr marL="3886200" indent="-228600" defTabSz="4389438" eaLnBrk="0" fontAlgn="base" hangingPunct="0">
-                <a:spcBef>
-                  <a:spcPct val="0"/>
-                </a:spcBef>
-                <a:spcAft>
-                  <a:spcPct val="0"/>
-                </a:spcAft>
-                <a:defRPr sz="2200">
-                  <a:solidFill>
-                    <a:schemeClr val="tx1"/>
-                  </a:solidFill>
-                  <a:latin typeface="Arial" charset="0"/>
-                </a:defRPr>
-              </a:lvl9pPr>
-            </a:lstStyle>
-            <a:p>
-              <a:pPr algn="ctr" eaLnBrk="1" hangingPunct="1"/>
-              <a:r>
-                <a:rPr lang="en-US" sz="1600" dirty="0">
-                  <a:latin typeface="Calibri" pitchFamily="34" charset="0"/>
-                </a:rPr>
-                <a:t>71 features</a:t>
-              </a:r>
-            </a:p>
-          </p:txBody>
-        </p:sp>
-      </p:grpSp>
       <p:sp>
         <p:nvSpPr>
           <p:cNvPr id="45" name="Text Box 180">
@@ -7312,6 +6413,903 @@
           </a:p>
         </p:txBody>
       </p:sp>
+      <p:sp>
+        <p:nvSpPr>
+          <p:cNvPr id="47" name="Text Box 180">
+            <a:extLst>
+              <a:ext uri="{FF2B5EF4-FFF2-40B4-BE49-F238E27FC236}">
+                <a16:creationId xmlns:a16="http://schemas.microsoft.com/office/drawing/2014/main" xmlns="" id="{B68CCE3C-71F5-47D9-BF5F-CCAFD9C77C0F}"/>
+              </a:ext>
+            </a:extLst>
+          </p:cNvPr>
+          <p:cNvSpPr txBox="1">
+            <a:spLocks noChangeArrowheads="1"/>
+          </p:cNvSpPr>
+          <p:nvPr/>
+        </p:nvSpPr>
+        <p:spPr bwMode="auto">
+          <a:xfrm>
+            <a:off x="18926455" y="11165748"/>
+            <a:ext cx="7254712" cy="287430"/>
+          </a:xfrm>
+          <a:prstGeom prst="rect">
+            <a:avLst/>
+          </a:prstGeom>
+          <a:noFill/>
+          <a:ln>
+            <a:noFill/>
+          </a:ln>
+          <a:effectLst/>
+          <a:extLst>
+            <a:ext uri="{909E8E84-426E-40DD-AFC4-6F175D3DCCD1}">
+              <a14:hiddenFill xmlns:a14="http://schemas.microsoft.com/office/drawing/2010/main">
+                <a:solidFill>
+                  <a:schemeClr val="accent1"/>
+                </a:solidFill>
+              </a14:hiddenFill>
+            </a:ext>
+            <a:ext uri="{91240B29-F687-4F45-9708-019B960494DF}">
+              <a14:hiddenLine xmlns:a14="http://schemas.microsoft.com/office/drawing/2010/main" w="9525">
+                <a:solidFill>
+                  <a:schemeClr val="tx1"/>
+                </a:solidFill>
+                <a:miter lim="800000"/>
+                <a:headEnd/>
+                <a:tailEnd/>
+              </a14:hiddenLine>
+            </a:ext>
+            <a:ext uri="{AF507438-7753-43E0-B8FC-AC1667EBCBE1}">
+              <a14:hiddenEffects xmlns:a14="http://schemas.microsoft.com/office/drawing/2010/main">
+                <a:effectLst>
+                  <a:outerShdw dist="35921" dir="2700000" algn="ctr" rotWithShape="0">
+                    <a:schemeClr val="bg2"/>
+                  </a:outerShdw>
+                </a:effectLst>
+              </a14:hiddenEffects>
+            </a:ext>
+          </a:extLst>
+        </p:spPr>
+        <p:txBody>
+          <a:bodyPr wrap="square" lIns="40809" tIns="20405" rIns="40809" bIns="20405">
+            <a:spAutoFit/>
+          </a:bodyPr>
+          <a:lstStyle>
+            <a:lvl1pPr defTabSz="4389438" eaLnBrk="0" hangingPunct="0">
+              <a:defRPr sz="2200">
+                <a:solidFill>
+                  <a:schemeClr val="tx1"/>
+                </a:solidFill>
+                <a:latin typeface="Arial" charset="0"/>
+              </a:defRPr>
+            </a:lvl1pPr>
+            <a:lvl2pPr marL="742950" indent="-285750" defTabSz="4389438" eaLnBrk="0" hangingPunct="0">
+              <a:defRPr sz="2200">
+                <a:solidFill>
+                  <a:schemeClr val="tx1"/>
+                </a:solidFill>
+                <a:latin typeface="Arial" charset="0"/>
+              </a:defRPr>
+            </a:lvl2pPr>
+            <a:lvl3pPr marL="1143000" indent="-228600" defTabSz="4389438" eaLnBrk="0" hangingPunct="0">
+              <a:defRPr sz="2200">
+                <a:solidFill>
+                  <a:schemeClr val="tx1"/>
+                </a:solidFill>
+                <a:latin typeface="Arial" charset="0"/>
+              </a:defRPr>
+            </a:lvl3pPr>
+            <a:lvl4pPr marL="1600200" indent="-228600" defTabSz="4389438" eaLnBrk="0" hangingPunct="0">
+              <a:defRPr sz="2200">
+                <a:solidFill>
+                  <a:schemeClr val="tx1"/>
+                </a:solidFill>
+                <a:latin typeface="Arial" charset="0"/>
+              </a:defRPr>
+            </a:lvl4pPr>
+            <a:lvl5pPr marL="2057400" indent="-228600" defTabSz="4389438" eaLnBrk="0" hangingPunct="0">
+              <a:defRPr sz="2200">
+                <a:solidFill>
+                  <a:schemeClr val="tx1"/>
+                </a:solidFill>
+                <a:latin typeface="Arial" charset="0"/>
+              </a:defRPr>
+            </a:lvl5pPr>
+            <a:lvl6pPr marL="2514600" indent="-228600" defTabSz="4389438" eaLnBrk="0" fontAlgn="base" hangingPunct="0">
+              <a:spcBef>
+                <a:spcPct val="0"/>
+              </a:spcBef>
+              <a:spcAft>
+                <a:spcPct val="0"/>
+              </a:spcAft>
+              <a:defRPr sz="2200">
+                <a:solidFill>
+                  <a:schemeClr val="tx1"/>
+                </a:solidFill>
+                <a:latin typeface="Arial" charset="0"/>
+              </a:defRPr>
+            </a:lvl6pPr>
+            <a:lvl7pPr marL="2971800" indent="-228600" defTabSz="4389438" eaLnBrk="0" fontAlgn="base" hangingPunct="0">
+              <a:spcBef>
+                <a:spcPct val="0"/>
+              </a:spcBef>
+              <a:spcAft>
+                <a:spcPct val="0"/>
+              </a:spcAft>
+              <a:defRPr sz="2200">
+                <a:solidFill>
+                  <a:schemeClr val="tx1"/>
+                </a:solidFill>
+                <a:latin typeface="Arial" charset="0"/>
+              </a:defRPr>
+            </a:lvl7pPr>
+            <a:lvl8pPr marL="3429000" indent="-228600" defTabSz="4389438" eaLnBrk="0" fontAlgn="base" hangingPunct="0">
+              <a:spcBef>
+                <a:spcPct val="0"/>
+              </a:spcBef>
+              <a:spcAft>
+                <a:spcPct val="0"/>
+              </a:spcAft>
+              <a:defRPr sz="2200">
+                <a:solidFill>
+                  <a:schemeClr val="tx1"/>
+                </a:solidFill>
+                <a:latin typeface="Arial" charset="0"/>
+              </a:defRPr>
+            </a:lvl8pPr>
+            <a:lvl9pPr marL="3886200" indent="-228600" defTabSz="4389438" eaLnBrk="0" fontAlgn="base" hangingPunct="0">
+              <a:spcBef>
+                <a:spcPct val="0"/>
+              </a:spcBef>
+              <a:spcAft>
+                <a:spcPct val="0"/>
+              </a:spcAft>
+              <a:defRPr sz="2200">
+                <a:solidFill>
+                  <a:schemeClr val="tx1"/>
+                </a:solidFill>
+                <a:latin typeface="Arial" charset="0"/>
+              </a:defRPr>
+            </a:lvl9pPr>
+          </a:lstStyle>
+          <a:p>
+            <a:pPr algn="ctr" eaLnBrk="1" hangingPunct="1"/>
+            <a:r>
+              <a:rPr lang="en-US" sz="1600" b="1" dirty="0">
+                <a:latin typeface="Calibri" pitchFamily="34" charset="0"/>
+              </a:rPr>
+              <a:t>Table 2.</a:t>
+            </a:r>
+            <a:r>
+              <a:rPr lang="en-US" sz="1600" dirty="0">
+                <a:latin typeface="Calibri" pitchFamily="34" charset="0"/>
+              </a:rPr>
+              <a:t> Table of maximum success rates, across all attack methods and </a:t>
+            </a:r>
+            <a:r>
+              <a:rPr lang="en-US" sz="1600" i="1" dirty="0">
+                <a:latin typeface="Calibri" pitchFamily="34" charset="0"/>
+              </a:rPr>
+              <a:t>k </a:t>
+            </a:r>
+            <a:r>
+              <a:rPr lang="en-US" sz="1600" dirty="0">
+                <a:latin typeface="Calibri" pitchFamily="34" charset="0"/>
+              </a:rPr>
+              <a:t>values.</a:t>
+            </a:r>
+            <a:endParaRPr lang="en-US" sz="1600" b="1" dirty="0">
+              <a:latin typeface="Calibri" pitchFamily="34" charset="0"/>
+            </a:endParaRPr>
+          </a:p>
+        </p:txBody>
+      </p:sp>
+      <p:sp>
+        <p:nvSpPr>
+          <p:cNvPr id="12" name="Text Box 191"/>
+          <p:cNvSpPr txBox="1">
+            <a:spLocks noChangeArrowheads="1"/>
+          </p:cNvSpPr>
+          <p:nvPr/>
+        </p:nvSpPr>
+        <p:spPr bwMode="auto">
+          <a:xfrm>
+            <a:off x="18288000" y="3048001"/>
+            <a:ext cx="8229600" cy="8374257"/>
+          </a:xfrm>
+          <a:prstGeom prst="rect">
+            <a:avLst/>
+          </a:prstGeom>
+          <a:noFill/>
+          <a:ln w="12700">
+            <a:solidFill>
+              <a:schemeClr val="accent1">
+                <a:lumMod val="75000"/>
+              </a:schemeClr>
+            </a:solidFill>
+          </a:ln>
+          <a:effectLst/>
+        </p:spPr>
+        <p:txBody>
+          <a:bodyPr lIns="81618" tIns="81618" rIns="81618" bIns="81618">
+            <a:spAutoFit/>
+          </a:bodyPr>
+          <a:lstStyle>
+            <a:lvl1pPr eaLnBrk="0" hangingPunct="0">
+              <a:defRPr sz="2200">
+                <a:solidFill>
+                  <a:schemeClr val="tx1"/>
+                </a:solidFill>
+                <a:latin typeface="Arial" charset="0"/>
+              </a:defRPr>
+            </a:lvl1pPr>
+            <a:lvl2pPr marL="742950" indent="-285750" eaLnBrk="0" hangingPunct="0">
+              <a:defRPr sz="2200">
+                <a:solidFill>
+                  <a:schemeClr val="tx1"/>
+                </a:solidFill>
+                <a:latin typeface="Arial" charset="0"/>
+              </a:defRPr>
+            </a:lvl2pPr>
+            <a:lvl3pPr marL="1143000" indent="-228600" eaLnBrk="0" hangingPunct="0">
+              <a:defRPr sz="2200">
+                <a:solidFill>
+                  <a:schemeClr val="tx1"/>
+                </a:solidFill>
+                <a:latin typeface="Arial" charset="0"/>
+              </a:defRPr>
+            </a:lvl3pPr>
+            <a:lvl4pPr marL="1600200" indent="-228600" eaLnBrk="0" hangingPunct="0">
+              <a:defRPr sz="2200">
+                <a:solidFill>
+                  <a:schemeClr val="tx1"/>
+                </a:solidFill>
+                <a:latin typeface="Arial" charset="0"/>
+              </a:defRPr>
+            </a:lvl4pPr>
+            <a:lvl5pPr marL="2057400" indent="-228600" eaLnBrk="0" hangingPunct="0">
+              <a:defRPr sz="2200">
+                <a:solidFill>
+                  <a:schemeClr val="tx1"/>
+                </a:solidFill>
+                <a:latin typeface="Arial" charset="0"/>
+              </a:defRPr>
+            </a:lvl5pPr>
+            <a:lvl6pPr marL="2514600" indent="-228600" eaLnBrk="0" fontAlgn="base" hangingPunct="0">
+              <a:spcBef>
+                <a:spcPct val="0"/>
+              </a:spcBef>
+              <a:spcAft>
+                <a:spcPct val="0"/>
+              </a:spcAft>
+              <a:defRPr sz="2200">
+                <a:solidFill>
+                  <a:schemeClr val="tx1"/>
+                </a:solidFill>
+                <a:latin typeface="Arial" charset="0"/>
+              </a:defRPr>
+            </a:lvl6pPr>
+            <a:lvl7pPr marL="2971800" indent="-228600" eaLnBrk="0" fontAlgn="base" hangingPunct="0">
+              <a:spcBef>
+                <a:spcPct val="0"/>
+              </a:spcBef>
+              <a:spcAft>
+                <a:spcPct val="0"/>
+              </a:spcAft>
+              <a:defRPr sz="2200">
+                <a:solidFill>
+                  <a:schemeClr val="tx1"/>
+                </a:solidFill>
+                <a:latin typeface="Arial" charset="0"/>
+              </a:defRPr>
+            </a:lvl7pPr>
+            <a:lvl8pPr marL="3429000" indent="-228600" eaLnBrk="0" fontAlgn="base" hangingPunct="0">
+              <a:spcBef>
+                <a:spcPct val="0"/>
+              </a:spcBef>
+              <a:spcAft>
+                <a:spcPct val="0"/>
+              </a:spcAft>
+              <a:defRPr sz="2200">
+                <a:solidFill>
+                  <a:schemeClr val="tx1"/>
+                </a:solidFill>
+                <a:latin typeface="Arial" charset="0"/>
+              </a:defRPr>
+            </a:lvl8pPr>
+            <a:lvl9pPr marL="3886200" indent="-228600" eaLnBrk="0" fontAlgn="base" hangingPunct="0">
+              <a:spcBef>
+                <a:spcPct val="0"/>
+              </a:spcBef>
+              <a:spcAft>
+                <a:spcPct val="0"/>
+              </a:spcAft>
+              <a:defRPr sz="2200">
+                <a:solidFill>
+                  <a:schemeClr val="tx1"/>
+                </a:solidFill>
+                <a:latin typeface="Arial" charset="0"/>
+              </a:defRPr>
+            </a:lvl9pPr>
+          </a:lstStyle>
+          <a:p>
+            <a:pPr marL="285750" indent="-285750" eaLnBrk="1" hangingPunct="1">
+              <a:buFont typeface="Arial" panose="020B0604020202020204" pitchFamily="34" charset="0"/>
+              <a:buChar char="•"/>
+            </a:pPr>
+            <a:r>
+              <a:rPr lang="en-US" sz="1667" dirty="0">
+                <a:latin typeface="Calibri" pitchFamily="34" charset="0"/>
+              </a:rPr>
+              <a:t>Intuitively, our </a:t>
+            </a:r>
+            <a:r>
+              <a:rPr lang="en-US" sz="1667" i="1" dirty="0">
+                <a:latin typeface="Calibri" pitchFamily="34" charset="0"/>
+              </a:rPr>
+              <a:t>k</a:t>
+            </a:r>
+            <a:r>
+              <a:rPr lang="en-US" sz="1667" dirty="0">
+                <a:latin typeface="Calibri" pitchFamily="34" charset="0"/>
+              </a:rPr>
+              <a:t>-means attacks performed best with higher </a:t>
+            </a:r>
+            <a:r>
+              <a:rPr lang="en-US" sz="1667" i="1" dirty="0">
+                <a:latin typeface="Calibri" pitchFamily="34" charset="0"/>
+              </a:rPr>
+              <a:t>k </a:t>
+            </a:r>
+            <a:r>
+              <a:rPr lang="en-US" sz="1667" dirty="0">
+                <a:latin typeface="Calibri" pitchFamily="34" charset="0"/>
+              </a:rPr>
+              <a:t>(until 32-64 range with cluster method), reaching </a:t>
+            </a:r>
+            <a:r>
+              <a:rPr lang="en-US" sz="1667" b="1" dirty="0">
+                <a:latin typeface="Calibri" pitchFamily="34" charset="0"/>
+              </a:rPr>
+              <a:t>77% success rate </a:t>
+            </a:r>
+            <a:r>
+              <a:rPr lang="en-US" sz="1667" dirty="0">
+                <a:latin typeface="Calibri" pitchFamily="34" charset="0"/>
+              </a:rPr>
+              <a:t>(undetected spoof) against a 5-layer deep neural net. Also intuitively, using our multivariate Gaussian distribution model to introduce humanistic perturbations and augment the number of generated adversarial examples, we achieve a lower maximum </a:t>
+            </a:r>
+            <a:r>
+              <a:rPr lang="en-US" sz="1667" b="1" dirty="0">
+                <a:latin typeface="Calibri" pitchFamily="34" charset="0"/>
+              </a:rPr>
+              <a:t>67% success rate</a:t>
+            </a:r>
+            <a:r>
+              <a:rPr lang="en-US" sz="1667" dirty="0">
+                <a:latin typeface="Calibri" pitchFamily="34" charset="0"/>
+              </a:rPr>
+              <a:t>. </a:t>
+            </a:r>
+          </a:p>
+          <a:p>
+            <a:pPr marL="285750" indent="-285750" eaLnBrk="1" hangingPunct="1">
+              <a:buFont typeface="Arial" panose="020B0604020202020204" pitchFamily="34" charset="0"/>
+              <a:buChar char="•"/>
+            </a:pPr>
+            <a:r>
+              <a:rPr lang="en-US" sz="1667" dirty="0">
+                <a:latin typeface="Calibri" pitchFamily="34" charset="0"/>
+              </a:rPr>
+              <a:t>Secondarily, and less intuitively, based on the adversarial success rate metric of model robustness, we find that </a:t>
+            </a:r>
+            <a:r>
+              <a:rPr lang="en-US" sz="1667" b="1" dirty="0">
+                <a:latin typeface="Calibri" pitchFamily="34" charset="0"/>
+              </a:rPr>
+              <a:t>logistic regression</a:t>
+            </a:r>
+            <a:r>
+              <a:rPr lang="en-US" sz="1667" dirty="0">
+                <a:latin typeface="Calibri" pitchFamily="34" charset="0"/>
+              </a:rPr>
+              <a:t> is most resilient to our attacks (maximum success rate 20%), compared to the artificial neural net and deep neural nets.</a:t>
+            </a:r>
+          </a:p>
+          <a:p>
+            <a:pPr marL="285750" indent="-285750" eaLnBrk="1" hangingPunct="1">
+              <a:buFont typeface="Arial" panose="020B0604020202020204" pitchFamily="34" charset="0"/>
+              <a:buChar char="•"/>
+            </a:pPr>
+            <a:endParaRPr lang="en-US" sz="1667" dirty="0">
+              <a:latin typeface="Calibri" pitchFamily="34" charset="0"/>
+            </a:endParaRPr>
+          </a:p>
+          <a:p>
+            <a:pPr marL="285750" indent="-285750" eaLnBrk="1" hangingPunct="1">
+              <a:buFont typeface="Arial" panose="020B0604020202020204" pitchFamily="34" charset="0"/>
+              <a:buChar char="•"/>
+            </a:pPr>
+            <a:endParaRPr lang="en-US" sz="1667" dirty="0">
+              <a:latin typeface="Calibri" pitchFamily="34" charset="0"/>
+            </a:endParaRPr>
+          </a:p>
+          <a:p>
+            <a:pPr marL="285750" indent="-285750" eaLnBrk="1" hangingPunct="1">
+              <a:buFont typeface="Arial" panose="020B0604020202020204" pitchFamily="34" charset="0"/>
+              <a:buChar char="•"/>
+            </a:pPr>
+            <a:endParaRPr lang="en-US" sz="1667" dirty="0">
+              <a:latin typeface="Calibri" pitchFamily="34" charset="0"/>
+            </a:endParaRPr>
+          </a:p>
+          <a:p>
+            <a:pPr marL="285750" indent="-285750" eaLnBrk="1" hangingPunct="1">
+              <a:buFont typeface="Arial" panose="020B0604020202020204" pitchFamily="34" charset="0"/>
+              <a:buChar char="•"/>
+            </a:pPr>
+            <a:endParaRPr lang="en-US" sz="1667" dirty="0">
+              <a:latin typeface="Calibri" pitchFamily="34" charset="0"/>
+            </a:endParaRPr>
+          </a:p>
+          <a:p>
+            <a:pPr marL="285750" indent="-285750" eaLnBrk="1" hangingPunct="1">
+              <a:buFont typeface="Arial" panose="020B0604020202020204" pitchFamily="34" charset="0"/>
+              <a:buChar char="•"/>
+            </a:pPr>
+            <a:endParaRPr lang="en-US" sz="1667" dirty="0">
+              <a:latin typeface="Calibri" pitchFamily="34" charset="0"/>
+            </a:endParaRPr>
+          </a:p>
+          <a:p>
+            <a:pPr marL="285750" indent="-285750" eaLnBrk="1" hangingPunct="1">
+              <a:buFont typeface="Arial" panose="020B0604020202020204" pitchFamily="34" charset="0"/>
+              <a:buChar char="•"/>
+            </a:pPr>
+            <a:endParaRPr lang="en-US" sz="1667" dirty="0">
+              <a:latin typeface="Calibri" pitchFamily="34" charset="0"/>
+            </a:endParaRPr>
+          </a:p>
+          <a:p>
+            <a:pPr marL="285750" indent="-285750" eaLnBrk="1" hangingPunct="1">
+              <a:buFont typeface="Arial" panose="020B0604020202020204" pitchFamily="34" charset="0"/>
+              <a:buChar char="•"/>
+            </a:pPr>
+            <a:endParaRPr lang="en-US" sz="1667" dirty="0">
+              <a:latin typeface="Calibri" pitchFamily="34" charset="0"/>
+            </a:endParaRPr>
+          </a:p>
+          <a:p>
+            <a:pPr marL="285750" indent="-285750" eaLnBrk="1" hangingPunct="1">
+              <a:buFont typeface="Arial" panose="020B0604020202020204" pitchFamily="34" charset="0"/>
+              <a:buChar char="•"/>
+            </a:pPr>
+            <a:endParaRPr lang="en-US" sz="1667" dirty="0">
+              <a:latin typeface="Calibri" pitchFamily="34" charset="0"/>
+            </a:endParaRPr>
+          </a:p>
+          <a:p>
+            <a:pPr marL="285750" indent="-285750" eaLnBrk="1" hangingPunct="1">
+              <a:buFont typeface="Arial" panose="020B0604020202020204" pitchFamily="34" charset="0"/>
+              <a:buChar char="•"/>
+            </a:pPr>
+            <a:endParaRPr lang="en-US" sz="1667" dirty="0">
+              <a:latin typeface="Calibri" pitchFamily="34" charset="0"/>
+            </a:endParaRPr>
+          </a:p>
+          <a:p>
+            <a:pPr marL="285750" indent="-285750" eaLnBrk="1" hangingPunct="1">
+              <a:buFont typeface="Arial" panose="020B0604020202020204" pitchFamily="34" charset="0"/>
+              <a:buChar char="•"/>
+            </a:pPr>
+            <a:endParaRPr lang="en-US" sz="1667" dirty="0">
+              <a:latin typeface="Calibri" pitchFamily="34" charset="0"/>
+            </a:endParaRPr>
+          </a:p>
+          <a:p>
+            <a:pPr marL="285750" indent="-285750" eaLnBrk="1" hangingPunct="1">
+              <a:buFont typeface="Arial" panose="020B0604020202020204" pitchFamily="34" charset="0"/>
+              <a:buChar char="•"/>
+            </a:pPr>
+            <a:endParaRPr lang="en-US" sz="1667" dirty="0">
+              <a:latin typeface="Calibri" pitchFamily="34" charset="0"/>
+            </a:endParaRPr>
+          </a:p>
+          <a:p>
+            <a:pPr marL="285750" indent="-285750" eaLnBrk="1" hangingPunct="1">
+              <a:buFont typeface="Arial" panose="020B0604020202020204" pitchFamily="34" charset="0"/>
+              <a:buChar char="•"/>
+            </a:pPr>
+            <a:endParaRPr lang="en-US" sz="1667" dirty="0">
+              <a:latin typeface="Calibri" pitchFamily="34" charset="0"/>
+            </a:endParaRPr>
+          </a:p>
+          <a:p>
+            <a:pPr marL="285750" indent="-285750" eaLnBrk="1" hangingPunct="1">
+              <a:buFont typeface="Arial" panose="020B0604020202020204" pitchFamily="34" charset="0"/>
+              <a:buChar char="•"/>
+            </a:pPr>
+            <a:endParaRPr lang="en-US" sz="1667" dirty="0">
+              <a:latin typeface="Calibri" pitchFamily="34" charset="0"/>
+            </a:endParaRPr>
+          </a:p>
+          <a:p>
+            <a:pPr marL="285750" indent="-285750" eaLnBrk="1" hangingPunct="1">
+              <a:buFont typeface="Arial" panose="020B0604020202020204" pitchFamily="34" charset="0"/>
+              <a:buChar char="•"/>
+            </a:pPr>
+            <a:endParaRPr lang="en-US" sz="1667" dirty="0">
+              <a:latin typeface="Calibri" pitchFamily="34" charset="0"/>
+            </a:endParaRPr>
+          </a:p>
+          <a:p>
+            <a:pPr marL="285750" indent="-285750" eaLnBrk="1" hangingPunct="1">
+              <a:buFont typeface="Arial" panose="020B0604020202020204" pitchFamily="34" charset="0"/>
+              <a:buChar char="•"/>
+            </a:pPr>
+            <a:endParaRPr lang="en-US" sz="1667" dirty="0">
+              <a:latin typeface="Calibri" pitchFamily="34" charset="0"/>
+            </a:endParaRPr>
+          </a:p>
+          <a:p>
+            <a:pPr marL="285750" indent="-285750" eaLnBrk="1" hangingPunct="1">
+              <a:buFont typeface="Arial" panose="020B0604020202020204" pitchFamily="34" charset="0"/>
+              <a:buChar char="•"/>
+            </a:pPr>
+            <a:endParaRPr lang="en-US" sz="1667" dirty="0">
+              <a:latin typeface="Calibri" pitchFamily="34" charset="0"/>
+            </a:endParaRPr>
+          </a:p>
+          <a:p>
+            <a:pPr marL="285750" indent="-285750" eaLnBrk="1" hangingPunct="1">
+              <a:buFont typeface="Arial" panose="020B0604020202020204" pitchFamily="34" charset="0"/>
+              <a:buChar char="•"/>
+            </a:pPr>
+            <a:endParaRPr lang="en-US" sz="1667" dirty="0">
+              <a:latin typeface="Calibri" pitchFamily="34" charset="0"/>
+            </a:endParaRPr>
+          </a:p>
+          <a:p>
+            <a:pPr marL="285750" indent="-285750" eaLnBrk="1" hangingPunct="1">
+              <a:buFont typeface="Arial" panose="020B0604020202020204" pitchFamily="34" charset="0"/>
+              <a:buChar char="•"/>
+            </a:pPr>
+            <a:endParaRPr lang="en-US" sz="1667" dirty="0">
+              <a:latin typeface="Calibri" pitchFamily="34" charset="0"/>
+            </a:endParaRPr>
+          </a:p>
+          <a:p>
+            <a:pPr marL="285750" indent="-285750" eaLnBrk="1" hangingPunct="1">
+              <a:buFont typeface="Arial" panose="020B0604020202020204" pitchFamily="34" charset="0"/>
+              <a:buChar char="•"/>
+            </a:pPr>
+            <a:endParaRPr lang="en-US" sz="1667" dirty="0">
+              <a:latin typeface="Calibri" pitchFamily="34" charset="0"/>
+            </a:endParaRPr>
+          </a:p>
+          <a:p>
+            <a:pPr marL="285750" indent="-285750" eaLnBrk="1" hangingPunct="1">
+              <a:buFont typeface="Arial" panose="020B0604020202020204" pitchFamily="34" charset="0"/>
+              <a:buChar char="•"/>
+            </a:pPr>
+            <a:endParaRPr lang="en-US" sz="1667" dirty="0">
+              <a:latin typeface="Calibri" pitchFamily="34" charset="0"/>
+            </a:endParaRPr>
+          </a:p>
+          <a:p>
+            <a:pPr marL="285750" indent="-285750" eaLnBrk="1" hangingPunct="1">
+              <a:buFont typeface="Arial" panose="020B0604020202020204" pitchFamily="34" charset="0"/>
+              <a:buChar char="•"/>
+            </a:pPr>
+            <a:endParaRPr lang="en-US" sz="1667" dirty="0">
+              <a:latin typeface="Calibri" pitchFamily="34" charset="0"/>
+            </a:endParaRPr>
+          </a:p>
+          <a:p>
+            <a:pPr marL="285750" indent="-285750" eaLnBrk="1" hangingPunct="1">
+              <a:buFont typeface="Arial" panose="020B0604020202020204" pitchFamily="34" charset="0"/>
+              <a:buChar char="•"/>
+            </a:pPr>
+            <a:endParaRPr lang="en-US" sz="1667" dirty="0">
+              <a:latin typeface="Calibri" pitchFamily="34" charset="0"/>
+            </a:endParaRPr>
+          </a:p>
+          <a:p>
+            <a:pPr eaLnBrk="1" hangingPunct="1"/>
+            <a:endParaRPr lang="en-US" sz="1667" dirty="0">
+              <a:latin typeface="Calibri" pitchFamily="34" charset="0"/>
+            </a:endParaRPr>
+          </a:p>
+          <a:p>
+            <a:pPr eaLnBrk="1" hangingPunct="1"/>
+            <a:r>
+              <a:rPr lang="en-US" sz="1667" dirty="0">
+                <a:latin typeface="Calibri" pitchFamily="34" charset="0"/>
+              </a:rPr>
+              <a:t> </a:t>
+            </a:r>
+          </a:p>
+        </p:txBody>
+      </p:sp>
+      <p:sp>
+        <p:nvSpPr>
+          <p:cNvPr id="48" name="TextBox 47"/>
+          <p:cNvSpPr txBox="1"/>
+          <p:nvPr/>
+        </p:nvSpPr>
+        <p:spPr>
+          <a:xfrm>
+            <a:off x="8534399" y="16687799"/>
+            <a:ext cx="17646767" cy="1219200"/>
+          </a:xfrm>
+          <a:prstGeom prst="rect">
+            <a:avLst/>
+          </a:prstGeom>
+          <a:noFill/>
+        </p:spPr>
+        <p:txBody>
+          <a:bodyPr wrap="square" lIns="40809" tIns="40809" rIns="40809" bIns="40809" numCol="2" spcCol="244855" rtlCol="0">
+            <a:noAutofit/>
+          </a:bodyPr>
+          <a:lstStyle/>
+          <a:p>
+            <a:r>
+              <a:rPr lang="en-US" sz="1200" dirty="0"/>
+              <a:t>[1] N. Al-</a:t>
+            </a:r>
+            <a:r>
+              <a:rPr lang="en-US" sz="1200" dirty="0" err="1"/>
+              <a:t>Obaidi</a:t>
+            </a:r>
+            <a:r>
+              <a:rPr lang="en-US" sz="1200" dirty="0"/>
+              <a:t>. MEU-Mobile KSD Data Set. UCI Machine Learning Repository, 2016.</a:t>
+            </a:r>
+          </a:p>
+          <a:p>
+            <a:r>
+              <a:rPr lang="en-US" sz="1200" dirty="0"/>
+              <a:t>[2] I. de </a:t>
+            </a:r>
+            <a:r>
+              <a:rPr lang="en-US" sz="1200" dirty="0" err="1"/>
+              <a:t>Mendizabal</a:t>
+            </a:r>
+            <a:r>
+              <a:rPr lang="en-US" sz="1200" dirty="0"/>
+              <a:t>-Vazquez, D. de Santos-Sierra, J. Guerra-Casanova, and C. Sanchez-Avila. Supervised classification methods applied to</a:t>
+            </a:r>
+          </a:p>
+          <a:p>
+            <a:r>
+              <a:rPr lang="en-US" sz="1200" dirty="0"/>
+              <a:t>Keystroke Dynamics through Mobile Devices. </a:t>
+            </a:r>
+            <a:r>
+              <a:rPr lang="en-US" sz="1200" i="1" dirty="0"/>
+              <a:t>ICCST</a:t>
+            </a:r>
+            <a:r>
+              <a:rPr lang="en-US" sz="1200" dirty="0"/>
+              <a:t>, 2014.</a:t>
+            </a:r>
+          </a:p>
+          <a:p>
+            <a:r>
+              <a:rPr lang="en-US" sz="1200" dirty="0"/>
+              <a:t>[3] T. Cho. Pattern Classification Methods for Keystroke Analysis. </a:t>
+            </a:r>
+            <a:r>
+              <a:rPr lang="en-US" sz="1200" i="1" dirty="0"/>
+              <a:t>SICE-ICASE</a:t>
+            </a:r>
+            <a:r>
+              <a:rPr lang="en-US" sz="1200" dirty="0"/>
+              <a:t>, 2006.</a:t>
+            </a:r>
+          </a:p>
+          <a:p>
+            <a:r>
+              <a:rPr lang="en-US" sz="1200" dirty="0"/>
+              <a:t>[4] L.J.P. van der </a:t>
+            </a:r>
+            <a:r>
+              <a:rPr lang="en-US" sz="1200" dirty="0" err="1"/>
+              <a:t>Maaten</a:t>
+            </a:r>
+            <a:r>
+              <a:rPr lang="en-US" sz="1200" dirty="0"/>
+              <a:t>. Accelerating t-SNE using Tree-Based Algorithms. </a:t>
+            </a:r>
+            <a:r>
+              <a:rPr lang="en-US" sz="1200" i="1" dirty="0"/>
+              <a:t>Journal of Machine Learning Research</a:t>
+            </a:r>
+            <a:r>
+              <a:rPr lang="en-US" sz="1200" dirty="0"/>
+              <a:t>, 2014.</a:t>
+            </a:r>
+          </a:p>
+          <a:p>
+            <a:r>
+              <a:rPr lang="en-US" sz="1200" dirty="0"/>
+              <a:t>[5] A. </a:t>
+            </a:r>
+            <a:r>
+              <a:rPr lang="en-US" sz="1200" dirty="0" err="1"/>
+              <a:t>Fawzi</a:t>
+            </a:r>
+            <a:r>
+              <a:rPr lang="en-US" sz="1200" dirty="0"/>
+              <a:t>, S. </a:t>
+            </a:r>
+            <a:r>
+              <a:rPr lang="en-US" sz="1200" dirty="0" err="1"/>
+              <a:t>Moosavi-Dezfooli</a:t>
+            </a:r>
+            <a:r>
+              <a:rPr lang="en-US" sz="1200" dirty="0"/>
+              <a:t>, P. </a:t>
+            </a:r>
+            <a:r>
+              <a:rPr lang="en-US" sz="1200" dirty="0" err="1"/>
+              <a:t>Frossard</a:t>
+            </a:r>
+            <a:r>
+              <a:rPr lang="en-US" sz="1200" dirty="0"/>
+              <a:t>. Robustness of classifiers: from adversarial to random noise. </a:t>
+            </a:r>
+            <a:r>
+              <a:rPr lang="en-US" sz="1200" i="1" dirty="0"/>
+              <a:t>NIPS</a:t>
+            </a:r>
+            <a:r>
+              <a:rPr lang="en-US" sz="1200" dirty="0"/>
+              <a:t>, 2016.</a:t>
+            </a:r>
+          </a:p>
+          <a:p>
+            <a:r>
+              <a:rPr lang="en-US" sz="1200" dirty="0"/>
+              <a:t>[6] C. </a:t>
+            </a:r>
+            <a:r>
+              <a:rPr lang="en-US" sz="1200" dirty="0" err="1"/>
+              <a:t>Dwork</a:t>
+            </a:r>
+            <a:r>
+              <a:rPr lang="en-US" sz="1200" dirty="0"/>
+              <a:t>, A. Roth. Differential privacy. </a:t>
+            </a:r>
+            <a:r>
+              <a:rPr lang="en-US" sz="1200" i="1" dirty="0"/>
+              <a:t>Foundations and Trends in Computer Science</a:t>
+            </a:r>
+            <a:r>
+              <a:rPr lang="en-US" sz="1200" dirty="0"/>
+              <a:t>, 2014.</a:t>
+            </a:r>
+          </a:p>
+          <a:p>
+            <a:r>
+              <a:rPr lang="en-US" sz="1200" dirty="0"/>
+              <a:t>[7] Y. Gal, Z. </a:t>
+            </a:r>
+            <a:r>
+              <a:rPr lang="en-US" sz="1200" dirty="0" err="1"/>
+              <a:t>Ghahramani</a:t>
+            </a:r>
+            <a:r>
+              <a:rPr lang="en-US" sz="1200" dirty="0"/>
+              <a:t>. Bayesian Convolutional Neural Networks with Bernoulli Approximate </a:t>
+            </a:r>
+            <a:r>
+              <a:rPr lang="en-US" sz="1200" dirty="0" err="1"/>
+              <a:t>Variational</a:t>
+            </a:r>
+            <a:r>
+              <a:rPr lang="en-US" sz="1200" dirty="0"/>
+              <a:t> Inference. </a:t>
+            </a:r>
+            <a:r>
+              <a:rPr lang="en-US" sz="1200" i="1" dirty="0"/>
+              <a:t>arXiv:1506.02158</a:t>
+            </a:r>
+            <a:r>
+              <a:rPr lang="en-US" sz="1200" dirty="0"/>
+              <a:t>, 2016. </a:t>
+            </a:r>
+          </a:p>
+          <a:p>
+            <a:r>
+              <a:rPr lang="en-US" sz="1200" dirty="0"/>
+              <a:t>[8] P.S. </a:t>
+            </a:r>
+            <a:r>
+              <a:rPr lang="en-US" sz="1200" dirty="0" err="1"/>
+              <a:t>Teh</a:t>
+            </a:r>
+            <a:r>
+              <a:rPr lang="en-US" sz="1200" dirty="0"/>
+              <a:t>, N. Zhang, A.B.J. Teoh, K. Chen. A survey on touch dynamics authentication in mobile devices. </a:t>
+            </a:r>
+            <a:r>
+              <a:rPr lang="en-US" sz="1200" i="1" dirty="0"/>
+              <a:t>Computers &amp; Security</a:t>
+            </a:r>
+            <a:r>
+              <a:rPr lang="en-US" sz="1200" dirty="0"/>
+              <a:t>,</a:t>
+            </a:r>
+            <a:r>
+              <a:rPr lang="en-US" sz="1200" i="1" dirty="0"/>
+              <a:t> </a:t>
+            </a:r>
+            <a:r>
+              <a:rPr lang="en-US" sz="1200" dirty="0"/>
+              <a:t>2016.</a:t>
+            </a:r>
+          </a:p>
+          <a:p>
+            <a:r>
+              <a:rPr lang="en-US" sz="1200" dirty="0"/>
+              <a:t>[9] H. Bae, S. Monti, M. Montano, M.H. Steinberg, T.T. </a:t>
+            </a:r>
+            <a:r>
+              <a:rPr lang="en-US" sz="1200" dirty="0" err="1"/>
+              <a:t>Perls</a:t>
+            </a:r>
+            <a:r>
+              <a:rPr lang="en-US" sz="1200" dirty="0"/>
+              <a:t>, P. </a:t>
+            </a:r>
+            <a:r>
+              <a:rPr lang="en-US" sz="1200" dirty="0" err="1"/>
+              <a:t>Sebastiani</a:t>
+            </a:r>
+            <a:r>
+              <a:rPr lang="en-US" sz="1200" dirty="0"/>
+              <a:t>. Learning Bayesian Networks from Correlated Data. </a:t>
+            </a:r>
+            <a:r>
+              <a:rPr lang="en-US" sz="1200" i="1" dirty="0"/>
+              <a:t>Nature Scientific Reports, </a:t>
+            </a:r>
+            <a:r>
+              <a:rPr lang="en-US" sz="1200" dirty="0"/>
+              <a:t>2016.</a:t>
+            </a:r>
+          </a:p>
+        </p:txBody>
+      </p:sp>
+      <p:sp>
+        <p:nvSpPr>
+          <p:cNvPr id="51" name="TextBox 50"/>
+          <p:cNvSpPr txBox="1"/>
+          <p:nvPr/>
+        </p:nvSpPr>
+        <p:spPr>
+          <a:xfrm>
+            <a:off x="8547099" y="16192501"/>
+            <a:ext cx="1635982" cy="451642"/>
+          </a:xfrm>
+          <a:prstGeom prst="rect">
+            <a:avLst/>
+          </a:prstGeom>
+          <a:noFill/>
+        </p:spPr>
+        <p:txBody>
+          <a:bodyPr wrap="none" lIns="40809" tIns="20405" rIns="40809" bIns="20405" rtlCol="0">
+            <a:spAutoFit/>
+          </a:bodyPr>
+          <a:lstStyle/>
+          <a:p>
+            <a:r>
+              <a:rPr lang="en-US" sz="2667" b="1" dirty="0"/>
+              <a:t>References</a:t>
+            </a:r>
+          </a:p>
+        </p:txBody>
+      </p:sp>
       <p:graphicFrame>
         <p:nvGraphicFramePr>
           <p:cNvPr id="46" name="Content Placeholder 114" descr="Sample table with 4 columns, 7 rows." title="Sample Table">
@@ -7327,14 +7325,14 @@
           <p:nvPr>
             <p:extLst>
               <p:ext uri="{D42A27DB-BD31-4B8C-83A1-F6EECF244321}">
-                <p14:modId xmlns:p14="http://schemas.microsoft.com/office/powerpoint/2010/main" val="1033144917"/>
+                <p14:modId xmlns:p14="http://schemas.microsoft.com/office/powerpoint/2010/main" val="485296792"/>
               </p:ext>
             </p:extLst>
           </p:nvPr>
         </p:nvGraphicFramePr>
         <p:xfrm>
-          <a:off x="18288000" y="9426925"/>
-          <a:ext cx="8229600" cy="1656383"/>
+          <a:off x="18287998" y="9492851"/>
+          <a:ext cx="8229602" cy="1656383"/>
         </p:xfrm>
         <a:graphic>
           <a:graphicData uri="http://schemas.openxmlformats.org/drawingml/2006/table">
@@ -7343,42 +7341,42 @@
                 <a:tableStyleId>{F5AB1C69-6EDB-4FF4-983F-18BD219EF322}</a:tableStyleId>
               </a:tblPr>
               <a:tblGrid>
-                <a:gridCol w="1371600">
+                <a:gridCol w="2313822">
                   <a:extLst>
                     <a:ext uri="{9D8B030D-6E8A-4147-A177-3AD203B41FA5}">
                       <a16:colId xmlns:a16="http://schemas.microsoft.com/office/drawing/2014/main" xmlns="" val="20000"/>
                     </a:ext>
                   </a:extLst>
                 </a:gridCol>
-                <a:gridCol w="1371600">
+                <a:gridCol w="1183156">
                   <a:extLst>
                     <a:ext uri="{9D8B030D-6E8A-4147-A177-3AD203B41FA5}">
                       <a16:colId xmlns:a16="http://schemas.microsoft.com/office/drawing/2014/main" xmlns="" val="20001"/>
                     </a:ext>
                   </a:extLst>
                 </a:gridCol>
-                <a:gridCol w="1371600">
+                <a:gridCol w="1183156">
                   <a:extLst>
                     <a:ext uri="{9D8B030D-6E8A-4147-A177-3AD203B41FA5}">
                       <a16:colId xmlns:a16="http://schemas.microsoft.com/office/drawing/2014/main" xmlns="" val="20002"/>
                     </a:ext>
                   </a:extLst>
                 </a:gridCol>
-                <a:gridCol w="1371600">
+                <a:gridCol w="1183156">
                   <a:extLst>
                     <a:ext uri="{9D8B030D-6E8A-4147-A177-3AD203B41FA5}">
                       <a16:colId xmlns:a16="http://schemas.microsoft.com/office/drawing/2014/main" xmlns="" val="20003"/>
                     </a:ext>
                   </a:extLst>
                 </a:gridCol>
-                <a:gridCol w="1371600">
+                <a:gridCol w="1183156">
                   <a:extLst>
                     <a:ext uri="{9D8B030D-6E8A-4147-A177-3AD203B41FA5}">
                       <a16:colId xmlns:a16="http://schemas.microsoft.com/office/drawing/2014/main" xmlns="" val="886844001"/>
                     </a:ext>
                   </a:extLst>
                 </a:gridCol>
-                <a:gridCol w="1371600">
+                <a:gridCol w="1183156">
                   <a:extLst>
                     <a:ext uri="{9D8B030D-6E8A-4147-A177-3AD203B41FA5}">
                       <a16:colId xmlns:a16="http://schemas.microsoft.com/office/drawing/2014/main" xmlns="" val="1355434412"/>
@@ -7571,8 +7569,8 @@
                         <a:t>-means </a:t>
                       </a:r>
                       <a:r>
-                        <a:rPr lang="en-US" sz="2000" i="0" dirty="0" err="1"/>
-                        <a:t>centerpoint</a:t>
+                        <a:rPr lang="en-US" sz="2000" i="0" dirty="0" smtClean="0"/>
+                        <a:t>center</a:t>
                       </a:r>
                       <a:endParaRPr lang="en-US" sz="2000" i="1" dirty="0"/>
                     </a:p>
@@ -7903,21 +7901,18 @@
                     <a:p>
                       <a:pPr algn="ctr"/>
                       <a:r>
-                        <a:rPr lang="en-US" sz="2000" i="1" dirty="0"/>
+                        <a:rPr lang="en-US" sz="2000" i="1" dirty="0" smtClean="0"/>
                         <a:t>k-</a:t>
                       </a:r>
                       <a:r>
-                        <a:rPr lang="en-US" sz="2000" i="0" dirty="0"/>
-                        <a:t>means </a:t>
+                        <a:rPr lang="en-US" sz="2000" i="0" dirty="0" smtClean="0"/>
+                        <a:t>cluster </a:t>
                       </a:r>
-                    </a:p>
-                    <a:p>
-                      <a:pPr algn="ctr"/>
                       <a:r>
-                        <a:rPr lang="en-US" sz="2000" i="0" dirty="0"/>
-                        <a:t>5-cluster</a:t>
+                        <a:rPr lang="en-US" sz="2000" i="0" smtClean="0"/>
+                        <a:t>Gaussian samples</a:t>
                       </a:r>
-                      <a:endParaRPr lang="en-US" sz="2000" i="1" dirty="0"/>
+                      <a:endParaRPr lang="en-US" sz="2000" i="0" dirty="0"/>
                     </a:p>
                   </a:txBody>
                   <a:tcPr marL="76200" marR="76200" marT="19051" marB="19051" anchor="ctr">
@@ -8242,15 +8237,1227 @@
           </a:graphicData>
         </a:graphic>
       </p:graphicFrame>
+      <p:pic>
+        <p:nvPicPr>
+          <p:cNvPr id="42" name="Picture 41"/>
+          <p:cNvPicPr>
+            <a:picLocks noChangeAspect="1"/>
+          </p:cNvPicPr>
+          <p:nvPr/>
+        </p:nvPicPr>
+        <p:blipFill>
+          <a:blip r:embed="rId6">
+            <a:extLst>
+              <a:ext uri="{28A0092B-C50C-407E-A947-70E740481C1C}">
+                <a14:useLocalDpi xmlns:a14="http://schemas.microsoft.com/office/drawing/2010/main" val="0"/>
+              </a:ext>
+            </a:extLst>
+          </a:blip>
+          <a:stretch>
+            <a:fillRect/>
+          </a:stretch>
+        </p:blipFill>
+        <p:spPr>
+          <a:xfrm>
+            <a:off x="11815239" y="6974132"/>
+            <a:ext cx="4412428" cy="2365360"/>
+          </a:xfrm>
+          <a:prstGeom prst="rect">
+            <a:avLst/>
+          </a:prstGeom>
+        </p:spPr>
+      </p:pic>
+      <p:grpSp>
+        <p:nvGrpSpPr>
+          <p:cNvPr id="30" name="Group 29"/>
+          <p:cNvGrpSpPr/>
+          <p:nvPr/>
+        </p:nvGrpSpPr>
+        <p:grpSpPr>
+          <a:xfrm>
+            <a:off x="902110" y="13403748"/>
+            <a:ext cx="3942993" cy="2293452"/>
+            <a:chOff x="604211" y="13280688"/>
+            <a:chExt cx="9168183" cy="2440203"/>
+          </a:xfrm>
+        </p:grpSpPr>
+        <p:graphicFrame>
+          <p:nvGraphicFramePr>
+            <p:cNvPr id="31" name="Content Placeholder 114" descr="Sample table with 4 columns, 7 rows." title="Sample Table"/>
+            <p:cNvGraphicFramePr>
+              <a:graphicFrameLocks/>
+            </p:cNvGraphicFramePr>
+            <p:nvPr>
+              <p:extLst>
+                <p:ext uri="{D42A27DB-BD31-4B8C-83A1-F6EECF244321}">
+                  <p14:modId xmlns:p14="http://schemas.microsoft.com/office/powerpoint/2010/main" val="1765043231"/>
+                </p:ext>
+              </p:extLst>
+            </p:nvPr>
+          </p:nvGraphicFramePr>
+          <p:xfrm>
+            <a:off x="2666846" y="14107021"/>
+            <a:ext cx="7105548" cy="1239135"/>
+          </p:xfrm>
+          <a:graphic>
+            <a:graphicData uri="http://schemas.openxmlformats.org/drawingml/2006/table">
+              <a:tbl>
+                <a:tblPr firstRow="1" bandRow="1">
+                  <a:tableStyleId>{F5AB1C69-6EDB-4FF4-983F-18BD219EF322}</a:tableStyleId>
+                </a:tblPr>
+                <a:tblGrid>
+                  <a:gridCol w="731936">
+                    <a:extLst>
+                      <a:ext uri="{9D8B030D-6E8A-4147-A177-3AD203B41FA5}">
+                        <a16:colId xmlns="" xmlns:a16="http://schemas.microsoft.com/office/drawing/2014/main" val="20000"/>
+                      </a:ext>
+                    </a:extLst>
+                  </a:gridCol>
+                  <a:gridCol w="600609">
+                    <a:extLst>
+                      <a:ext uri="{9D8B030D-6E8A-4147-A177-3AD203B41FA5}">
+                        <a16:colId xmlns="" xmlns:a16="http://schemas.microsoft.com/office/drawing/2014/main" val="20001"/>
+                      </a:ext>
+                    </a:extLst>
+                  </a:gridCol>
+                  <a:gridCol w="501348">
+                    <a:extLst>
+                      <a:ext uri="{9D8B030D-6E8A-4147-A177-3AD203B41FA5}">
+                        <a16:colId xmlns="" xmlns:a16="http://schemas.microsoft.com/office/drawing/2014/main" val="20002"/>
+                      </a:ext>
+                    </a:extLst>
+                  </a:gridCol>
+                  <a:gridCol w="1222015">
+                    <a:extLst>
+                      <a:ext uri="{9D8B030D-6E8A-4147-A177-3AD203B41FA5}">
+                        <a16:colId xmlns="" xmlns:a16="http://schemas.microsoft.com/office/drawing/2014/main" val="20003"/>
+                      </a:ext>
+                    </a:extLst>
+                  </a:gridCol>
+                </a:tblGrid>
+                <a:tr h="221928">
+                  <a:tc>
+                    <a:txBody>
+                      <a:bodyPr/>
+                      <a:lstStyle/>
+                      <a:p>
+                        <a:pPr algn="ctr"/>
+                        <a:r>
+                          <a:rPr lang="en-US" sz="1400" dirty="0" smtClean="0"/>
+                          <a:t>Subject</a:t>
+                        </a:r>
+                        <a:endParaRPr lang="en-US" sz="1400" dirty="0"/>
+                      </a:p>
+                    </a:txBody>
+                    <a:tcPr marL="76200" marR="76200" marT="19051" marB="19051" anchor="ctr">
+                      <a:solidFill>
+                        <a:schemeClr val="accent1">
+                          <a:lumMod val="75000"/>
+                        </a:schemeClr>
+                      </a:solidFill>
+                    </a:tcPr>
+                  </a:tc>
+                  <a:tc>
+                    <a:txBody>
+                      <a:bodyPr/>
+                      <a:lstStyle/>
+                      <a:p>
+                        <a:pPr algn="ctr"/>
+                        <a:r>
+                          <a:rPr lang="en-US" sz="1400" dirty="0"/>
+                          <a:t>Hold .</a:t>
+                        </a:r>
+                      </a:p>
+                    </a:txBody>
+                    <a:tcPr marL="76200" marR="76200" marT="19051" marB="19051" anchor="ctr">
+                      <a:solidFill>
+                        <a:schemeClr val="accent1">
+                          <a:lumMod val="75000"/>
+                        </a:schemeClr>
+                      </a:solidFill>
+                    </a:tcPr>
+                  </a:tc>
+                  <a:tc>
+                    <a:txBody>
+                      <a:bodyPr/>
+                      <a:lstStyle/>
+                      <a:p>
+                        <a:pPr algn="ctr"/>
+                        <a:r>
+                          <a:rPr lang="en-US" sz="1400" dirty="0"/>
+                          <a:t>...</a:t>
+                        </a:r>
+                      </a:p>
+                    </a:txBody>
+                    <a:tcPr marL="76200" marR="76200" marT="19051" marB="19051" anchor="ctr">
+                      <a:solidFill>
+                        <a:schemeClr val="accent1">
+                          <a:lumMod val="75000"/>
+                        </a:schemeClr>
+                      </a:solidFill>
+                    </a:tcPr>
+                  </a:tc>
+                  <a:tc>
+                    <a:txBody>
+                      <a:bodyPr/>
+                      <a:lstStyle/>
+                      <a:p>
+                        <a:pPr algn="ctr"/>
+                        <a:r>
+                          <a:rPr lang="en-US" sz="1400" dirty="0" err="1"/>
+                          <a:t>AvA</a:t>
+                        </a:r>
+                        <a:endParaRPr lang="en-US" sz="1400" dirty="0"/>
+                      </a:p>
+                    </a:txBody>
+                    <a:tcPr marL="76200" marR="76200" marT="19051" marB="19051" anchor="ctr">
+                      <a:solidFill>
+                        <a:schemeClr val="accent1">
+                          <a:lumMod val="75000"/>
+                        </a:schemeClr>
+                      </a:solidFill>
+                    </a:tcPr>
+                  </a:tc>
+                  <a:extLst>
+                    <a:ext uri="{0D108BD9-81ED-4DB2-BD59-A6C34878D82A}">
+                      <a16:rowId xmlns="" xmlns:a16="http://schemas.microsoft.com/office/drawing/2014/main" val="10000"/>
+                    </a:ext>
+                  </a:extLst>
+                </a:tr>
+                <a:tr h="410229">
+                  <a:tc>
+                    <a:txBody>
+                      <a:bodyPr/>
+                      <a:lstStyle/>
+                      <a:p>
+                        <a:pPr algn="ctr"/>
+                        <a:r>
+                          <a:rPr lang="en-US" sz="1400" dirty="0"/>
+                          <a:t>1</a:t>
+                        </a:r>
+                      </a:p>
+                    </a:txBody>
+                    <a:tcPr marL="76200" marR="76200" marT="19051" marB="19051" anchor="ctr"/>
+                  </a:tc>
+                  <a:tc>
+                    <a:txBody>
+                      <a:bodyPr/>
+                      <a:lstStyle/>
+                      <a:p>
+                        <a:pPr algn="ctr"/>
+                        <a:r>
+                          <a:rPr lang="en-US" sz="1400" dirty="0" smtClean="0"/>
+                          <a:t>89</a:t>
+                        </a:r>
+                        <a:endParaRPr lang="en-US" sz="1400" dirty="0"/>
+                      </a:p>
+                    </a:txBody>
+                    <a:tcPr marL="76200" marR="76200" marT="19051" marB="19051" anchor="ctr"/>
+                  </a:tc>
+                  <a:tc>
+                    <a:txBody>
+                      <a:bodyPr/>
+                      <a:lstStyle/>
+                      <a:p>
+                        <a:pPr algn="ctr"/>
+                        <a:r>
+                          <a:rPr lang="en-US" sz="1400" dirty="0"/>
+                          <a:t>…</a:t>
+                        </a:r>
+                      </a:p>
+                    </a:txBody>
+                    <a:tcPr marL="76200" marR="76200" marT="19051" marB="19051" anchor="ctr"/>
+                  </a:tc>
+                  <a:tc>
+                    <a:txBody>
+                      <a:bodyPr/>
+                      <a:lstStyle/>
+                      <a:p>
+                        <a:pPr algn="ctr"/>
+                        <a:r>
+                          <a:rPr lang="en-US" sz="1400" dirty="0" smtClean="0"/>
+                          <a:t>0.2880184</a:t>
+                        </a:r>
+                        <a:endParaRPr lang="en-US" sz="1400" dirty="0"/>
+                      </a:p>
+                    </a:txBody>
+                    <a:tcPr marL="76200" marR="76200" marT="19051" marB="19051" anchor="ctr"/>
+                  </a:tc>
+                  <a:extLst>
+                    <a:ext uri="{0D108BD9-81ED-4DB2-BD59-A6C34878D82A}">
+                      <a16:rowId xmlns="" xmlns:a16="http://schemas.microsoft.com/office/drawing/2014/main" val="10001"/>
+                    </a:ext>
+                  </a:extLst>
+                </a:tr>
+                <a:tr h="221928">
+                  <a:tc>
+                    <a:txBody>
+                      <a:bodyPr/>
+                      <a:lstStyle/>
+                      <a:p>
+                        <a:pPr algn="ctr"/>
+                        <a:r>
+                          <a:rPr lang="en-US" sz="1400" dirty="0"/>
+                          <a:t>…</a:t>
+                        </a:r>
+                      </a:p>
+                    </a:txBody>
+                    <a:tcPr marL="76200" marR="76200" marT="19051" marB="19051" anchor="ctr"/>
+                  </a:tc>
+                  <a:tc>
+                    <a:txBody>
+                      <a:bodyPr/>
+                      <a:lstStyle/>
+                      <a:p>
+                        <a:pPr algn="ctr"/>
+                        <a:r>
+                          <a:rPr lang="en-US" sz="1400" dirty="0"/>
+                          <a:t>…</a:t>
+                        </a:r>
+                      </a:p>
+                    </a:txBody>
+                    <a:tcPr marL="76200" marR="76200" marT="19051" marB="19051" anchor="ctr"/>
+                  </a:tc>
+                  <a:tc>
+                    <a:txBody>
+                      <a:bodyPr/>
+                      <a:lstStyle/>
+                      <a:p>
+                        <a:pPr algn="ctr"/>
+                        <a:r>
+                          <a:rPr lang="en-US" sz="1400" dirty="0"/>
+                          <a:t>…</a:t>
+                        </a:r>
+                      </a:p>
+                    </a:txBody>
+                    <a:tcPr marL="76200" marR="76200" marT="19051" marB="19051" anchor="ctr"/>
+                  </a:tc>
+                  <a:tc>
+                    <a:txBody>
+                      <a:bodyPr/>
+                      <a:lstStyle/>
+                      <a:p>
+                        <a:pPr algn="ctr"/>
+                        <a:r>
+                          <a:rPr lang="en-US" sz="1400" dirty="0"/>
+                          <a:t>…</a:t>
+                        </a:r>
+                      </a:p>
+                    </a:txBody>
+                    <a:tcPr marL="76200" marR="76200" marT="19051" marB="19051" anchor="ctr"/>
+                  </a:tc>
+                  <a:extLst>
+                    <a:ext uri="{0D108BD9-81ED-4DB2-BD59-A6C34878D82A}">
+                      <a16:rowId xmlns="" xmlns:a16="http://schemas.microsoft.com/office/drawing/2014/main" val="10002"/>
+                    </a:ext>
+                  </a:extLst>
+                </a:tr>
+                <a:tr h="221928">
+                  <a:tc>
+                    <a:txBody>
+                      <a:bodyPr/>
+                      <a:lstStyle/>
+                      <a:p>
+                        <a:pPr algn="ctr"/>
+                        <a:r>
+                          <a:rPr lang="en-US" sz="1400" dirty="0"/>
+                          <a:t>56</a:t>
+                        </a:r>
+                      </a:p>
+                    </a:txBody>
+                    <a:tcPr marL="76200" marR="76200" marT="19051" marB="19051" anchor="ctr"/>
+                  </a:tc>
+                  <a:tc>
+                    <a:txBody>
+                      <a:bodyPr/>
+                      <a:lstStyle/>
+                      <a:p>
+                        <a:pPr algn="ctr"/>
+                        <a:r>
+                          <a:rPr lang="en-US" sz="1400" dirty="0"/>
+                          <a:t>80</a:t>
+                        </a:r>
+                      </a:p>
+                    </a:txBody>
+                    <a:tcPr marL="76200" marR="76200" marT="19051" marB="19051" anchor="ctr"/>
+                  </a:tc>
+                  <a:tc>
+                    <a:txBody>
+                      <a:bodyPr/>
+                      <a:lstStyle/>
+                      <a:p>
+                        <a:pPr algn="ctr"/>
+                        <a:r>
+                          <a:rPr lang="en-US" sz="1400" dirty="0"/>
+                          <a:t>…</a:t>
+                        </a:r>
+                      </a:p>
+                    </a:txBody>
+                    <a:tcPr marL="76200" marR="76200" marT="19051" marB="19051" anchor="ctr"/>
+                  </a:tc>
+                  <a:tc>
+                    <a:txBody>
+                      <a:bodyPr/>
+                      <a:lstStyle/>
+                      <a:p>
+                        <a:pPr algn="ctr"/>
+                        <a:r>
+                          <a:rPr lang="en-US" sz="1400" dirty="0"/>
+                          <a:t>0.260369</a:t>
+                        </a:r>
+                      </a:p>
+                    </a:txBody>
+                    <a:tcPr marL="76200" marR="76200" marT="19051" marB="19051" anchor="ctr"/>
+                  </a:tc>
+                  <a:extLst>
+                    <a:ext uri="{0D108BD9-81ED-4DB2-BD59-A6C34878D82A}">
+                      <a16:rowId xmlns="" xmlns:a16="http://schemas.microsoft.com/office/drawing/2014/main" val="10003"/>
+                    </a:ext>
+                  </a:extLst>
+                </a:tr>
+              </a:tbl>
+            </a:graphicData>
+          </a:graphic>
+        </p:graphicFrame>
+        <p:sp>
+          <p:nvSpPr>
+            <p:cNvPr id="37" name="Text Box 180"/>
+            <p:cNvSpPr txBox="1">
+              <a:spLocks noChangeArrowheads="1"/>
+            </p:cNvSpPr>
+            <p:nvPr/>
+          </p:nvSpPr>
+          <p:spPr bwMode="auto">
+            <a:xfrm>
+              <a:off x="1447800" y="15433461"/>
+              <a:ext cx="7254712" cy="287430"/>
+            </a:xfrm>
+            <a:prstGeom prst="rect">
+              <a:avLst/>
+            </a:prstGeom>
+            <a:noFill/>
+            <a:ln>
+              <a:noFill/>
+            </a:ln>
+            <a:effectLst/>
+            <a:extLst>
+              <a:ext uri="{909E8E84-426E-40DD-AFC4-6F175D3DCCD1}">
+                <a14:hiddenFill xmlns:a14="http://schemas.microsoft.com/office/drawing/2010/main">
+                  <a:solidFill>
+                    <a:schemeClr val="accent1"/>
+                  </a:solidFill>
+                </a14:hiddenFill>
+              </a:ext>
+              <a:ext uri="{91240B29-F687-4F45-9708-019B960494DF}">
+                <a14:hiddenLine xmlns:a14="http://schemas.microsoft.com/office/drawing/2010/main" w="9525">
+                  <a:solidFill>
+                    <a:schemeClr val="tx1"/>
+                  </a:solidFill>
+                  <a:miter lim="800000"/>
+                  <a:headEnd/>
+                  <a:tailEnd/>
+                </a14:hiddenLine>
+              </a:ext>
+              <a:ext uri="{AF507438-7753-43E0-B8FC-AC1667EBCBE1}">
+                <a14:hiddenEffects xmlns:a14="http://schemas.microsoft.com/office/drawing/2010/main">
+                  <a:effectLst>
+                    <a:outerShdw dist="35921" dir="2700000" algn="ctr" rotWithShape="0">
+                      <a:schemeClr val="bg2"/>
+                    </a:outerShdw>
+                  </a:effectLst>
+                </a14:hiddenEffects>
+              </a:ext>
+            </a:extLst>
+          </p:spPr>
+          <p:txBody>
+            <a:bodyPr wrap="square" lIns="40809" tIns="20405" rIns="40809" bIns="20405">
+              <a:spAutoFit/>
+            </a:bodyPr>
+            <a:lstStyle>
+              <a:lvl1pPr defTabSz="4389438" eaLnBrk="0" hangingPunct="0">
+                <a:defRPr sz="2200">
+                  <a:solidFill>
+                    <a:schemeClr val="tx1"/>
+                  </a:solidFill>
+                  <a:latin typeface="Arial" charset="0"/>
+                </a:defRPr>
+              </a:lvl1pPr>
+              <a:lvl2pPr marL="742950" indent="-285750" defTabSz="4389438" eaLnBrk="0" hangingPunct="0">
+                <a:defRPr sz="2200">
+                  <a:solidFill>
+                    <a:schemeClr val="tx1"/>
+                  </a:solidFill>
+                  <a:latin typeface="Arial" charset="0"/>
+                </a:defRPr>
+              </a:lvl2pPr>
+              <a:lvl3pPr marL="1143000" indent="-228600" defTabSz="4389438" eaLnBrk="0" hangingPunct="0">
+                <a:defRPr sz="2200">
+                  <a:solidFill>
+                    <a:schemeClr val="tx1"/>
+                  </a:solidFill>
+                  <a:latin typeface="Arial" charset="0"/>
+                </a:defRPr>
+              </a:lvl3pPr>
+              <a:lvl4pPr marL="1600200" indent="-228600" defTabSz="4389438" eaLnBrk="0" hangingPunct="0">
+                <a:defRPr sz="2200">
+                  <a:solidFill>
+                    <a:schemeClr val="tx1"/>
+                  </a:solidFill>
+                  <a:latin typeface="Arial" charset="0"/>
+                </a:defRPr>
+              </a:lvl4pPr>
+              <a:lvl5pPr marL="2057400" indent="-228600" defTabSz="4389438" eaLnBrk="0" hangingPunct="0">
+                <a:defRPr sz="2200">
+                  <a:solidFill>
+                    <a:schemeClr val="tx1"/>
+                  </a:solidFill>
+                  <a:latin typeface="Arial" charset="0"/>
+                </a:defRPr>
+              </a:lvl5pPr>
+              <a:lvl6pPr marL="2514600" indent="-228600" defTabSz="4389438" eaLnBrk="0" fontAlgn="base" hangingPunct="0">
+                <a:spcBef>
+                  <a:spcPct val="0"/>
+                </a:spcBef>
+                <a:spcAft>
+                  <a:spcPct val="0"/>
+                </a:spcAft>
+                <a:defRPr sz="2200">
+                  <a:solidFill>
+                    <a:schemeClr val="tx1"/>
+                  </a:solidFill>
+                  <a:latin typeface="Arial" charset="0"/>
+                </a:defRPr>
+              </a:lvl6pPr>
+              <a:lvl7pPr marL="2971800" indent="-228600" defTabSz="4389438" eaLnBrk="0" fontAlgn="base" hangingPunct="0">
+                <a:spcBef>
+                  <a:spcPct val="0"/>
+                </a:spcBef>
+                <a:spcAft>
+                  <a:spcPct val="0"/>
+                </a:spcAft>
+                <a:defRPr sz="2200">
+                  <a:solidFill>
+                    <a:schemeClr val="tx1"/>
+                  </a:solidFill>
+                  <a:latin typeface="Arial" charset="0"/>
+                </a:defRPr>
+              </a:lvl7pPr>
+              <a:lvl8pPr marL="3429000" indent="-228600" defTabSz="4389438" eaLnBrk="0" fontAlgn="base" hangingPunct="0">
+                <a:spcBef>
+                  <a:spcPct val="0"/>
+                </a:spcBef>
+                <a:spcAft>
+                  <a:spcPct val="0"/>
+                </a:spcAft>
+                <a:defRPr sz="2200">
+                  <a:solidFill>
+                    <a:schemeClr val="tx1"/>
+                  </a:solidFill>
+                  <a:latin typeface="Arial" charset="0"/>
+                </a:defRPr>
+              </a:lvl8pPr>
+              <a:lvl9pPr marL="3886200" indent="-228600" defTabSz="4389438" eaLnBrk="0" fontAlgn="base" hangingPunct="0">
+                <a:spcBef>
+                  <a:spcPct val="0"/>
+                </a:spcBef>
+                <a:spcAft>
+                  <a:spcPct val="0"/>
+                </a:spcAft>
+                <a:defRPr sz="2200">
+                  <a:solidFill>
+                    <a:schemeClr val="tx1"/>
+                  </a:solidFill>
+                  <a:latin typeface="Arial" charset="0"/>
+                </a:defRPr>
+              </a:lvl9pPr>
+            </a:lstStyle>
+            <a:p>
+              <a:pPr algn="ctr" eaLnBrk="1" hangingPunct="1"/>
+              <a:r>
+                <a:rPr lang="en-US" sz="1600" b="1" dirty="0">
+                  <a:latin typeface="Calibri" pitchFamily="34" charset="0"/>
+                </a:rPr>
+                <a:t>Table 1.</a:t>
+              </a:r>
+              <a:r>
+                <a:rPr lang="en-US" sz="1600" dirty="0">
+                  <a:latin typeface="Calibri" pitchFamily="34" charset="0"/>
+                </a:rPr>
+                <a:t> Feature vector format.</a:t>
+              </a:r>
+            </a:p>
+          </p:txBody>
+        </p:sp>
+        <p:sp>
+          <p:nvSpPr>
+            <p:cNvPr id="41" name="Text Box 180"/>
+            <p:cNvSpPr txBox="1">
+              <a:spLocks noChangeArrowheads="1"/>
+            </p:cNvSpPr>
+            <p:nvPr/>
+          </p:nvSpPr>
+          <p:spPr bwMode="auto">
+            <a:xfrm>
+              <a:off x="604211" y="14351486"/>
+              <a:ext cx="1679176" cy="1026256"/>
+            </a:xfrm>
+            <a:prstGeom prst="rect">
+              <a:avLst/>
+            </a:prstGeom>
+            <a:noFill/>
+            <a:ln>
+              <a:noFill/>
+            </a:ln>
+            <a:effectLst/>
+            <a:extLst>
+              <a:ext uri="{909E8E84-426E-40DD-AFC4-6F175D3DCCD1}">
+                <a14:hiddenFill xmlns:a14="http://schemas.microsoft.com/office/drawing/2010/main">
+                  <a:solidFill>
+                    <a:schemeClr val="accent1"/>
+                  </a:solidFill>
+                </a14:hiddenFill>
+              </a:ext>
+              <a:ext uri="{91240B29-F687-4F45-9708-019B960494DF}">
+                <a14:hiddenLine xmlns:a14="http://schemas.microsoft.com/office/drawing/2010/main" w="9525">
+                  <a:solidFill>
+                    <a:schemeClr val="tx1"/>
+                  </a:solidFill>
+                  <a:miter lim="800000"/>
+                  <a:headEnd/>
+                  <a:tailEnd/>
+                </a14:hiddenLine>
+              </a:ext>
+              <a:ext uri="{AF507438-7753-43E0-B8FC-AC1667EBCBE1}">
+                <a14:hiddenEffects xmlns:a14="http://schemas.microsoft.com/office/drawing/2010/main">
+                  <a:effectLst>
+                    <a:outerShdw dist="35921" dir="2700000" algn="ctr" rotWithShape="0">
+                      <a:schemeClr val="bg2"/>
+                    </a:outerShdw>
+                  </a:effectLst>
+                </a14:hiddenEffects>
+              </a:ext>
+            </a:extLst>
+          </p:spPr>
+          <p:txBody>
+            <a:bodyPr wrap="square" lIns="40809" tIns="20405" rIns="40809" bIns="20405">
+              <a:spAutoFit/>
+            </a:bodyPr>
+            <a:lstStyle>
+              <a:lvl1pPr defTabSz="4389438" eaLnBrk="0" hangingPunct="0">
+                <a:defRPr sz="2200">
+                  <a:solidFill>
+                    <a:schemeClr val="tx1"/>
+                  </a:solidFill>
+                  <a:latin typeface="Arial" charset="0"/>
+                </a:defRPr>
+              </a:lvl1pPr>
+              <a:lvl2pPr marL="742950" indent="-285750" defTabSz="4389438" eaLnBrk="0" hangingPunct="0">
+                <a:defRPr sz="2200">
+                  <a:solidFill>
+                    <a:schemeClr val="tx1"/>
+                  </a:solidFill>
+                  <a:latin typeface="Arial" charset="0"/>
+                </a:defRPr>
+              </a:lvl2pPr>
+              <a:lvl3pPr marL="1143000" indent="-228600" defTabSz="4389438" eaLnBrk="0" hangingPunct="0">
+                <a:defRPr sz="2200">
+                  <a:solidFill>
+                    <a:schemeClr val="tx1"/>
+                  </a:solidFill>
+                  <a:latin typeface="Arial" charset="0"/>
+                </a:defRPr>
+              </a:lvl3pPr>
+              <a:lvl4pPr marL="1600200" indent="-228600" defTabSz="4389438" eaLnBrk="0" hangingPunct="0">
+                <a:defRPr sz="2200">
+                  <a:solidFill>
+                    <a:schemeClr val="tx1"/>
+                  </a:solidFill>
+                  <a:latin typeface="Arial" charset="0"/>
+                </a:defRPr>
+              </a:lvl4pPr>
+              <a:lvl5pPr marL="2057400" indent="-228600" defTabSz="4389438" eaLnBrk="0" hangingPunct="0">
+                <a:defRPr sz="2200">
+                  <a:solidFill>
+                    <a:schemeClr val="tx1"/>
+                  </a:solidFill>
+                  <a:latin typeface="Arial" charset="0"/>
+                </a:defRPr>
+              </a:lvl5pPr>
+              <a:lvl6pPr marL="2514600" indent="-228600" defTabSz="4389438" eaLnBrk="0" fontAlgn="base" hangingPunct="0">
+                <a:spcBef>
+                  <a:spcPct val="0"/>
+                </a:spcBef>
+                <a:spcAft>
+                  <a:spcPct val="0"/>
+                </a:spcAft>
+                <a:defRPr sz="2200">
+                  <a:solidFill>
+                    <a:schemeClr val="tx1"/>
+                  </a:solidFill>
+                  <a:latin typeface="Arial" charset="0"/>
+                </a:defRPr>
+              </a:lvl6pPr>
+              <a:lvl7pPr marL="2971800" indent="-228600" defTabSz="4389438" eaLnBrk="0" fontAlgn="base" hangingPunct="0">
+                <a:spcBef>
+                  <a:spcPct val="0"/>
+                </a:spcBef>
+                <a:spcAft>
+                  <a:spcPct val="0"/>
+                </a:spcAft>
+                <a:defRPr sz="2200">
+                  <a:solidFill>
+                    <a:schemeClr val="tx1"/>
+                  </a:solidFill>
+                  <a:latin typeface="Arial" charset="0"/>
+                </a:defRPr>
+              </a:lvl7pPr>
+              <a:lvl8pPr marL="3429000" indent="-228600" defTabSz="4389438" eaLnBrk="0" fontAlgn="base" hangingPunct="0">
+                <a:spcBef>
+                  <a:spcPct val="0"/>
+                </a:spcBef>
+                <a:spcAft>
+                  <a:spcPct val="0"/>
+                </a:spcAft>
+                <a:defRPr sz="2200">
+                  <a:solidFill>
+                    <a:schemeClr val="tx1"/>
+                  </a:solidFill>
+                  <a:latin typeface="Arial" charset="0"/>
+                </a:defRPr>
+              </a:lvl8pPr>
+              <a:lvl9pPr marL="3886200" indent="-228600" defTabSz="4389438" eaLnBrk="0" fontAlgn="base" hangingPunct="0">
+                <a:spcBef>
+                  <a:spcPct val="0"/>
+                </a:spcBef>
+                <a:spcAft>
+                  <a:spcPct val="0"/>
+                </a:spcAft>
+                <a:defRPr sz="2200">
+                  <a:solidFill>
+                    <a:schemeClr val="tx1"/>
+                  </a:solidFill>
+                  <a:latin typeface="Arial" charset="0"/>
+                </a:defRPr>
+              </a:lvl9pPr>
+            </a:lstStyle>
+            <a:p>
+              <a:pPr algn="ctr" eaLnBrk="1" hangingPunct="1"/>
+              <a:r>
+                <a:rPr lang="en-US" sz="1200" dirty="0">
+                  <a:latin typeface="Calibri" pitchFamily="34" charset="0"/>
+                </a:rPr>
+                <a:t>56 subjects</a:t>
+              </a:r>
+            </a:p>
+            <a:p>
+              <a:pPr algn="ctr" eaLnBrk="1" hangingPunct="1"/>
+              <a:r>
+                <a:rPr lang="en-US" sz="1200" dirty="0">
+                  <a:latin typeface="Calibri" pitchFamily="34" charset="0"/>
+                </a:rPr>
+                <a:t>51 records</a:t>
+              </a:r>
+              <a:r>
+                <a:rPr lang="en-US" sz="1200" dirty="0" smtClean="0">
+                  <a:latin typeface="Calibri" pitchFamily="34" charset="0"/>
+                </a:rPr>
+                <a:t>/</a:t>
+              </a:r>
+            </a:p>
+            <a:p>
+              <a:pPr algn="ctr" eaLnBrk="1" hangingPunct="1"/>
+              <a:r>
+                <a:rPr lang="en-US" sz="1200" dirty="0" smtClean="0">
+                  <a:latin typeface="Calibri" pitchFamily="34" charset="0"/>
+                </a:rPr>
+                <a:t>subject</a:t>
+              </a:r>
+              <a:endParaRPr lang="en-US" sz="1200" dirty="0">
+                <a:latin typeface="Calibri" pitchFamily="34" charset="0"/>
+              </a:endParaRPr>
+            </a:p>
+          </p:txBody>
+        </p:sp>
+        <p:sp>
+          <p:nvSpPr>
+            <p:cNvPr id="43" name="Left Brace 42"/>
+            <p:cNvSpPr/>
+            <p:nvPr/>
+          </p:nvSpPr>
+          <p:spPr>
+            <a:xfrm rot="5400000">
+              <a:off x="5991096" y="11301032"/>
+              <a:ext cx="304800" cy="5189920"/>
+            </a:xfrm>
+            <a:prstGeom prst="leftBrace">
+              <a:avLst>
+                <a:gd name="adj1" fmla="val 53021"/>
+                <a:gd name="adj2" fmla="val 50000"/>
+              </a:avLst>
+            </a:prstGeom>
+            <a:ln w="38100"/>
+          </p:spPr>
+          <p:style>
+            <a:lnRef idx="1">
+              <a:schemeClr val="dk1"/>
+            </a:lnRef>
+            <a:fillRef idx="0">
+              <a:schemeClr val="dk1"/>
+            </a:fillRef>
+            <a:effectRef idx="0">
+              <a:schemeClr val="dk1"/>
+            </a:effectRef>
+            <a:fontRef idx="minor">
+              <a:schemeClr val="tx1"/>
+            </a:fontRef>
+          </p:style>
+          <p:txBody>
+            <a:bodyPr rtlCol="0" anchor="ctr"/>
+            <a:lstStyle/>
+            <a:p>
+              <a:pPr algn="ctr"/>
+              <a:endParaRPr lang="en-US"/>
+            </a:p>
+          </p:txBody>
+        </p:sp>
+        <p:sp>
+          <p:nvSpPr>
+            <p:cNvPr id="44" name="Text Box 180"/>
+            <p:cNvSpPr txBox="1">
+              <a:spLocks noChangeArrowheads="1"/>
+            </p:cNvSpPr>
+            <p:nvPr/>
+          </p:nvSpPr>
+          <p:spPr bwMode="auto">
+            <a:xfrm>
+              <a:off x="5303907" y="13280688"/>
+              <a:ext cx="1679176" cy="572424"/>
+            </a:xfrm>
+            <a:prstGeom prst="rect">
+              <a:avLst/>
+            </a:prstGeom>
+            <a:noFill/>
+            <a:ln>
+              <a:noFill/>
+            </a:ln>
+            <a:effectLst/>
+            <a:extLst>
+              <a:ext uri="{909E8E84-426E-40DD-AFC4-6F175D3DCCD1}">
+                <a14:hiddenFill xmlns:a14="http://schemas.microsoft.com/office/drawing/2010/main">
+                  <a:solidFill>
+                    <a:schemeClr val="accent1"/>
+                  </a:solidFill>
+                </a14:hiddenFill>
+              </a:ext>
+              <a:ext uri="{91240B29-F687-4F45-9708-019B960494DF}">
+                <a14:hiddenLine xmlns:a14="http://schemas.microsoft.com/office/drawing/2010/main" w="9525">
+                  <a:solidFill>
+                    <a:schemeClr val="tx1"/>
+                  </a:solidFill>
+                  <a:miter lim="800000"/>
+                  <a:headEnd/>
+                  <a:tailEnd/>
+                </a14:hiddenLine>
+              </a:ext>
+              <a:ext uri="{AF507438-7753-43E0-B8FC-AC1667EBCBE1}">
+                <a14:hiddenEffects xmlns:a14="http://schemas.microsoft.com/office/drawing/2010/main">
+                  <a:effectLst>
+                    <a:outerShdw dist="35921" dir="2700000" algn="ctr" rotWithShape="0">
+                      <a:schemeClr val="bg2"/>
+                    </a:outerShdw>
+                  </a:effectLst>
+                </a14:hiddenEffects>
+              </a:ext>
+            </a:extLst>
+          </p:spPr>
+          <p:txBody>
+            <a:bodyPr wrap="square" lIns="40809" tIns="20405" rIns="40809" bIns="20405">
+              <a:spAutoFit/>
+            </a:bodyPr>
+            <a:lstStyle>
+              <a:lvl1pPr defTabSz="4389438" eaLnBrk="0" hangingPunct="0">
+                <a:defRPr sz="2200">
+                  <a:solidFill>
+                    <a:schemeClr val="tx1"/>
+                  </a:solidFill>
+                  <a:latin typeface="Arial" charset="0"/>
+                </a:defRPr>
+              </a:lvl1pPr>
+              <a:lvl2pPr marL="742950" indent="-285750" defTabSz="4389438" eaLnBrk="0" hangingPunct="0">
+                <a:defRPr sz="2200">
+                  <a:solidFill>
+                    <a:schemeClr val="tx1"/>
+                  </a:solidFill>
+                  <a:latin typeface="Arial" charset="0"/>
+                </a:defRPr>
+              </a:lvl2pPr>
+              <a:lvl3pPr marL="1143000" indent="-228600" defTabSz="4389438" eaLnBrk="0" hangingPunct="0">
+                <a:defRPr sz="2200">
+                  <a:solidFill>
+                    <a:schemeClr val="tx1"/>
+                  </a:solidFill>
+                  <a:latin typeface="Arial" charset="0"/>
+                </a:defRPr>
+              </a:lvl3pPr>
+              <a:lvl4pPr marL="1600200" indent="-228600" defTabSz="4389438" eaLnBrk="0" hangingPunct="0">
+                <a:defRPr sz="2200">
+                  <a:solidFill>
+                    <a:schemeClr val="tx1"/>
+                  </a:solidFill>
+                  <a:latin typeface="Arial" charset="0"/>
+                </a:defRPr>
+              </a:lvl4pPr>
+              <a:lvl5pPr marL="2057400" indent="-228600" defTabSz="4389438" eaLnBrk="0" hangingPunct="0">
+                <a:defRPr sz="2200">
+                  <a:solidFill>
+                    <a:schemeClr val="tx1"/>
+                  </a:solidFill>
+                  <a:latin typeface="Arial" charset="0"/>
+                </a:defRPr>
+              </a:lvl5pPr>
+              <a:lvl6pPr marL="2514600" indent="-228600" defTabSz="4389438" eaLnBrk="0" fontAlgn="base" hangingPunct="0">
+                <a:spcBef>
+                  <a:spcPct val="0"/>
+                </a:spcBef>
+                <a:spcAft>
+                  <a:spcPct val="0"/>
+                </a:spcAft>
+                <a:defRPr sz="2200">
+                  <a:solidFill>
+                    <a:schemeClr val="tx1"/>
+                  </a:solidFill>
+                  <a:latin typeface="Arial" charset="0"/>
+                </a:defRPr>
+              </a:lvl6pPr>
+              <a:lvl7pPr marL="2971800" indent="-228600" defTabSz="4389438" eaLnBrk="0" fontAlgn="base" hangingPunct="0">
+                <a:spcBef>
+                  <a:spcPct val="0"/>
+                </a:spcBef>
+                <a:spcAft>
+                  <a:spcPct val="0"/>
+                </a:spcAft>
+                <a:defRPr sz="2200">
+                  <a:solidFill>
+                    <a:schemeClr val="tx1"/>
+                  </a:solidFill>
+                  <a:latin typeface="Arial" charset="0"/>
+                </a:defRPr>
+              </a:lvl7pPr>
+              <a:lvl8pPr marL="3429000" indent="-228600" defTabSz="4389438" eaLnBrk="0" fontAlgn="base" hangingPunct="0">
+                <a:spcBef>
+                  <a:spcPct val="0"/>
+                </a:spcBef>
+                <a:spcAft>
+                  <a:spcPct val="0"/>
+                </a:spcAft>
+                <a:defRPr sz="2200">
+                  <a:solidFill>
+                    <a:schemeClr val="tx1"/>
+                  </a:solidFill>
+                  <a:latin typeface="Arial" charset="0"/>
+                </a:defRPr>
+              </a:lvl8pPr>
+              <a:lvl9pPr marL="3886200" indent="-228600" defTabSz="4389438" eaLnBrk="0" fontAlgn="base" hangingPunct="0">
+                <a:spcBef>
+                  <a:spcPct val="0"/>
+                </a:spcBef>
+                <a:spcAft>
+                  <a:spcPct val="0"/>
+                </a:spcAft>
+                <a:defRPr sz="2200">
+                  <a:solidFill>
+                    <a:schemeClr val="tx1"/>
+                  </a:solidFill>
+                  <a:latin typeface="Arial" charset="0"/>
+                </a:defRPr>
+              </a:lvl9pPr>
+            </a:lstStyle>
+            <a:p>
+              <a:pPr algn="ctr" eaLnBrk="1" hangingPunct="1"/>
+              <a:r>
+                <a:rPr lang="en-US" sz="1200" dirty="0">
+                  <a:latin typeface="Calibri" pitchFamily="34" charset="0"/>
+                </a:rPr>
+                <a:t>71 features</a:t>
+              </a:r>
+            </a:p>
+          </p:txBody>
+        </p:sp>
+      </p:grpSp>
       <p:sp>
         <p:nvSpPr>
-          <p:cNvPr id="47" name="Text Box 180">
+          <p:cNvPr id="49" name="Left Brace 48"/>
+          <p:cNvSpPr/>
+          <p:nvPr/>
+        </p:nvSpPr>
+        <p:spPr>
+          <a:xfrm>
+            <a:off x="1614434" y="14533132"/>
+            <a:ext cx="141956" cy="636851"/>
+          </a:xfrm>
+          <a:prstGeom prst="leftBrace">
+            <a:avLst>
+              <a:gd name="adj1" fmla="val 53021"/>
+              <a:gd name="adj2" fmla="val 50000"/>
+            </a:avLst>
+          </a:prstGeom>
+          <a:ln w="38100"/>
+        </p:spPr>
+        <p:style>
+          <a:lnRef idx="1">
+            <a:schemeClr val="dk1"/>
+          </a:lnRef>
+          <a:fillRef idx="0">
+            <a:schemeClr val="dk1"/>
+          </a:fillRef>
+          <a:effectRef idx="0">
+            <a:schemeClr val="dk1"/>
+          </a:effectRef>
+          <a:fontRef idx="minor">
+            <a:schemeClr val="tx1"/>
+          </a:fontRef>
+        </p:style>
+        <p:txBody>
+          <a:bodyPr rtlCol="0" anchor="ctr"/>
+          <a:lstStyle/>
+          <a:p>
+            <a:pPr algn="ctr"/>
+            <a:endParaRPr lang="en-US"/>
+          </a:p>
+        </p:txBody>
+      </p:sp>
+      <p:grpSp>
+        <p:nvGrpSpPr>
+          <p:cNvPr id="2" name="Group 1"/>
+          <p:cNvGrpSpPr/>
+          <p:nvPr/>
+        </p:nvGrpSpPr>
+        <p:grpSpPr>
+          <a:xfrm>
+            <a:off x="4994648" y="13328078"/>
+            <a:ext cx="3996952" cy="2369122"/>
+            <a:chOff x="4994648" y="13373456"/>
+            <a:chExt cx="3996952" cy="2369122"/>
+          </a:xfrm>
+        </p:grpSpPr>
+        <p:pic>
+          <p:nvPicPr>
+            <p:cNvPr id="18" name="Picture 17"/>
+            <p:cNvPicPr>
+              <a:picLocks noChangeAspect="1"/>
+            </p:cNvPicPr>
+            <p:nvPr/>
+          </p:nvPicPr>
+          <p:blipFill>
+            <a:blip r:embed="rId7">
+              <a:extLst>
+                <a:ext uri="{28A0092B-C50C-407E-A947-70E740481C1C}">
+                  <a14:useLocalDpi xmlns:a14="http://schemas.microsoft.com/office/drawing/2010/main" val="0"/>
+                </a:ext>
+              </a:extLst>
+            </a:blip>
+            <a:stretch>
+              <a:fillRect/>
+            </a:stretch>
+          </p:blipFill>
+          <p:spPr>
+            <a:xfrm>
+              <a:off x="5147048" y="13373456"/>
+              <a:ext cx="3844552" cy="2086106"/>
+            </a:xfrm>
+            <a:prstGeom prst="rect">
+              <a:avLst/>
+            </a:prstGeom>
+          </p:spPr>
+        </p:pic>
+        <p:sp>
+          <p:nvSpPr>
+            <p:cNvPr id="50" name="Text Box 180"/>
+            <p:cNvSpPr txBox="1">
+              <a:spLocks noChangeArrowheads="1"/>
+            </p:cNvSpPr>
+            <p:nvPr/>
+          </p:nvSpPr>
+          <p:spPr bwMode="auto">
+            <a:xfrm>
+              <a:off x="4994648" y="15455148"/>
+              <a:ext cx="3120060" cy="287430"/>
+            </a:xfrm>
+            <a:prstGeom prst="rect">
+              <a:avLst/>
+            </a:prstGeom>
+            <a:noFill/>
+            <a:ln>
+              <a:noFill/>
+            </a:ln>
+            <a:effectLst/>
             <a:extLst>
-              <a:ext uri="{FF2B5EF4-FFF2-40B4-BE49-F238E27FC236}">
-                <a16:creationId xmlns:a16="http://schemas.microsoft.com/office/drawing/2014/main" xmlns="" id="{B68CCE3C-71F5-47D9-BF5F-CCAFD9C77C0F}"/>
+              <a:ext uri="{909E8E84-426E-40DD-AFC4-6F175D3DCCD1}">
+                <a14:hiddenFill xmlns:a14="http://schemas.microsoft.com/office/drawing/2010/main">
+                  <a:solidFill>
+                    <a:schemeClr val="accent1"/>
+                  </a:solidFill>
+                </a14:hiddenFill>
+              </a:ext>
+              <a:ext uri="{91240B29-F687-4F45-9708-019B960494DF}">
+                <a14:hiddenLine xmlns:a14="http://schemas.microsoft.com/office/drawing/2010/main" w="9525">
+                  <a:solidFill>
+                    <a:schemeClr val="tx1"/>
+                  </a:solidFill>
+                  <a:miter lim="800000"/>
+                  <a:headEnd/>
+                  <a:tailEnd/>
+                </a14:hiddenLine>
+              </a:ext>
+              <a:ext uri="{AF507438-7753-43E0-B8FC-AC1667EBCBE1}">
+                <a14:hiddenEffects xmlns:a14="http://schemas.microsoft.com/office/drawing/2010/main">
+                  <a:effectLst>
+                    <a:outerShdw dist="35921" dir="2700000" algn="ctr" rotWithShape="0">
+                      <a:schemeClr val="bg2"/>
+                    </a:outerShdw>
+                  </a:effectLst>
+                </a14:hiddenEffects>
               </a:ext>
             </a:extLst>
-          </p:cNvPr>
+          </p:spPr>
+          <p:txBody>
+            <a:bodyPr wrap="square" lIns="40809" tIns="20405" rIns="40809" bIns="20405">
+              <a:spAutoFit/>
+            </a:bodyPr>
+            <a:lstStyle>
+              <a:lvl1pPr defTabSz="4389438" eaLnBrk="0" hangingPunct="0">
+                <a:defRPr sz="2200">
+                  <a:solidFill>
+                    <a:schemeClr val="tx1"/>
+                  </a:solidFill>
+                  <a:latin typeface="Arial" charset="0"/>
+                </a:defRPr>
+              </a:lvl1pPr>
+              <a:lvl2pPr marL="742950" indent="-285750" defTabSz="4389438" eaLnBrk="0" hangingPunct="0">
+                <a:defRPr sz="2200">
+                  <a:solidFill>
+                    <a:schemeClr val="tx1"/>
+                  </a:solidFill>
+                  <a:latin typeface="Arial" charset="0"/>
+                </a:defRPr>
+              </a:lvl2pPr>
+              <a:lvl3pPr marL="1143000" indent="-228600" defTabSz="4389438" eaLnBrk="0" hangingPunct="0">
+                <a:defRPr sz="2200">
+                  <a:solidFill>
+                    <a:schemeClr val="tx1"/>
+                  </a:solidFill>
+                  <a:latin typeface="Arial" charset="0"/>
+                </a:defRPr>
+              </a:lvl3pPr>
+              <a:lvl4pPr marL="1600200" indent="-228600" defTabSz="4389438" eaLnBrk="0" hangingPunct="0">
+                <a:defRPr sz="2200">
+                  <a:solidFill>
+                    <a:schemeClr val="tx1"/>
+                  </a:solidFill>
+                  <a:latin typeface="Arial" charset="0"/>
+                </a:defRPr>
+              </a:lvl4pPr>
+              <a:lvl5pPr marL="2057400" indent="-228600" defTabSz="4389438" eaLnBrk="0" hangingPunct="0">
+                <a:defRPr sz="2200">
+                  <a:solidFill>
+                    <a:schemeClr val="tx1"/>
+                  </a:solidFill>
+                  <a:latin typeface="Arial" charset="0"/>
+                </a:defRPr>
+              </a:lvl5pPr>
+              <a:lvl6pPr marL="2514600" indent="-228600" defTabSz="4389438" eaLnBrk="0" fontAlgn="base" hangingPunct="0">
+                <a:spcBef>
+                  <a:spcPct val="0"/>
+                </a:spcBef>
+                <a:spcAft>
+                  <a:spcPct val="0"/>
+                </a:spcAft>
+                <a:defRPr sz="2200">
+                  <a:solidFill>
+                    <a:schemeClr val="tx1"/>
+                  </a:solidFill>
+                  <a:latin typeface="Arial" charset="0"/>
+                </a:defRPr>
+              </a:lvl6pPr>
+              <a:lvl7pPr marL="2971800" indent="-228600" defTabSz="4389438" eaLnBrk="0" fontAlgn="base" hangingPunct="0">
+                <a:spcBef>
+                  <a:spcPct val="0"/>
+                </a:spcBef>
+                <a:spcAft>
+                  <a:spcPct val="0"/>
+                </a:spcAft>
+                <a:defRPr sz="2200">
+                  <a:solidFill>
+                    <a:schemeClr val="tx1"/>
+                  </a:solidFill>
+                  <a:latin typeface="Arial" charset="0"/>
+                </a:defRPr>
+              </a:lvl7pPr>
+              <a:lvl8pPr marL="3429000" indent="-228600" defTabSz="4389438" eaLnBrk="0" fontAlgn="base" hangingPunct="0">
+                <a:spcBef>
+                  <a:spcPct val="0"/>
+                </a:spcBef>
+                <a:spcAft>
+                  <a:spcPct val="0"/>
+                </a:spcAft>
+                <a:defRPr sz="2200">
+                  <a:solidFill>
+                    <a:schemeClr val="tx1"/>
+                  </a:solidFill>
+                  <a:latin typeface="Arial" charset="0"/>
+                </a:defRPr>
+              </a:lvl8pPr>
+              <a:lvl9pPr marL="3886200" indent="-228600" defTabSz="4389438" eaLnBrk="0" fontAlgn="base" hangingPunct="0">
+                <a:spcBef>
+                  <a:spcPct val="0"/>
+                </a:spcBef>
+                <a:spcAft>
+                  <a:spcPct val="0"/>
+                </a:spcAft>
+                <a:defRPr sz="2200">
+                  <a:solidFill>
+                    <a:schemeClr val="tx1"/>
+                  </a:solidFill>
+                  <a:latin typeface="Arial" charset="0"/>
+                </a:defRPr>
+              </a:lvl9pPr>
+            </a:lstStyle>
+            <a:p>
+              <a:pPr algn="ctr" eaLnBrk="1" hangingPunct="1"/>
+              <a:r>
+                <a:rPr lang="en-US" sz="1600" b="1" dirty="0" smtClean="0">
+                  <a:latin typeface="Calibri" pitchFamily="34" charset="0"/>
+                </a:rPr>
+                <a:t>Figure </a:t>
+              </a:r>
+              <a:r>
+                <a:rPr lang="en-US" sz="1600" b="1" dirty="0">
+                  <a:latin typeface="Calibri" pitchFamily="34" charset="0"/>
+                </a:rPr>
+                <a:t>1.</a:t>
+              </a:r>
+              <a:r>
+                <a:rPr lang="en-US" sz="1600" dirty="0">
+                  <a:latin typeface="Calibri" pitchFamily="34" charset="0"/>
+                </a:rPr>
+                <a:t> </a:t>
+              </a:r>
+              <a:r>
+                <a:rPr lang="en-US" sz="1600" dirty="0" smtClean="0">
+                  <a:latin typeface="Calibri" pitchFamily="34" charset="0"/>
+                </a:rPr>
+                <a:t>User Verification Classifier.</a:t>
+              </a:r>
+              <a:endParaRPr lang="en-US" sz="1600" dirty="0">
+                <a:latin typeface="Calibri" pitchFamily="34" charset="0"/>
+              </a:endParaRPr>
+            </a:p>
+          </p:txBody>
+        </p:sp>
+      </p:grpSp>
+      <p:sp>
+        <p:nvSpPr>
+          <p:cNvPr id="52" name="Text Box 180"/>
           <p:cNvSpPr txBox="1">
             <a:spLocks noChangeArrowheads="1"/>
           </p:cNvSpPr>
@@ -8258,8 +9465,8 @@
         </p:nvSpPr>
         <p:spPr bwMode="auto">
           <a:xfrm>
-            <a:off x="18926455" y="11165748"/>
-            <a:ext cx="7254712" cy="287430"/>
+            <a:off x="11619556" y="9308776"/>
+            <a:ext cx="4498213" cy="287430"/>
           </a:xfrm>
           <a:prstGeom prst="rect">
             <a:avLst/>
@@ -8403,739 +9610,32 @@
           <a:p>
             <a:pPr algn="ctr" eaLnBrk="1" hangingPunct="1"/>
             <a:r>
+              <a:rPr lang="en-US" sz="1600" b="1" dirty="0" smtClean="0">
+                <a:latin typeface="Calibri" pitchFamily="34" charset="0"/>
+              </a:rPr>
+              <a:t>Figure </a:t>
+            </a:r>
+            <a:r>
               <a:rPr lang="en-US" sz="1600" b="1" dirty="0">
                 <a:latin typeface="Calibri" pitchFamily="34" charset="0"/>
               </a:rPr>
-              <a:t>Table 2.</a:t>
-            </a:r>
-            <a:r>
-              <a:rPr lang="en-US" sz="1600" dirty="0">
+              <a:t>2</a:t>
+            </a:r>
+            <a:r>
+              <a:rPr lang="en-US" sz="1600" b="1" dirty="0" smtClean="0">
                 <a:latin typeface="Calibri" pitchFamily="34" charset="0"/>
               </a:rPr>
-              <a:t> Table of maximum success rates, across all attack methods and </a:t>
-            </a:r>
-            <a:r>
-              <a:rPr lang="en-US" sz="1600" i="1" dirty="0">
+              <a:t>.</a:t>
+            </a:r>
+            <a:r>
+              <a:rPr lang="en-US" sz="1600" dirty="0" smtClean="0">
                 <a:latin typeface="Calibri" pitchFamily="34" charset="0"/>
               </a:rPr>
-              <a:t>k </a:t>
-            </a:r>
-            <a:r>
-              <a:rPr lang="en-US" sz="1600" dirty="0">
-                <a:latin typeface="Calibri" pitchFamily="34" charset="0"/>
-              </a:rPr>
-              <a:t>values.</a:t>
-            </a:r>
-            <a:endParaRPr lang="en-US" sz="1600" b="1" dirty="0">
+              <a:t> Attacks on User Verification Classifier.</a:t>
+            </a:r>
+            <a:endParaRPr lang="en-US" sz="1600" dirty="0">
               <a:latin typeface="Calibri" pitchFamily="34" charset="0"/>
             </a:endParaRPr>
-          </a:p>
-        </p:txBody>
-      </p:sp>
-      <p:sp>
-        <p:nvSpPr>
-          <p:cNvPr id="12" name="Text Box 191"/>
-          <p:cNvSpPr txBox="1">
-            <a:spLocks noChangeArrowheads="1"/>
-          </p:cNvSpPr>
-          <p:nvPr/>
-        </p:nvSpPr>
-        <p:spPr bwMode="auto">
-          <a:xfrm>
-            <a:off x="18288000" y="3048001"/>
-            <a:ext cx="8229600" cy="8374257"/>
-          </a:xfrm>
-          <a:prstGeom prst="rect">
-            <a:avLst/>
-          </a:prstGeom>
-          <a:noFill/>
-          <a:ln w="12700">
-            <a:solidFill>
-              <a:schemeClr val="accent1">
-                <a:lumMod val="75000"/>
-              </a:schemeClr>
-            </a:solidFill>
-          </a:ln>
-          <a:effectLst/>
-        </p:spPr>
-        <p:txBody>
-          <a:bodyPr lIns="81618" tIns="81618" rIns="81618" bIns="81618">
-            <a:spAutoFit/>
-          </a:bodyPr>
-          <a:lstStyle>
-            <a:lvl1pPr eaLnBrk="0" hangingPunct="0">
-              <a:defRPr sz="2200">
-                <a:solidFill>
-                  <a:schemeClr val="tx1"/>
-                </a:solidFill>
-                <a:latin typeface="Arial" charset="0"/>
-              </a:defRPr>
-            </a:lvl1pPr>
-            <a:lvl2pPr marL="742950" indent="-285750" eaLnBrk="0" hangingPunct="0">
-              <a:defRPr sz="2200">
-                <a:solidFill>
-                  <a:schemeClr val="tx1"/>
-                </a:solidFill>
-                <a:latin typeface="Arial" charset="0"/>
-              </a:defRPr>
-            </a:lvl2pPr>
-            <a:lvl3pPr marL="1143000" indent="-228600" eaLnBrk="0" hangingPunct="0">
-              <a:defRPr sz="2200">
-                <a:solidFill>
-                  <a:schemeClr val="tx1"/>
-                </a:solidFill>
-                <a:latin typeface="Arial" charset="0"/>
-              </a:defRPr>
-            </a:lvl3pPr>
-            <a:lvl4pPr marL="1600200" indent="-228600" eaLnBrk="0" hangingPunct="0">
-              <a:defRPr sz="2200">
-                <a:solidFill>
-                  <a:schemeClr val="tx1"/>
-                </a:solidFill>
-                <a:latin typeface="Arial" charset="0"/>
-              </a:defRPr>
-            </a:lvl4pPr>
-            <a:lvl5pPr marL="2057400" indent="-228600" eaLnBrk="0" hangingPunct="0">
-              <a:defRPr sz="2200">
-                <a:solidFill>
-                  <a:schemeClr val="tx1"/>
-                </a:solidFill>
-                <a:latin typeface="Arial" charset="0"/>
-              </a:defRPr>
-            </a:lvl5pPr>
-            <a:lvl6pPr marL="2514600" indent="-228600" eaLnBrk="0" fontAlgn="base" hangingPunct="0">
-              <a:spcBef>
-                <a:spcPct val="0"/>
-              </a:spcBef>
-              <a:spcAft>
-                <a:spcPct val="0"/>
-              </a:spcAft>
-              <a:defRPr sz="2200">
-                <a:solidFill>
-                  <a:schemeClr val="tx1"/>
-                </a:solidFill>
-                <a:latin typeface="Arial" charset="0"/>
-              </a:defRPr>
-            </a:lvl6pPr>
-            <a:lvl7pPr marL="2971800" indent="-228600" eaLnBrk="0" fontAlgn="base" hangingPunct="0">
-              <a:spcBef>
-                <a:spcPct val="0"/>
-              </a:spcBef>
-              <a:spcAft>
-                <a:spcPct val="0"/>
-              </a:spcAft>
-              <a:defRPr sz="2200">
-                <a:solidFill>
-                  <a:schemeClr val="tx1"/>
-                </a:solidFill>
-                <a:latin typeface="Arial" charset="0"/>
-              </a:defRPr>
-            </a:lvl7pPr>
-            <a:lvl8pPr marL="3429000" indent="-228600" eaLnBrk="0" fontAlgn="base" hangingPunct="0">
-              <a:spcBef>
-                <a:spcPct val="0"/>
-              </a:spcBef>
-              <a:spcAft>
-                <a:spcPct val="0"/>
-              </a:spcAft>
-              <a:defRPr sz="2200">
-                <a:solidFill>
-                  <a:schemeClr val="tx1"/>
-                </a:solidFill>
-                <a:latin typeface="Arial" charset="0"/>
-              </a:defRPr>
-            </a:lvl8pPr>
-            <a:lvl9pPr marL="3886200" indent="-228600" eaLnBrk="0" fontAlgn="base" hangingPunct="0">
-              <a:spcBef>
-                <a:spcPct val="0"/>
-              </a:spcBef>
-              <a:spcAft>
-                <a:spcPct val="0"/>
-              </a:spcAft>
-              <a:defRPr sz="2200">
-                <a:solidFill>
-                  <a:schemeClr val="tx1"/>
-                </a:solidFill>
-                <a:latin typeface="Arial" charset="0"/>
-              </a:defRPr>
-            </a:lvl9pPr>
-          </a:lstStyle>
-          <a:p>
-            <a:pPr marL="285750" indent="-285750" eaLnBrk="1" hangingPunct="1">
-              <a:buFont typeface="Arial" panose="020B0604020202020204" pitchFamily="34" charset="0"/>
-              <a:buChar char="•"/>
-            </a:pPr>
-            <a:r>
-              <a:rPr lang="en-US" sz="1667" dirty="0">
-                <a:latin typeface="Calibri" pitchFamily="34" charset="0"/>
-              </a:rPr>
-              <a:t>Intuitively, our </a:t>
-            </a:r>
-            <a:r>
-              <a:rPr lang="en-US" sz="1667" i="1" dirty="0">
-                <a:latin typeface="Calibri" pitchFamily="34" charset="0"/>
-              </a:rPr>
-              <a:t>k</a:t>
-            </a:r>
-            <a:r>
-              <a:rPr lang="en-US" sz="1667" dirty="0">
-                <a:latin typeface="Calibri" pitchFamily="34" charset="0"/>
-              </a:rPr>
-              <a:t>-means attacks performed best with higher </a:t>
-            </a:r>
-            <a:r>
-              <a:rPr lang="en-US" sz="1667" i="1" dirty="0">
-                <a:latin typeface="Calibri" pitchFamily="34" charset="0"/>
-              </a:rPr>
-              <a:t>k </a:t>
-            </a:r>
-            <a:r>
-              <a:rPr lang="en-US" sz="1667" dirty="0">
-                <a:latin typeface="Calibri" pitchFamily="34" charset="0"/>
-              </a:rPr>
-              <a:t>(until 32-64 range with cluster method), reaching </a:t>
-            </a:r>
-            <a:r>
-              <a:rPr lang="en-US" sz="1667" b="1" dirty="0">
-                <a:latin typeface="Calibri" pitchFamily="34" charset="0"/>
-              </a:rPr>
-              <a:t>77% success rate </a:t>
-            </a:r>
-            <a:r>
-              <a:rPr lang="en-US" sz="1667" dirty="0">
-                <a:latin typeface="Calibri" pitchFamily="34" charset="0"/>
-              </a:rPr>
-              <a:t>(undetected spoof) against a 5-layer deep neural net. Also intuitively, using our multivariate Gaussian distribution model to introduce humanistic perturbations and augment the number of generated adversarial examples, we achieve a lower maximum </a:t>
-            </a:r>
-            <a:r>
-              <a:rPr lang="en-US" sz="1667" b="1" dirty="0">
-                <a:latin typeface="Calibri" pitchFamily="34" charset="0"/>
-              </a:rPr>
-              <a:t>67% success rate</a:t>
-            </a:r>
-            <a:r>
-              <a:rPr lang="en-US" sz="1667" dirty="0">
-                <a:latin typeface="Calibri" pitchFamily="34" charset="0"/>
-              </a:rPr>
-              <a:t>. </a:t>
-            </a:r>
-          </a:p>
-          <a:p>
-            <a:pPr marL="285750" indent="-285750" eaLnBrk="1" hangingPunct="1">
-              <a:buFont typeface="Arial" panose="020B0604020202020204" pitchFamily="34" charset="0"/>
-              <a:buChar char="•"/>
-            </a:pPr>
-            <a:r>
-              <a:rPr lang="en-US" sz="1667" dirty="0">
-                <a:latin typeface="Calibri" pitchFamily="34" charset="0"/>
-              </a:rPr>
-              <a:t>Secondarily, and less intuitively, based on the adversarial success rate metric of model robustness, we find that </a:t>
-            </a:r>
-            <a:r>
-              <a:rPr lang="en-US" sz="1667" b="1" dirty="0">
-                <a:latin typeface="Calibri" pitchFamily="34" charset="0"/>
-              </a:rPr>
-              <a:t>logistic regression</a:t>
-            </a:r>
-            <a:r>
-              <a:rPr lang="en-US" sz="1667" dirty="0">
-                <a:latin typeface="Calibri" pitchFamily="34" charset="0"/>
-              </a:rPr>
-              <a:t> is most resilient to our attacks (maximum success rate 20%), compared to the artificial neural net and deep neural nets.</a:t>
-            </a:r>
-          </a:p>
-          <a:p>
-            <a:pPr marL="285750" indent="-285750" eaLnBrk="1" hangingPunct="1">
-              <a:buFont typeface="Arial" panose="020B0604020202020204" pitchFamily="34" charset="0"/>
-              <a:buChar char="•"/>
-            </a:pPr>
-            <a:endParaRPr lang="en-US" sz="1667" dirty="0">
-              <a:latin typeface="Calibri" pitchFamily="34" charset="0"/>
-            </a:endParaRPr>
-          </a:p>
-          <a:p>
-            <a:pPr marL="285750" indent="-285750" eaLnBrk="1" hangingPunct="1">
-              <a:buFont typeface="Arial" panose="020B0604020202020204" pitchFamily="34" charset="0"/>
-              <a:buChar char="•"/>
-            </a:pPr>
-            <a:endParaRPr lang="en-US" sz="1667" dirty="0">
-              <a:latin typeface="Calibri" pitchFamily="34" charset="0"/>
-            </a:endParaRPr>
-          </a:p>
-          <a:p>
-            <a:pPr marL="285750" indent="-285750" eaLnBrk="1" hangingPunct="1">
-              <a:buFont typeface="Arial" panose="020B0604020202020204" pitchFamily="34" charset="0"/>
-              <a:buChar char="•"/>
-            </a:pPr>
-            <a:endParaRPr lang="en-US" sz="1667" dirty="0">
-              <a:latin typeface="Calibri" pitchFamily="34" charset="0"/>
-            </a:endParaRPr>
-          </a:p>
-          <a:p>
-            <a:pPr marL="285750" indent="-285750" eaLnBrk="1" hangingPunct="1">
-              <a:buFont typeface="Arial" panose="020B0604020202020204" pitchFamily="34" charset="0"/>
-              <a:buChar char="•"/>
-            </a:pPr>
-            <a:endParaRPr lang="en-US" sz="1667" dirty="0">
-              <a:latin typeface="Calibri" pitchFamily="34" charset="0"/>
-            </a:endParaRPr>
-          </a:p>
-          <a:p>
-            <a:pPr marL="285750" indent="-285750" eaLnBrk="1" hangingPunct="1">
-              <a:buFont typeface="Arial" panose="020B0604020202020204" pitchFamily="34" charset="0"/>
-              <a:buChar char="•"/>
-            </a:pPr>
-            <a:endParaRPr lang="en-US" sz="1667" dirty="0">
-              <a:latin typeface="Calibri" pitchFamily="34" charset="0"/>
-            </a:endParaRPr>
-          </a:p>
-          <a:p>
-            <a:pPr marL="285750" indent="-285750" eaLnBrk="1" hangingPunct="1">
-              <a:buFont typeface="Arial" panose="020B0604020202020204" pitchFamily="34" charset="0"/>
-              <a:buChar char="•"/>
-            </a:pPr>
-            <a:endParaRPr lang="en-US" sz="1667" dirty="0">
-              <a:latin typeface="Calibri" pitchFamily="34" charset="0"/>
-            </a:endParaRPr>
-          </a:p>
-          <a:p>
-            <a:pPr marL="285750" indent="-285750" eaLnBrk="1" hangingPunct="1">
-              <a:buFont typeface="Arial" panose="020B0604020202020204" pitchFamily="34" charset="0"/>
-              <a:buChar char="•"/>
-            </a:pPr>
-            <a:endParaRPr lang="en-US" sz="1667" dirty="0">
-              <a:latin typeface="Calibri" pitchFamily="34" charset="0"/>
-            </a:endParaRPr>
-          </a:p>
-          <a:p>
-            <a:pPr marL="285750" indent="-285750" eaLnBrk="1" hangingPunct="1">
-              <a:buFont typeface="Arial" panose="020B0604020202020204" pitchFamily="34" charset="0"/>
-              <a:buChar char="•"/>
-            </a:pPr>
-            <a:endParaRPr lang="en-US" sz="1667" dirty="0">
-              <a:latin typeface="Calibri" pitchFamily="34" charset="0"/>
-            </a:endParaRPr>
-          </a:p>
-          <a:p>
-            <a:pPr marL="285750" indent="-285750" eaLnBrk="1" hangingPunct="1">
-              <a:buFont typeface="Arial" panose="020B0604020202020204" pitchFamily="34" charset="0"/>
-              <a:buChar char="•"/>
-            </a:pPr>
-            <a:endParaRPr lang="en-US" sz="1667" dirty="0">
-              <a:latin typeface="Calibri" pitchFamily="34" charset="0"/>
-            </a:endParaRPr>
-          </a:p>
-          <a:p>
-            <a:pPr marL="285750" indent="-285750" eaLnBrk="1" hangingPunct="1">
-              <a:buFont typeface="Arial" panose="020B0604020202020204" pitchFamily="34" charset="0"/>
-              <a:buChar char="•"/>
-            </a:pPr>
-            <a:endParaRPr lang="en-US" sz="1667" dirty="0">
-              <a:latin typeface="Calibri" pitchFamily="34" charset="0"/>
-            </a:endParaRPr>
-          </a:p>
-          <a:p>
-            <a:pPr marL="285750" indent="-285750" eaLnBrk="1" hangingPunct="1">
-              <a:buFont typeface="Arial" panose="020B0604020202020204" pitchFamily="34" charset="0"/>
-              <a:buChar char="•"/>
-            </a:pPr>
-            <a:endParaRPr lang="en-US" sz="1667" dirty="0">
-              <a:latin typeface="Calibri" pitchFamily="34" charset="0"/>
-            </a:endParaRPr>
-          </a:p>
-          <a:p>
-            <a:pPr marL="285750" indent="-285750" eaLnBrk="1" hangingPunct="1">
-              <a:buFont typeface="Arial" panose="020B0604020202020204" pitchFamily="34" charset="0"/>
-              <a:buChar char="•"/>
-            </a:pPr>
-            <a:endParaRPr lang="en-US" sz="1667" dirty="0">
-              <a:latin typeface="Calibri" pitchFamily="34" charset="0"/>
-            </a:endParaRPr>
-          </a:p>
-          <a:p>
-            <a:pPr marL="285750" indent="-285750" eaLnBrk="1" hangingPunct="1">
-              <a:buFont typeface="Arial" panose="020B0604020202020204" pitchFamily="34" charset="0"/>
-              <a:buChar char="•"/>
-            </a:pPr>
-            <a:endParaRPr lang="en-US" sz="1667" dirty="0">
-              <a:latin typeface="Calibri" pitchFamily="34" charset="0"/>
-            </a:endParaRPr>
-          </a:p>
-          <a:p>
-            <a:pPr marL="285750" indent="-285750" eaLnBrk="1" hangingPunct="1">
-              <a:buFont typeface="Arial" panose="020B0604020202020204" pitchFamily="34" charset="0"/>
-              <a:buChar char="•"/>
-            </a:pPr>
-            <a:endParaRPr lang="en-US" sz="1667" dirty="0">
-              <a:latin typeface="Calibri" pitchFamily="34" charset="0"/>
-            </a:endParaRPr>
-          </a:p>
-          <a:p>
-            <a:pPr marL="285750" indent="-285750" eaLnBrk="1" hangingPunct="1">
-              <a:buFont typeface="Arial" panose="020B0604020202020204" pitchFamily="34" charset="0"/>
-              <a:buChar char="•"/>
-            </a:pPr>
-            <a:endParaRPr lang="en-US" sz="1667" dirty="0">
-              <a:latin typeface="Calibri" pitchFamily="34" charset="0"/>
-            </a:endParaRPr>
-          </a:p>
-          <a:p>
-            <a:pPr marL="285750" indent="-285750" eaLnBrk="1" hangingPunct="1">
-              <a:buFont typeface="Arial" panose="020B0604020202020204" pitchFamily="34" charset="0"/>
-              <a:buChar char="•"/>
-            </a:pPr>
-            <a:endParaRPr lang="en-US" sz="1667" dirty="0">
-              <a:latin typeface="Calibri" pitchFamily="34" charset="0"/>
-            </a:endParaRPr>
-          </a:p>
-          <a:p>
-            <a:pPr marL="285750" indent="-285750" eaLnBrk="1" hangingPunct="1">
-              <a:buFont typeface="Arial" panose="020B0604020202020204" pitchFamily="34" charset="0"/>
-              <a:buChar char="•"/>
-            </a:pPr>
-            <a:endParaRPr lang="en-US" sz="1667" dirty="0">
-              <a:latin typeface="Calibri" pitchFamily="34" charset="0"/>
-            </a:endParaRPr>
-          </a:p>
-          <a:p>
-            <a:pPr marL="285750" indent="-285750" eaLnBrk="1" hangingPunct="1">
-              <a:buFont typeface="Arial" panose="020B0604020202020204" pitchFamily="34" charset="0"/>
-              <a:buChar char="•"/>
-            </a:pPr>
-            <a:endParaRPr lang="en-US" sz="1667" dirty="0">
-              <a:latin typeface="Calibri" pitchFamily="34" charset="0"/>
-            </a:endParaRPr>
-          </a:p>
-          <a:p>
-            <a:pPr marL="285750" indent="-285750" eaLnBrk="1" hangingPunct="1">
-              <a:buFont typeface="Arial" panose="020B0604020202020204" pitchFamily="34" charset="0"/>
-              <a:buChar char="•"/>
-            </a:pPr>
-            <a:endParaRPr lang="en-US" sz="1667" dirty="0">
-              <a:latin typeface="Calibri" pitchFamily="34" charset="0"/>
-            </a:endParaRPr>
-          </a:p>
-          <a:p>
-            <a:pPr marL="285750" indent="-285750" eaLnBrk="1" hangingPunct="1">
-              <a:buFont typeface="Arial" panose="020B0604020202020204" pitchFamily="34" charset="0"/>
-              <a:buChar char="•"/>
-            </a:pPr>
-            <a:endParaRPr lang="en-US" sz="1667" dirty="0">
-              <a:latin typeface="Calibri" pitchFamily="34" charset="0"/>
-            </a:endParaRPr>
-          </a:p>
-          <a:p>
-            <a:pPr marL="285750" indent="-285750" eaLnBrk="1" hangingPunct="1">
-              <a:buFont typeface="Arial" panose="020B0604020202020204" pitchFamily="34" charset="0"/>
-              <a:buChar char="•"/>
-            </a:pPr>
-            <a:endParaRPr lang="en-US" sz="1667" dirty="0">
-              <a:latin typeface="Calibri" pitchFamily="34" charset="0"/>
-            </a:endParaRPr>
-          </a:p>
-          <a:p>
-            <a:pPr marL="285750" indent="-285750" eaLnBrk="1" hangingPunct="1">
-              <a:buFont typeface="Arial" panose="020B0604020202020204" pitchFamily="34" charset="0"/>
-              <a:buChar char="•"/>
-            </a:pPr>
-            <a:endParaRPr lang="en-US" sz="1667" dirty="0">
-              <a:latin typeface="Calibri" pitchFamily="34" charset="0"/>
-            </a:endParaRPr>
-          </a:p>
-          <a:p>
-            <a:pPr eaLnBrk="1" hangingPunct="1"/>
-            <a:endParaRPr lang="en-US" sz="1667" dirty="0">
-              <a:latin typeface="Calibri" pitchFamily="34" charset="0"/>
-            </a:endParaRPr>
-          </a:p>
-          <a:p>
-            <a:pPr eaLnBrk="1" hangingPunct="1"/>
-            <a:r>
-              <a:rPr lang="en-US" sz="1667" dirty="0">
-                <a:latin typeface="Calibri" pitchFamily="34" charset="0"/>
-              </a:rPr>
-              <a:t> </a:t>
-            </a:r>
-          </a:p>
-        </p:txBody>
-      </p:sp>
-      <p:sp>
-        <p:nvSpPr>
-          <p:cNvPr id="48" name="TextBox 47"/>
-          <p:cNvSpPr txBox="1"/>
-          <p:nvPr/>
-        </p:nvSpPr>
-        <p:spPr>
-          <a:xfrm>
-            <a:off x="8534399" y="16687799"/>
-            <a:ext cx="17646767" cy="1219200"/>
-          </a:xfrm>
-          <a:prstGeom prst="rect">
-            <a:avLst/>
-          </a:prstGeom>
-          <a:noFill/>
-        </p:spPr>
-        <p:txBody>
-          <a:bodyPr wrap="square" lIns="40809" tIns="40809" rIns="40809" bIns="40809" numCol="2" spcCol="244855" rtlCol="0">
-            <a:noAutofit/>
-          </a:bodyPr>
-          <a:lstStyle/>
-          <a:p>
-            <a:r>
-              <a:rPr lang="en-US" sz="1200" dirty="0"/>
-              <a:t>[1] N. Al-</a:t>
-            </a:r>
-            <a:r>
-              <a:rPr lang="en-US" sz="1200" dirty="0" err="1"/>
-              <a:t>Obaidi</a:t>
-            </a:r>
-            <a:r>
-              <a:rPr lang="en-US" sz="1200" dirty="0"/>
-              <a:t>. MEU-Mobile KSD Data Set. UCI Machine Learning Repository, 2016.</a:t>
-            </a:r>
-          </a:p>
-          <a:p>
-            <a:r>
-              <a:rPr lang="en-US" sz="1200" dirty="0"/>
-              <a:t>[2] I. de </a:t>
-            </a:r>
-            <a:r>
-              <a:rPr lang="en-US" sz="1200" dirty="0" err="1"/>
-              <a:t>Mendizabal</a:t>
-            </a:r>
-            <a:r>
-              <a:rPr lang="en-US" sz="1200" dirty="0"/>
-              <a:t>-Vazquez, D. de Santos-Sierra, J. Guerra-Casanova, and C. Sanchez-Avila. Supervised classification methods applied to</a:t>
-            </a:r>
-          </a:p>
-          <a:p>
-            <a:r>
-              <a:rPr lang="en-US" sz="1200" dirty="0"/>
-              <a:t>Keystroke Dynamics through Mobile Devices. </a:t>
-            </a:r>
-            <a:r>
-              <a:rPr lang="en-US" sz="1200" i="1" dirty="0"/>
-              <a:t>ICCST</a:t>
-            </a:r>
-            <a:r>
-              <a:rPr lang="en-US" sz="1200" dirty="0"/>
-              <a:t>, 2014.</a:t>
-            </a:r>
-          </a:p>
-          <a:p>
-            <a:r>
-              <a:rPr lang="en-US" sz="1200" dirty="0"/>
-              <a:t>[3] T. Cho. Pattern Classification Methods for Keystroke Analysis. </a:t>
-            </a:r>
-            <a:r>
-              <a:rPr lang="en-US" sz="1200" i="1" dirty="0"/>
-              <a:t>SICE-ICASE</a:t>
-            </a:r>
-            <a:r>
-              <a:rPr lang="en-US" sz="1200" dirty="0"/>
-              <a:t>, 2006.</a:t>
-            </a:r>
-          </a:p>
-          <a:p>
-            <a:r>
-              <a:rPr lang="en-US" sz="1200" dirty="0"/>
-              <a:t>[4] L.J.P. van der </a:t>
-            </a:r>
-            <a:r>
-              <a:rPr lang="en-US" sz="1200" dirty="0" err="1"/>
-              <a:t>Maaten</a:t>
-            </a:r>
-            <a:r>
-              <a:rPr lang="en-US" sz="1200" dirty="0"/>
-              <a:t>. Accelerating t-SNE using Tree-Based Algorithms. </a:t>
-            </a:r>
-            <a:r>
-              <a:rPr lang="en-US" sz="1200" i="1" dirty="0"/>
-              <a:t>Journal of Machine Learning Research</a:t>
-            </a:r>
-            <a:r>
-              <a:rPr lang="en-US" sz="1200" dirty="0"/>
-              <a:t>, 2014.</a:t>
-            </a:r>
-          </a:p>
-          <a:p>
-            <a:r>
-              <a:rPr lang="en-US" sz="1200" dirty="0"/>
-              <a:t>[5] A. </a:t>
-            </a:r>
-            <a:r>
-              <a:rPr lang="en-US" sz="1200" dirty="0" err="1"/>
-              <a:t>Fawzi</a:t>
-            </a:r>
-            <a:r>
-              <a:rPr lang="en-US" sz="1200" dirty="0"/>
-              <a:t>, S. </a:t>
-            </a:r>
-            <a:r>
-              <a:rPr lang="en-US" sz="1200" dirty="0" err="1"/>
-              <a:t>Moosavi-Dezfooli</a:t>
-            </a:r>
-            <a:r>
-              <a:rPr lang="en-US" sz="1200" dirty="0"/>
-              <a:t>, P. </a:t>
-            </a:r>
-            <a:r>
-              <a:rPr lang="en-US" sz="1200" dirty="0" err="1"/>
-              <a:t>Frossard</a:t>
-            </a:r>
-            <a:r>
-              <a:rPr lang="en-US" sz="1200" dirty="0"/>
-              <a:t>. Robustness of classifiers: from adversarial to random noise. </a:t>
-            </a:r>
-            <a:r>
-              <a:rPr lang="en-US" sz="1200" i="1" dirty="0"/>
-              <a:t>NIPS</a:t>
-            </a:r>
-            <a:r>
-              <a:rPr lang="en-US" sz="1200" dirty="0"/>
-              <a:t>, 2016.</a:t>
-            </a:r>
-          </a:p>
-          <a:p>
-            <a:r>
-              <a:rPr lang="en-US" sz="1200" dirty="0"/>
-              <a:t>[6] C. </a:t>
-            </a:r>
-            <a:r>
-              <a:rPr lang="en-US" sz="1200" dirty="0" err="1"/>
-              <a:t>Dwork</a:t>
-            </a:r>
-            <a:r>
-              <a:rPr lang="en-US" sz="1200" dirty="0"/>
-              <a:t>, A. Roth. Differential privacy. </a:t>
-            </a:r>
-            <a:r>
-              <a:rPr lang="en-US" sz="1200" i="1" dirty="0"/>
-              <a:t>Foundations and Trends in Computer Science</a:t>
-            </a:r>
-            <a:r>
-              <a:rPr lang="en-US" sz="1200" dirty="0"/>
-              <a:t>, 2014.</a:t>
-            </a:r>
-          </a:p>
-          <a:p>
-            <a:r>
-              <a:rPr lang="en-US" sz="1200" dirty="0"/>
-              <a:t>[7] Y. Gal, Z. </a:t>
-            </a:r>
-            <a:r>
-              <a:rPr lang="en-US" sz="1200" dirty="0" err="1"/>
-              <a:t>Ghahramani</a:t>
-            </a:r>
-            <a:r>
-              <a:rPr lang="en-US" sz="1200" dirty="0"/>
-              <a:t>. Bayesian Convolutional Neural Networks with Bernoulli Approximate </a:t>
-            </a:r>
-            <a:r>
-              <a:rPr lang="en-US" sz="1200" dirty="0" err="1"/>
-              <a:t>Variational</a:t>
-            </a:r>
-            <a:r>
-              <a:rPr lang="en-US" sz="1200" dirty="0"/>
-              <a:t> Inference. </a:t>
-            </a:r>
-            <a:r>
-              <a:rPr lang="en-US" sz="1200" i="1" dirty="0"/>
-              <a:t>arXiv:1506.02158</a:t>
-            </a:r>
-            <a:r>
-              <a:rPr lang="en-US" sz="1200" dirty="0"/>
-              <a:t>, 2016. </a:t>
-            </a:r>
-          </a:p>
-          <a:p>
-            <a:r>
-              <a:rPr lang="en-US" sz="1200" dirty="0"/>
-              <a:t>[8] P.S. </a:t>
-            </a:r>
-            <a:r>
-              <a:rPr lang="en-US" sz="1200" dirty="0" err="1"/>
-              <a:t>Teh</a:t>
-            </a:r>
-            <a:r>
-              <a:rPr lang="en-US" sz="1200" dirty="0"/>
-              <a:t>, N. Zhang, A.B.J. Teoh, K. Chen. A survey on touch dynamics authentication in mobile devices. </a:t>
-            </a:r>
-            <a:r>
-              <a:rPr lang="en-US" sz="1200" i="1" dirty="0"/>
-              <a:t>Computers &amp; Security</a:t>
-            </a:r>
-            <a:r>
-              <a:rPr lang="en-US" sz="1200" dirty="0"/>
-              <a:t>,</a:t>
-            </a:r>
-            <a:r>
-              <a:rPr lang="en-US" sz="1200" i="1" dirty="0"/>
-              <a:t> </a:t>
-            </a:r>
-            <a:r>
-              <a:rPr lang="en-US" sz="1200" dirty="0"/>
-              <a:t>2016.</a:t>
-            </a:r>
-          </a:p>
-          <a:p>
-            <a:r>
-              <a:rPr lang="en-US" sz="1200" dirty="0"/>
-              <a:t>[9] H. Bae, S. Monti, M. Montano, M.H. Steinberg, T.T. </a:t>
-            </a:r>
-            <a:r>
-              <a:rPr lang="en-US" sz="1200" dirty="0" err="1"/>
-              <a:t>Perls</a:t>
-            </a:r>
-            <a:r>
-              <a:rPr lang="en-US" sz="1200" dirty="0"/>
-              <a:t>, P. </a:t>
-            </a:r>
-            <a:r>
-              <a:rPr lang="en-US" sz="1200" dirty="0" err="1"/>
-              <a:t>Sebastiani</a:t>
-            </a:r>
-            <a:r>
-              <a:rPr lang="en-US" sz="1200" dirty="0"/>
-              <a:t>. Learning Bayesian Networks from Correlated Data. </a:t>
-            </a:r>
-            <a:r>
-              <a:rPr lang="en-US" sz="1200" i="1" dirty="0"/>
-              <a:t>Nature Scientific Reports, </a:t>
-            </a:r>
-            <a:r>
-              <a:rPr lang="en-US" sz="1200" dirty="0"/>
-              <a:t>2016.</a:t>
-            </a:r>
-          </a:p>
-        </p:txBody>
-      </p:sp>
-      <p:sp>
-        <p:nvSpPr>
-          <p:cNvPr id="51" name="TextBox 50"/>
-          <p:cNvSpPr txBox="1"/>
-          <p:nvPr/>
-        </p:nvSpPr>
-        <p:spPr>
-          <a:xfrm>
-            <a:off x="8547099" y="16192501"/>
-            <a:ext cx="1635982" cy="451642"/>
-          </a:xfrm>
-          <a:prstGeom prst="rect">
-            <a:avLst/>
-          </a:prstGeom>
-          <a:noFill/>
-        </p:spPr>
-        <p:txBody>
-          <a:bodyPr wrap="none" lIns="40809" tIns="20405" rIns="40809" bIns="20405" rtlCol="0">
-            <a:spAutoFit/>
-          </a:bodyPr>
-          <a:lstStyle/>
-          <a:p>
-            <a:r>
-              <a:rPr lang="en-US" sz="2667" b="1" dirty="0"/>
-              <a:t>References</a:t>
-            </a:r>
           </a:p>
         </p:txBody>
       </p:sp>

</xml_diff>

<commit_message>
edited poster and upload split pdf
</commit_message>
<xml_diff>
--- a/p-poster.pptx
+++ b/p-poster.pptx
@@ -226,7 +226,7 @@
           <a:p>
             <a:fld id="{FF66CDD7-09B6-4BB3-9069-2B95837CCCB2}" type="datetimeFigureOut">
               <a:rPr lang="en-US" smtClean="0"/>
-              <a:t>12/4/17</a:t>
+              <a:t>12/5/2017</a:t>
             </a:fld>
             <a:endParaRPr lang="en-US"/>
           </a:p>
@@ -1902,7 +1902,7 @@
           <a:p>
             <a:fld id="{985D6BDF-9D0E-4E2B-85B8-D8F4790360C9}" type="datetimeFigureOut">
               <a:rPr lang="en-US" smtClean="0"/>
-              <a:t>12/4/17</a:t>
+              <a:t>12/5/2017</a:t>
             </a:fld>
             <a:endParaRPr lang="en-US" dirty="0"/>
           </a:p>
@@ -2113,7 +2113,7 @@
           <a:p>
             <a:fld id="{985D6BDF-9D0E-4E2B-85B8-D8F4790360C9}" type="datetimeFigureOut">
               <a:rPr lang="en-US" smtClean="0"/>
-              <a:t>12/4/17</a:t>
+              <a:t>12/5/2017</a:t>
             </a:fld>
             <a:endParaRPr lang="en-US" dirty="0"/>
           </a:p>
@@ -3455,7 +3455,7 @@
             <p:spPr bwMode="auto">
               <a:xfrm>
                 <a:off x="9601200" y="3048000"/>
-                <a:ext cx="8229600" cy="12472623"/>
+                <a:ext cx="8229600" cy="12634206"/>
               </a:xfrm>
               <a:prstGeom prst="rect">
                 <a:avLst/>
@@ -3720,7 +3720,7 @@
                       <m:sSubPr>
                         <m:ctrlPr>
                           <a:rPr lang="en-US" sz="1667" b="0" i="1" smtClean="0">
-                            <a:latin typeface="Cambria Math" charset="0"/>
+                            <a:latin typeface="Cambria Math" panose="02040503050406030204" pitchFamily="18" charset="0"/>
                           </a:rPr>
                         </m:ctrlPr>
                       </m:sSubPr>
@@ -3751,7 +3751,7 @@
                       <m:sSubPr>
                         <m:ctrlPr>
                           <a:rPr lang="en-US" sz="1667" b="0" i="1" smtClean="0">
-                            <a:latin typeface="Cambria Math" charset="0"/>
+                            <a:latin typeface="Cambria Math" panose="02040503050406030204" pitchFamily="18" charset="0"/>
                           </a:rPr>
                         </m:ctrlPr>
                       </m:sSubPr>
@@ -3817,7 +3817,7 @@
                         <m:dPr>
                           <m:ctrlPr>
                             <a:rPr lang="en-US" sz="1667" b="0" i="1" smtClean="0">
-                              <a:latin typeface="Cambria Math" charset="0"/>
+                              <a:latin typeface="Cambria Math" panose="02040503050406030204" pitchFamily="18" charset="0"/>
                             </a:rPr>
                           </m:ctrlPr>
                         </m:dPr>
@@ -3867,7 +3867,7 @@
                         <m:fPr>
                           <m:ctrlPr>
                             <a:rPr lang="en-US" sz="1667" b="0" i="1" smtClean="0">
-                              <a:latin typeface="Cambria Math" charset="0"/>
+                              <a:latin typeface="Cambria Math" panose="02040503050406030204" pitchFamily="18" charset="0"/>
                             </a:rPr>
                           </m:ctrlPr>
                         </m:fPr>
@@ -3886,7 +3886,7 @@
                               <m:endChr m:val="|"/>
                               <m:ctrlPr>
                                 <a:rPr lang="en-US" sz="1667" i="1">
-                                  <a:latin typeface="Cambria Math" charset="0"/>
+                                  <a:latin typeface="Cambria Math" panose="02040503050406030204" pitchFamily="18" charset="0"/>
                                 </a:rPr>
                               </m:ctrlPr>
                             </m:dPr>
@@ -3906,7 +3906,7 @@
                             <m:sSupPr>
                               <m:ctrlPr>
                                 <a:rPr lang="en-US" sz="1667" i="1">
-                                  <a:latin typeface="Cambria Math" charset="0"/>
+                                  <a:latin typeface="Cambria Math" panose="02040503050406030204" pitchFamily="18" charset="0"/>
                                 </a:rPr>
                               </m:ctrlPr>
                             </m:sSupPr>
@@ -3915,7 +3915,7 @@
                                 <m:dPr>
                                   <m:ctrlPr>
                                     <a:rPr lang="en-US" sz="1667" i="1">
-                                      <a:latin typeface="Cambria Math" charset="0"/>
+                                      <a:latin typeface="Cambria Math" panose="02040503050406030204" pitchFamily="18" charset="0"/>
                                     </a:rPr>
                                   </m:ctrlPr>
                                 </m:dPr>
@@ -3950,7 +3950,7 @@
                         <m:funcPr>
                           <m:ctrlPr>
                             <a:rPr lang="en-US" sz="1667" b="0" i="1" smtClean="0">
-                              <a:latin typeface="Cambria Math" charset="0"/>
+                              <a:latin typeface="Cambria Math" panose="02040503050406030204" pitchFamily="18" charset="0"/>
                             </a:rPr>
                           </m:ctrlPr>
                         </m:funcPr>
@@ -3970,7 +3970,7 @@
                             <m:dPr>
                               <m:ctrlPr>
                                 <a:rPr lang="en-US" sz="1667" b="0" i="1" smtClean="0">
-                                  <a:latin typeface="Cambria Math" charset="0"/>
+                                  <a:latin typeface="Cambria Math" panose="02040503050406030204" pitchFamily="18" charset="0"/>
                                 </a:rPr>
                               </m:ctrlPr>
                             </m:dPr>
@@ -3985,7 +3985,7 @@
                                 <m:fPr>
                                   <m:ctrlPr>
                                     <a:rPr lang="en-US" sz="1667" b="0" i="1" smtClean="0">
-                                      <a:latin typeface="Cambria Math" charset="0"/>
+                                      <a:latin typeface="Cambria Math" panose="02040503050406030204" pitchFamily="18" charset="0"/>
                                     </a:rPr>
                                   </m:ctrlPr>
                                 </m:fPr>
@@ -4010,7 +4010,7 @@
                                 <m:sSupPr>
                                   <m:ctrlPr>
                                     <a:rPr lang="en-US" sz="1667" b="0" i="1" smtClean="0">
-                                      <a:latin typeface="Cambria Math" charset="0"/>
+                                      <a:latin typeface="Cambria Math" panose="02040503050406030204" pitchFamily="18" charset="0"/>
                                     </a:rPr>
                                   </m:ctrlPr>
                                 </m:sSupPr>
@@ -4019,7 +4019,7 @@
                                     <m:dPr>
                                       <m:ctrlPr>
                                         <a:rPr lang="en-US" sz="1667" b="0" i="1" smtClean="0">
-                                          <a:latin typeface="Cambria Math" charset="0"/>
+                                          <a:latin typeface="Cambria Math" panose="02040503050406030204" pitchFamily="18" charset="0"/>
                                         </a:rPr>
                                       </m:ctrlPr>
                                     </m:dPr>
@@ -4058,7 +4058,7 @@
                                 <m:sSupPr>
                                   <m:ctrlPr>
                                     <a:rPr lang="en-US" sz="1667" b="0" i="1" smtClean="0">
-                                      <a:latin typeface="Cambria Math" charset="0"/>
+                                      <a:latin typeface="Cambria Math" panose="02040503050406030204" pitchFamily="18" charset="0"/>
                                     </a:rPr>
                                   </m:ctrlPr>
                                 </m:sSupPr>
@@ -4086,7 +4086,7 @@
                                 <m:dPr>
                                   <m:ctrlPr>
                                     <a:rPr lang="en-US" sz="1667" b="0" i="1" smtClean="0">
-                                      <a:latin typeface="Cambria Math" charset="0"/>
+                                      <a:latin typeface="Cambria Math" panose="02040503050406030204" pitchFamily="18" charset="0"/>
                                     </a:rPr>
                                   </m:ctrlPr>
                                 </m:dPr>
@@ -4182,13 +4182,7 @@
                   <a:rPr lang="en-US" sz="1667" dirty="0" smtClean="0">
                     <a:latin typeface="Calibri" pitchFamily="34" charset="0"/>
                   </a:rPr>
-                  <a:t>probabilities</a:t>
-                </a:r>
-                <a:r>
-                  <a:rPr lang="en-US" sz="1667" dirty="0" smtClean="0">
-                    <a:latin typeface="Calibri" pitchFamily="34" charset="0"/>
-                  </a:rPr>
-                  <a:t>.</a:t>
+                  <a:t>probabilities.</a:t>
                 </a:r>
               </a:p>
               <a:p>
@@ -4314,7 +4308,7 @@
                         <m:dPr>
                           <m:ctrlPr>
                             <a:rPr lang="en-US" sz="1667" b="0" i="1" smtClean="0">
-                              <a:latin typeface="Cambria Math" charset="0"/>
+                              <a:latin typeface="Cambria Math" panose="02040503050406030204" pitchFamily="18" charset="0"/>
                             </a:rPr>
                           </m:ctrlPr>
                         </m:dPr>
@@ -4370,7 +4364,7 @@
                           <m:chr m:val="∏"/>
                           <m:ctrlPr>
                             <a:rPr lang="en-US" sz="1667" b="0" i="1" smtClean="0">
-                              <a:latin typeface="Cambria Math" charset="0"/>
+                              <a:latin typeface="Cambria Math" panose="02040503050406030204" pitchFamily="18" charset="0"/>
                             </a:rPr>
                           </m:ctrlPr>
                         </m:naryPr>
@@ -4413,7 +4407,7 @@
                             <m:dPr>
                               <m:ctrlPr>
                                 <a:rPr lang="en-US" sz="1667" b="0" i="1" smtClean="0">
-                                  <a:latin typeface="Cambria Math" charset="0"/>
+                                  <a:latin typeface="Cambria Math" panose="02040503050406030204" pitchFamily="18" charset="0"/>
                                 </a:rPr>
                               </m:ctrlPr>
                             </m:dPr>
@@ -4422,7 +4416,7 @@
                                 <m:sSubPr>
                                   <m:ctrlPr>
                                     <a:rPr lang="en-US" sz="1667" b="0" i="1" smtClean="0">
-                                      <a:latin typeface="Cambria Math" charset="0"/>
+                                      <a:latin typeface="Cambria Math" panose="02040503050406030204" pitchFamily="18" charset="0"/>
                                     </a:rPr>
                                   </m:ctrlPr>
                                 </m:sSubPr>
@@ -4449,7 +4443,7 @@
                                 <m:sSubPr>
                                   <m:ctrlPr>
                                     <a:rPr lang="en-US" sz="1667" b="0" i="1" smtClean="0">
-                                      <a:latin typeface="Cambria Math" charset="0"/>
+                                      <a:latin typeface="Cambria Math" panose="02040503050406030204" pitchFamily="18" charset="0"/>
                                     </a:rPr>
                                   </m:ctrlPr>
                                 </m:sSubPr>
@@ -4480,7 +4474,7 @@
                                 <m:sSubPr>
                                   <m:ctrlPr>
                                     <a:rPr lang="en-US" sz="1667" b="0" i="1" smtClean="0">
-                                      <a:latin typeface="Cambria Math" charset="0"/>
+                                      <a:latin typeface="Cambria Math" panose="02040503050406030204" pitchFamily="18" charset="0"/>
                                     </a:rPr>
                                   </m:ctrlPr>
                                 </m:sSubPr>
@@ -4513,7 +4507,7 @@
                             <m:dPr>
                               <m:ctrlPr>
                                 <a:rPr lang="en-US" sz="1667" b="0" i="1" smtClean="0">
-                                  <a:latin typeface="Cambria Math" charset="0"/>
+                                  <a:latin typeface="Cambria Math" panose="02040503050406030204" pitchFamily="18" charset="0"/>
                                 </a:rPr>
                               </m:ctrlPr>
                             </m:dPr>
@@ -4522,7 +4516,7 @@
                                 <m:sSubPr>
                                   <m:ctrlPr>
                                     <a:rPr lang="en-US" sz="1667" b="0" i="1" smtClean="0">
-                                      <a:latin typeface="Cambria Math" charset="0"/>
+                                      <a:latin typeface="Cambria Math" panose="02040503050406030204" pitchFamily="18" charset="0"/>
                                     </a:rPr>
                                   </m:ctrlPr>
                                 </m:sSubPr>
@@ -4555,7 +4549,7 @@
                                 <m:dPr>
                                   <m:ctrlPr>
                                     <a:rPr lang="en-US" sz="1667" b="0" i="1" smtClean="0">
-                                      <a:latin typeface="Cambria Math" charset="0"/>
+                                      <a:latin typeface="Cambria Math" panose="02040503050406030204" pitchFamily="18" charset="0"/>
                                     </a:rPr>
                                   </m:ctrlPr>
                                 </m:dPr>
@@ -4564,7 +4558,7 @@
                                     <m:sSubPr>
                                       <m:ctrlPr>
                                         <a:rPr lang="en-US" sz="1667" b="0" i="1" smtClean="0">
-                                          <a:latin typeface="Cambria Math" charset="0"/>
+                                          <a:latin typeface="Cambria Math" panose="02040503050406030204" pitchFamily="18" charset="0"/>
                                         </a:rPr>
                                       </m:ctrlPr>
                                     </m:sSubPr>
@@ -4597,7 +4591,7 @@
                                 <m:sSubPr>
                                   <m:ctrlPr>
                                     <a:rPr lang="en-US" sz="1667" b="0" i="1" smtClean="0">
-                                      <a:latin typeface="Cambria Math" charset="0"/>
+                                      <a:latin typeface="Cambria Math" panose="02040503050406030204" pitchFamily="18" charset="0"/>
                                     </a:rPr>
                                   </m:ctrlPr>
                                 </m:sSubPr>
@@ -4628,7 +4622,7 @@
                                 <m:sSubPr>
                                   <m:ctrlPr>
                                     <a:rPr lang="en-US" sz="1667" b="0" i="1" smtClean="0">
-                                      <a:latin typeface="Cambria Math" charset="0"/>
+                                      <a:latin typeface="Cambria Math" panose="02040503050406030204" pitchFamily="18" charset="0"/>
                                     </a:rPr>
                                   </m:ctrlPr>
                                 </m:sSubPr>
@@ -4659,7 +4653,7 @@
                                 <m:sSubPr>
                                   <m:ctrlPr>
                                     <a:rPr lang="en-US" sz="1667" b="0" i="1" smtClean="0">
-                                      <a:latin typeface="Cambria Math" charset="0"/>
+                                      <a:latin typeface="Cambria Math" panose="02040503050406030204" pitchFamily="18" charset="0"/>
                                     </a:rPr>
                                   </m:ctrlPr>
                                 </m:sSubPr>
@@ -4690,7 +4684,7 @@
                                 <m:sSubPr>
                                   <m:ctrlPr>
                                     <a:rPr lang="en-US" sz="1667" b="0" i="1" smtClean="0">
-                                      <a:latin typeface="Cambria Math" charset="0"/>
+                                      <a:latin typeface="Cambria Math" panose="02040503050406030204" pitchFamily="18" charset="0"/>
                                     </a:rPr>
                                   </m:ctrlPr>
                                 </m:sSubPr>
@@ -4723,7 +4717,7 @@
                             <m:sSubPr>
                               <m:ctrlPr>
                                 <a:rPr lang="en-US" sz="1667" b="0" i="1" smtClean="0">
-                                  <a:latin typeface="Cambria Math" charset="0"/>
+                                  <a:latin typeface="Cambria Math" panose="02040503050406030204" pitchFamily="18" charset="0"/>
                                 </a:rPr>
                               </m:ctrlPr>
                             </m:sSubPr>
@@ -4783,20 +4777,23 @@
                   <a:rPr lang="en-US" sz="1667" dirty="0">
                     <a:latin typeface="Calibri" pitchFamily="34" charset="0"/>
                   </a:rPr>
-                  <a:t> data back into realistic value </a:t>
+                  <a:t> data back into realistic </a:t>
                 </a:r>
                 <a:r>
                   <a:rPr lang="en-US" sz="1667" dirty="0" smtClean="0">
                     <a:latin typeface="Calibri" pitchFamily="34" charset="0"/>
                   </a:rPr>
-                  <a:t>		         vectors </a:t>
+                  <a:t>value 		         vectors for humanistic biometric imitation. </a:t>
                 </a:r>
-                <a:r>
-                  <a:rPr lang="en-US" sz="1667" dirty="0">
-                    <a:latin typeface="Calibri" pitchFamily="34" charset="0"/>
-                  </a:rPr>
-                  <a:t>for humanistic biometric imitation. </a:t>
-                </a:r>
+              </a:p>
+              <a:p>
+                <a:pPr marL="285750" indent="-285750" eaLnBrk="1" hangingPunct="1">
+                  <a:buFont typeface="Arial" panose="020B0604020202020204" pitchFamily="34" charset="0"/>
+                  <a:buChar char="•"/>
+                </a:pPr>
+                <a:endParaRPr lang="en-US" sz="1667" dirty="0" smtClean="0">
+                  <a:latin typeface="Calibri" pitchFamily="34" charset="0"/>
+                </a:endParaRPr>
               </a:p>
               <a:p>
                 <a:pPr marL="285750" indent="-285750" eaLnBrk="1" hangingPunct="1">
@@ -4915,7 +4912,7 @@
             <p:spPr bwMode="auto">
               <a:xfrm>
                 <a:off x="9601200" y="3048000"/>
-                <a:ext cx="8229600" cy="12472623"/>
+                <a:ext cx="8229600" cy="12634206"/>
               </a:xfrm>
               <a:prstGeom prst="rect">
                 <a:avLst/>
@@ -5001,8 +4998,38 @@
                   </a:schemeClr>
                 </a:solidFill>
               </a:rPr>
-              <a:t>Methods and models</a:t>
-            </a:r>
+              <a:t>Methods and </a:t>
+            </a:r>
+            <a:r>
+              <a:rPr lang="en-US" sz="2667" b="1" dirty="0">
+                <a:solidFill>
+                  <a:schemeClr val="accent3">
+                    <a:lumMod val="20000"/>
+                    <a:lumOff val="80000"/>
+                  </a:schemeClr>
+                </a:solidFill>
+              </a:rPr>
+              <a:t>M</a:t>
+            </a:r>
+            <a:r>
+              <a:rPr lang="en-US" sz="2667" b="1" dirty="0" smtClean="0">
+                <a:solidFill>
+                  <a:schemeClr val="accent3">
+                    <a:lumMod val="20000"/>
+                    <a:lumOff val="80000"/>
+                  </a:schemeClr>
+                </a:solidFill>
+              </a:rPr>
+              <a:t>odels</a:t>
+            </a:r>
+            <a:endParaRPr lang="en-US" sz="2667" b="1" dirty="0">
+              <a:solidFill>
+                <a:schemeClr val="accent3">
+                  <a:lumMod val="20000"/>
+                  <a:lumOff val="80000"/>
+                </a:schemeClr>
+              </a:solidFill>
+            </a:endParaRPr>
           </a:p>
         </p:txBody>
       </p:sp>
@@ -5645,7 +5672,18 @@
                   </a:schemeClr>
                 </a:solidFill>
               </a:rPr>
-              <a:t> and Classifiers</a:t>
+              <a:t>and </a:t>
+            </a:r>
+            <a:r>
+              <a:rPr lang="en-US" sz="2667" b="1" dirty="0" smtClean="0">
+                <a:solidFill>
+                  <a:schemeClr val="accent3">
+                    <a:lumMod val="20000"/>
+                    <a:lumOff val="80000"/>
+                  </a:schemeClr>
+                </a:solidFill>
+              </a:rPr>
+              <a:t>Classifiers</a:t>
             </a:r>
             <a:endParaRPr lang="en-US" sz="2667" b="1" dirty="0">
               <a:solidFill>
@@ -6029,7 +6067,7 @@
           <p:cNvPr id="1026" name="Picture 2" descr="K-mean center attack success rate.png">
             <a:extLst>
               <a:ext uri="{FF2B5EF4-FFF2-40B4-BE49-F238E27FC236}">
-                <a16:creationId xmlns:a16="http://schemas.microsoft.com/office/drawing/2014/main" xmlns="" id="{255D51AD-28C3-4E52-B2FD-0A20AD600D10}"/>
+                <a16:creationId xmlns="" xmlns:a16="http://schemas.microsoft.com/office/drawing/2014/main" id="{255D51AD-28C3-4E52-B2FD-0A20AD600D10}"/>
               </a:ext>
             </a:extLst>
           </p:cNvPr>
@@ -6076,7 +6114,7 @@
           <p:cNvPr id="1028" name="Picture 4" descr="K cluster Gaussian attack success rate.png">
             <a:extLst>
               <a:ext uri="{FF2B5EF4-FFF2-40B4-BE49-F238E27FC236}">
-                <a16:creationId xmlns:a16="http://schemas.microsoft.com/office/drawing/2014/main" xmlns="" id="{DF6C01D2-3451-4044-A5E5-DBF262E84660}"/>
+                <a16:creationId xmlns="" xmlns:a16="http://schemas.microsoft.com/office/drawing/2014/main" id="{DF6C01D2-3451-4044-A5E5-DBF262E84660}"/>
               </a:ext>
             </a:extLst>
           </p:cNvPr>
@@ -6140,7 +6178,7 @@
         </p:blipFill>
         <p:spPr>
           <a:xfrm>
-            <a:off x="9827730" y="11963400"/>
+            <a:off x="9867529" y="12075647"/>
             <a:ext cx="3895420" cy="3470386"/>
           </a:xfrm>
           <a:prstGeom prst="rect">
@@ -6219,7 +6257,7 @@
           <p:cNvPr id="45" name="Text Box 180">
             <a:extLst>
               <a:ext uri="{FF2B5EF4-FFF2-40B4-BE49-F238E27FC236}">
-                <a16:creationId xmlns:a16="http://schemas.microsoft.com/office/drawing/2014/main" xmlns="" id="{B5035870-ADA2-4595-8A86-153C0D15B18F}"/>
+                <a16:creationId xmlns="" xmlns:a16="http://schemas.microsoft.com/office/drawing/2014/main" id="{B5035870-ADA2-4595-8A86-153C0D15B18F}"/>
               </a:ext>
             </a:extLst>
           </p:cNvPr>
@@ -6378,13 +6416,25 @@
               <a:rPr lang="en-US" sz="1600" b="1" dirty="0">
                 <a:latin typeface="Calibri" pitchFamily="34" charset="0"/>
               </a:rPr>
-              <a:t>Figures 2-3.</a:t>
+              <a:t>Figures </a:t>
+            </a:r>
+            <a:r>
+              <a:rPr lang="en-US" sz="1600" b="1" dirty="0" smtClean="0">
+                <a:latin typeface="Calibri" pitchFamily="34" charset="0"/>
+              </a:rPr>
+              <a:t>4-5.</a:t>
+            </a:r>
+            <a:r>
+              <a:rPr lang="en-US" sz="1600" dirty="0" smtClean="0">
+                <a:latin typeface="Calibri" pitchFamily="34" charset="0"/>
+              </a:rPr>
+              <a:t> </a:t>
             </a:r>
             <a:r>
               <a:rPr lang="en-US" sz="1600" dirty="0">
                 <a:latin typeface="Calibri" pitchFamily="34" charset="0"/>
               </a:rPr>
-              <a:t> Adversarial success rate charts for different </a:t>
+              <a:t>Adversarial success rate charts for different </a:t>
             </a:r>
             <a:r>
               <a:rPr lang="en-US" sz="1600" i="1" dirty="0">
@@ -6418,7 +6468,7 @@
           <p:cNvPr id="47" name="Text Box 180">
             <a:extLst>
               <a:ext uri="{FF2B5EF4-FFF2-40B4-BE49-F238E27FC236}">
-                <a16:creationId xmlns:a16="http://schemas.microsoft.com/office/drawing/2014/main" xmlns="" id="{B68CCE3C-71F5-47D9-BF5F-CCAFD9C77C0F}"/>
+                <a16:creationId xmlns="" xmlns:a16="http://schemas.microsoft.com/office/drawing/2014/main" id="{B68CCE3C-71F5-47D9-BF5F-CCAFD9C77C0F}"/>
               </a:ext>
             </a:extLst>
           </p:cNvPr>
@@ -6605,433 +6655,6 @@
       </p:sp>
       <p:sp>
         <p:nvSpPr>
-          <p:cNvPr id="12" name="Text Box 191"/>
-          <p:cNvSpPr txBox="1">
-            <a:spLocks noChangeArrowheads="1"/>
-          </p:cNvSpPr>
-          <p:nvPr/>
-        </p:nvSpPr>
-        <p:spPr bwMode="auto">
-          <a:xfrm>
-            <a:off x="18288000" y="3048001"/>
-            <a:ext cx="8229600" cy="8374257"/>
-          </a:xfrm>
-          <a:prstGeom prst="rect">
-            <a:avLst/>
-          </a:prstGeom>
-          <a:noFill/>
-          <a:ln w="12700">
-            <a:solidFill>
-              <a:schemeClr val="accent1">
-                <a:lumMod val="75000"/>
-              </a:schemeClr>
-            </a:solidFill>
-          </a:ln>
-          <a:effectLst/>
-        </p:spPr>
-        <p:txBody>
-          <a:bodyPr lIns="81618" tIns="81618" rIns="81618" bIns="81618">
-            <a:spAutoFit/>
-          </a:bodyPr>
-          <a:lstStyle>
-            <a:lvl1pPr eaLnBrk="0" hangingPunct="0">
-              <a:defRPr sz="2200">
-                <a:solidFill>
-                  <a:schemeClr val="tx1"/>
-                </a:solidFill>
-                <a:latin typeface="Arial" charset="0"/>
-              </a:defRPr>
-            </a:lvl1pPr>
-            <a:lvl2pPr marL="742950" indent="-285750" eaLnBrk="0" hangingPunct="0">
-              <a:defRPr sz="2200">
-                <a:solidFill>
-                  <a:schemeClr val="tx1"/>
-                </a:solidFill>
-                <a:latin typeface="Arial" charset="0"/>
-              </a:defRPr>
-            </a:lvl2pPr>
-            <a:lvl3pPr marL="1143000" indent="-228600" eaLnBrk="0" hangingPunct="0">
-              <a:defRPr sz="2200">
-                <a:solidFill>
-                  <a:schemeClr val="tx1"/>
-                </a:solidFill>
-                <a:latin typeface="Arial" charset="0"/>
-              </a:defRPr>
-            </a:lvl3pPr>
-            <a:lvl4pPr marL="1600200" indent="-228600" eaLnBrk="0" hangingPunct="0">
-              <a:defRPr sz="2200">
-                <a:solidFill>
-                  <a:schemeClr val="tx1"/>
-                </a:solidFill>
-                <a:latin typeface="Arial" charset="0"/>
-              </a:defRPr>
-            </a:lvl4pPr>
-            <a:lvl5pPr marL="2057400" indent="-228600" eaLnBrk="0" hangingPunct="0">
-              <a:defRPr sz="2200">
-                <a:solidFill>
-                  <a:schemeClr val="tx1"/>
-                </a:solidFill>
-                <a:latin typeface="Arial" charset="0"/>
-              </a:defRPr>
-            </a:lvl5pPr>
-            <a:lvl6pPr marL="2514600" indent="-228600" eaLnBrk="0" fontAlgn="base" hangingPunct="0">
-              <a:spcBef>
-                <a:spcPct val="0"/>
-              </a:spcBef>
-              <a:spcAft>
-                <a:spcPct val="0"/>
-              </a:spcAft>
-              <a:defRPr sz="2200">
-                <a:solidFill>
-                  <a:schemeClr val="tx1"/>
-                </a:solidFill>
-                <a:latin typeface="Arial" charset="0"/>
-              </a:defRPr>
-            </a:lvl6pPr>
-            <a:lvl7pPr marL="2971800" indent="-228600" eaLnBrk="0" fontAlgn="base" hangingPunct="0">
-              <a:spcBef>
-                <a:spcPct val="0"/>
-              </a:spcBef>
-              <a:spcAft>
-                <a:spcPct val="0"/>
-              </a:spcAft>
-              <a:defRPr sz="2200">
-                <a:solidFill>
-                  <a:schemeClr val="tx1"/>
-                </a:solidFill>
-                <a:latin typeface="Arial" charset="0"/>
-              </a:defRPr>
-            </a:lvl7pPr>
-            <a:lvl8pPr marL="3429000" indent="-228600" eaLnBrk="0" fontAlgn="base" hangingPunct="0">
-              <a:spcBef>
-                <a:spcPct val="0"/>
-              </a:spcBef>
-              <a:spcAft>
-                <a:spcPct val="0"/>
-              </a:spcAft>
-              <a:defRPr sz="2200">
-                <a:solidFill>
-                  <a:schemeClr val="tx1"/>
-                </a:solidFill>
-                <a:latin typeface="Arial" charset="0"/>
-              </a:defRPr>
-            </a:lvl8pPr>
-            <a:lvl9pPr marL="3886200" indent="-228600" eaLnBrk="0" fontAlgn="base" hangingPunct="0">
-              <a:spcBef>
-                <a:spcPct val="0"/>
-              </a:spcBef>
-              <a:spcAft>
-                <a:spcPct val="0"/>
-              </a:spcAft>
-              <a:defRPr sz="2200">
-                <a:solidFill>
-                  <a:schemeClr val="tx1"/>
-                </a:solidFill>
-                <a:latin typeface="Arial" charset="0"/>
-              </a:defRPr>
-            </a:lvl9pPr>
-          </a:lstStyle>
-          <a:p>
-            <a:pPr marL="285750" indent="-285750" eaLnBrk="1" hangingPunct="1">
-              <a:buFont typeface="Arial" panose="020B0604020202020204" pitchFamily="34" charset="0"/>
-              <a:buChar char="•"/>
-            </a:pPr>
-            <a:r>
-              <a:rPr lang="en-US" sz="1667" dirty="0">
-                <a:latin typeface="Calibri" pitchFamily="34" charset="0"/>
-              </a:rPr>
-              <a:t>Intuitively, our </a:t>
-            </a:r>
-            <a:r>
-              <a:rPr lang="en-US" sz="1667" i="1" dirty="0">
-                <a:latin typeface="Calibri" pitchFamily="34" charset="0"/>
-              </a:rPr>
-              <a:t>k</a:t>
-            </a:r>
-            <a:r>
-              <a:rPr lang="en-US" sz="1667" dirty="0">
-                <a:latin typeface="Calibri" pitchFamily="34" charset="0"/>
-              </a:rPr>
-              <a:t>-means attacks performed best with higher </a:t>
-            </a:r>
-            <a:r>
-              <a:rPr lang="en-US" sz="1667" i="1" dirty="0">
-                <a:latin typeface="Calibri" pitchFamily="34" charset="0"/>
-              </a:rPr>
-              <a:t>k </a:t>
-            </a:r>
-            <a:r>
-              <a:rPr lang="en-US" sz="1667" dirty="0">
-                <a:latin typeface="Calibri" pitchFamily="34" charset="0"/>
-              </a:rPr>
-              <a:t>(until 32-64 range with cluster method), reaching </a:t>
-            </a:r>
-            <a:r>
-              <a:rPr lang="en-US" sz="1667" b="1" dirty="0">
-                <a:latin typeface="Calibri" pitchFamily="34" charset="0"/>
-              </a:rPr>
-              <a:t>77% success rate </a:t>
-            </a:r>
-            <a:r>
-              <a:rPr lang="en-US" sz="1667" dirty="0">
-                <a:latin typeface="Calibri" pitchFamily="34" charset="0"/>
-              </a:rPr>
-              <a:t>(undetected spoof) against a 5-layer deep neural net. Also intuitively, using our multivariate Gaussian distribution model to introduce humanistic perturbations and augment the number of generated adversarial examples, we achieve a lower maximum </a:t>
-            </a:r>
-            <a:r>
-              <a:rPr lang="en-US" sz="1667" b="1" dirty="0">
-                <a:latin typeface="Calibri" pitchFamily="34" charset="0"/>
-              </a:rPr>
-              <a:t>67% success rate</a:t>
-            </a:r>
-            <a:r>
-              <a:rPr lang="en-US" sz="1667" dirty="0">
-                <a:latin typeface="Calibri" pitchFamily="34" charset="0"/>
-              </a:rPr>
-              <a:t>. </a:t>
-            </a:r>
-          </a:p>
-          <a:p>
-            <a:pPr marL="285750" indent="-285750" eaLnBrk="1" hangingPunct="1">
-              <a:buFont typeface="Arial" panose="020B0604020202020204" pitchFamily="34" charset="0"/>
-              <a:buChar char="•"/>
-            </a:pPr>
-            <a:r>
-              <a:rPr lang="en-US" sz="1667" dirty="0">
-                <a:latin typeface="Calibri" pitchFamily="34" charset="0"/>
-              </a:rPr>
-              <a:t>Secondarily, and less intuitively, based on the adversarial success rate metric of model robustness, we find that </a:t>
-            </a:r>
-            <a:r>
-              <a:rPr lang="en-US" sz="1667" b="1" dirty="0">
-                <a:latin typeface="Calibri" pitchFamily="34" charset="0"/>
-              </a:rPr>
-              <a:t>logistic regression</a:t>
-            </a:r>
-            <a:r>
-              <a:rPr lang="en-US" sz="1667" dirty="0">
-                <a:latin typeface="Calibri" pitchFamily="34" charset="0"/>
-              </a:rPr>
-              <a:t> is most resilient to our attacks (maximum success rate 20%), compared to the artificial neural net and deep neural nets.</a:t>
-            </a:r>
-          </a:p>
-          <a:p>
-            <a:pPr marL="285750" indent="-285750" eaLnBrk="1" hangingPunct="1">
-              <a:buFont typeface="Arial" panose="020B0604020202020204" pitchFamily="34" charset="0"/>
-              <a:buChar char="•"/>
-            </a:pPr>
-            <a:endParaRPr lang="en-US" sz="1667" dirty="0">
-              <a:latin typeface="Calibri" pitchFamily="34" charset="0"/>
-            </a:endParaRPr>
-          </a:p>
-          <a:p>
-            <a:pPr marL="285750" indent="-285750" eaLnBrk="1" hangingPunct="1">
-              <a:buFont typeface="Arial" panose="020B0604020202020204" pitchFamily="34" charset="0"/>
-              <a:buChar char="•"/>
-            </a:pPr>
-            <a:endParaRPr lang="en-US" sz="1667" dirty="0">
-              <a:latin typeface="Calibri" pitchFamily="34" charset="0"/>
-            </a:endParaRPr>
-          </a:p>
-          <a:p>
-            <a:pPr marL="285750" indent="-285750" eaLnBrk="1" hangingPunct="1">
-              <a:buFont typeface="Arial" panose="020B0604020202020204" pitchFamily="34" charset="0"/>
-              <a:buChar char="•"/>
-            </a:pPr>
-            <a:endParaRPr lang="en-US" sz="1667" dirty="0">
-              <a:latin typeface="Calibri" pitchFamily="34" charset="0"/>
-            </a:endParaRPr>
-          </a:p>
-          <a:p>
-            <a:pPr marL="285750" indent="-285750" eaLnBrk="1" hangingPunct="1">
-              <a:buFont typeface="Arial" panose="020B0604020202020204" pitchFamily="34" charset="0"/>
-              <a:buChar char="•"/>
-            </a:pPr>
-            <a:endParaRPr lang="en-US" sz="1667" dirty="0">
-              <a:latin typeface="Calibri" pitchFamily="34" charset="0"/>
-            </a:endParaRPr>
-          </a:p>
-          <a:p>
-            <a:pPr marL="285750" indent="-285750" eaLnBrk="1" hangingPunct="1">
-              <a:buFont typeface="Arial" panose="020B0604020202020204" pitchFamily="34" charset="0"/>
-              <a:buChar char="•"/>
-            </a:pPr>
-            <a:endParaRPr lang="en-US" sz="1667" dirty="0">
-              <a:latin typeface="Calibri" pitchFamily="34" charset="0"/>
-            </a:endParaRPr>
-          </a:p>
-          <a:p>
-            <a:pPr marL="285750" indent="-285750" eaLnBrk="1" hangingPunct="1">
-              <a:buFont typeface="Arial" panose="020B0604020202020204" pitchFamily="34" charset="0"/>
-              <a:buChar char="•"/>
-            </a:pPr>
-            <a:endParaRPr lang="en-US" sz="1667" dirty="0">
-              <a:latin typeface="Calibri" pitchFamily="34" charset="0"/>
-            </a:endParaRPr>
-          </a:p>
-          <a:p>
-            <a:pPr marL="285750" indent="-285750" eaLnBrk="1" hangingPunct="1">
-              <a:buFont typeface="Arial" panose="020B0604020202020204" pitchFamily="34" charset="0"/>
-              <a:buChar char="•"/>
-            </a:pPr>
-            <a:endParaRPr lang="en-US" sz="1667" dirty="0">
-              <a:latin typeface="Calibri" pitchFamily="34" charset="0"/>
-            </a:endParaRPr>
-          </a:p>
-          <a:p>
-            <a:pPr marL="285750" indent="-285750" eaLnBrk="1" hangingPunct="1">
-              <a:buFont typeface="Arial" panose="020B0604020202020204" pitchFamily="34" charset="0"/>
-              <a:buChar char="•"/>
-            </a:pPr>
-            <a:endParaRPr lang="en-US" sz="1667" dirty="0">
-              <a:latin typeface="Calibri" pitchFamily="34" charset="0"/>
-            </a:endParaRPr>
-          </a:p>
-          <a:p>
-            <a:pPr marL="285750" indent="-285750" eaLnBrk="1" hangingPunct="1">
-              <a:buFont typeface="Arial" panose="020B0604020202020204" pitchFamily="34" charset="0"/>
-              <a:buChar char="•"/>
-            </a:pPr>
-            <a:endParaRPr lang="en-US" sz="1667" dirty="0">
-              <a:latin typeface="Calibri" pitchFamily="34" charset="0"/>
-            </a:endParaRPr>
-          </a:p>
-          <a:p>
-            <a:pPr marL="285750" indent="-285750" eaLnBrk="1" hangingPunct="1">
-              <a:buFont typeface="Arial" panose="020B0604020202020204" pitchFamily="34" charset="0"/>
-              <a:buChar char="•"/>
-            </a:pPr>
-            <a:endParaRPr lang="en-US" sz="1667" dirty="0">
-              <a:latin typeface="Calibri" pitchFamily="34" charset="0"/>
-            </a:endParaRPr>
-          </a:p>
-          <a:p>
-            <a:pPr marL="285750" indent="-285750" eaLnBrk="1" hangingPunct="1">
-              <a:buFont typeface="Arial" panose="020B0604020202020204" pitchFamily="34" charset="0"/>
-              <a:buChar char="•"/>
-            </a:pPr>
-            <a:endParaRPr lang="en-US" sz="1667" dirty="0">
-              <a:latin typeface="Calibri" pitchFamily="34" charset="0"/>
-            </a:endParaRPr>
-          </a:p>
-          <a:p>
-            <a:pPr marL="285750" indent="-285750" eaLnBrk="1" hangingPunct="1">
-              <a:buFont typeface="Arial" panose="020B0604020202020204" pitchFamily="34" charset="0"/>
-              <a:buChar char="•"/>
-            </a:pPr>
-            <a:endParaRPr lang="en-US" sz="1667" dirty="0">
-              <a:latin typeface="Calibri" pitchFamily="34" charset="0"/>
-            </a:endParaRPr>
-          </a:p>
-          <a:p>
-            <a:pPr marL="285750" indent="-285750" eaLnBrk="1" hangingPunct="1">
-              <a:buFont typeface="Arial" panose="020B0604020202020204" pitchFamily="34" charset="0"/>
-              <a:buChar char="•"/>
-            </a:pPr>
-            <a:endParaRPr lang="en-US" sz="1667" dirty="0">
-              <a:latin typeface="Calibri" pitchFamily="34" charset="0"/>
-            </a:endParaRPr>
-          </a:p>
-          <a:p>
-            <a:pPr marL="285750" indent="-285750" eaLnBrk="1" hangingPunct="1">
-              <a:buFont typeface="Arial" panose="020B0604020202020204" pitchFamily="34" charset="0"/>
-              <a:buChar char="•"/>
-            </a:pPr>
-            <a:endParaRPr lang="en-US" sz="1667" dirty="0">
-              <a:latin typeface="Calibri" pitchFamily="34" charset="0"/>
-            </a:endParaRPr>
-          </a:p>
-          <a:p>
-            <a:pPr marL="285750" indent="-285750" eaLnBrk="1" hangingPunct="1">
-              <a:buFont typeface="Arial" panose="020B0604020202020204" pitchFamily="34" charset="0"/>
-              <a:buChar char="•"/>
-            </a:pPr>
-            <a:endParaRPr lang="en-US" sz="1667" dirty="0">
-              <a:latin typeface="Calibri" pitchFamily="34" charset="0"/>
-            </a:endParaRPr>
-          </a:p>
-          <a:p>
-            <a:pPr marL="285750" indent="-285750" eaLnBrk="1" hangingPunct="1">
-              <a:buFont typeface="Arial" panose="020B0604020202020204" pitchFamily="34" charset="0"/>
-              <a:buChar char="•"/>
-            </a:pPr>
-            <a:endParaRPr lang="en-US" sz="1667" dirty="0">
-              <a:latin typeface="Calibri" pitchFamily="34" charset="0"/>
-            </a:endParaRPr>
-          </a:p>
-          <a:p>
-            <a:pPr marL="285750" indent="-285750" eaLnBrk="1" hangingPunct="1">
-              <a:buFont typeface="Arial" panose="020B0604020202020204" pitchFamily="34" charset="0"/>
-              <a:buChar char="•"/>
-            </a:pPr>
-            <a:endParaRPr lang="en-US" sz="1667" dirty="0">
-              <a:latin typeface="Calibri" pitchFamily="34" charset="0"/>
-            </a:endParaRPr>
-          </a:p>
-          <a:p>
-            <a:pPr marL="285750" indent="-285750" eaLnBrk="1" hangingPunct="1">
-              <a:buFont typeface="Arial" panose="020B0604020202020204" pitchFamily="34" charset="0"/>
-              <a:buChar char="•"/>
-            </a:pPr>
-            <a:endParaRPr lang="en-US" sz="1667" dirty="0">
-              <a:latin typeface="Calibri" pitchFamily="34" charset="0"/>
-            </a:endParaRPr>
-          </a:p>
-          <a:p>
-            <a:pPr marL="285750" indent="-285750" eaLnBrk="1" hangingPunct="1">
-              <a:buFont typeface="Arial" panose="020B0604020202020204" pitchFamily="34" charset="0"/>
-              <a:buChar char="•"/>
-            </a:pPr>
-            <a:endParaRPr lang="en-US" sz="1667" dirty="0">
-              <a:latin typeface="Calibri" pitchFamily="34" charset="0"/>
-            </a:endParaRPr>
-          </a:p>
-          <a:p>
-            <a:pPr marL="285750" indent="-285750" eaLnBrk="1" hangingPunct="1">
-              <a:buFont typeface="Arial" panose="020B0604020202020204" pitchFamily="34" charset="0"/>
-              <a:buChar char="•"/>
-            </a:pPr>
-            <a:endParaRPr lang="en-US" sz="1667" dirty="0">
-              <a:latin typeface="Calibri" pitchFamily="34" charset="0"/>
-            </a:endParaRPr>
-          </a:p>
-          <a:p>
-            <a:pPr marL="285750" indent="-285750" eaLnBrk="1" hangingPunct="1">
-              <a:buFont typeface="Arial" panose="020B0604020202020204" pitchFamily="34" charset="0"/>
-              <a:buChar char="•"/>
-            </a:pPr>
-            <a:endParaRPr lang="en-US" sz="1667" dirty="0">
-              <a:latin typeface="Calibri" pitchFamily="34" charset="0"/>
-            </a:endParaRPr>
-          </a:p>
-          <a:p>
-            <a:pPr marL="285750" indent="-285750" eaLnBrk="1" hangingPunct="1">
-              <a:buFont typeface="Arial" panose="020B0604020202020204" pitchFamily="34" charset="0"/>
-              <a:buChar char="•"/>
-            </a:pPr>
-            <a:endParaRPr lang="en-US" sz="1667" dirty="0">
-              <a:latin typeface="Calibri" pitchFamily="34" charset="0"/>
-            </a:endParaRPr>
-          </a:p>
-          <a:p>
-            <a:pPr eaLnBrk="1" hangingPunct="1"/>
-            <a:endParaRPr lang="en-US" sz="1667" dirty="0">
-              <a:latin typeface="Calibri" pitchFamily="34" charset="0"/>
-            </a:endParaRPr>
-          </a:p>
-          <a:p>
-            <a:pPr eaLnBrk="1" hangingPunct="1"/>
-            <a:r>
-              <a:rPr lang="en-US" sz="1667" dirty="0">
-                <a:latin typeface="Calibri" pitchFamily="34" charset="0"/>
-              </a:rPr>
-              <a:t> </a:t>
-            </a:r>
-          </a:p>
-        </p:txBody>
-      </p:sp>
-      <p:sp>
-        <p:nvSpPr>
           <p:cNvPr id="48" name="TextBox 47"/>
           <p:cNvSpPr txBox="1"/>
           <p:nvPr/>
@@ -7315,7 +6938,7 @@
           <p:cNvPr id="46" name="Content Placeholder 114" descr="Sample table with 4 columns, 7 rows." title="Sample Table">
             <a:extLst>
               <a:ext uri="{FF2B5EF4-FFF2-40B4-BE49-F238E27FC236}">
-                <a16:creationId xmlns:a16="http://schemas.microsoft.com/office/drawing/2014/main" xmlns="" id="{60CBE95C-D1AC-4C3F-BFC0-D21F55A094E3}"/>
+                <a16:creationId xmlns="" xmlns:a16="http://schemas.microsoft.com/office/drawing/2014/main" id="{60CBE95C-D1AC-4C3F-BFC0-D21F55A094E3}"/>
               </a:ext>
             </a:extLst>
           </p:cNvPr>
@@ -7325,14 +6948,14 @@
           <p:nvPr>
             <p:extLst>
               <p:ext uri="{D42A27DB-BD31-4B8C-83A1-F6EECF244321}">
-                <p14:modId xmlns:p14="http://schemas.microsoft.com/office/powerpoint/2010/main" val="485296792"/>
+                <p14:modId xmlns:p14="http://schemas.microsoft.com/office/powerpoint/2010/main" val="412037718"/>
               </p:ext>
             </p:extLst>
           </p:nvPr>
         </p:nvGraphicFramePr>
         <p:xfrm>
-          <a:off x="18287998" y="9492851"/>
-          <a:ext cx="8229602" cy="1656383"/>
+          <a:off x="18440402" y="9492851"/>
+          <a:ext cx="7924799" cy="1656383"/>
         </p:xfrm>
         <a:graphic>
           <a:graphicData uri="http://schemas.openxmlformats.org/drawingml/2006/table">
@@ -7341,45 +6964,45 @@
                 <a:tableStyleId>{F5AB1C69-6EDB-4FF4-983F-18BD219EF322}</a:tableStyleId>
               </a:tblPr>
               <a:tblGrid>
-                <a:gridCol w="2313822">
+                <a:gridCol w="2228124">
                   <a:extLst>
                     <a:ext uri="{9D8B030D-6E8A-4147-A177-3AD203B41FA5}">
-                      <a16:colId xmlns:a16="http://schemas.microsoft.com/office/drawing/2014/main" xmlns="" val="20000"/>
+                      <a16:colId xmlns="" xmlns:a16="http://schemas.microsoft.com/office/drawing/2014/main" val="20000"/>
                     </a:ext>
                   </a:extLst>
                 </a:gridCol>
-                <a:gridCol w="1183156">
+                <a:gridCol w="1139335">
                   <a:extLst>
                     <a:ext uri="{9D8B030D-6E8A-4147-A177-3AD203B41FA5}">
-                      <a16:colId xmlns:a16="http://schemas.microsoft.com/office/drawing/2014/main" xmlns="" val="20001"/>
+                      <a16:colId xmlns="" xmlns:a16="http://schemas.microsoft.com/office/drawing/2014/main" val="20001"/>
                     </a:ext>
                   </a:extLst>
                 </a:gridCol>
-                <a:gridCol w="1183156">
+                <a:gridCol w="1139335">
                   <a:extLst>
                     <a:ext uri="{9D8B030D-6E8A-4147-A177-3AD203B41FA5}">
-                      <a16:colId xmlns:a16="http://schemas.microsoft.com/office/drawing/2014/main" xmlns="" val="20002"/>
+                      <a16:colId xmlns="" xmlns:a16="http://schemas.microsoft.com/office/drawing/2014/main" val="20002"/>
                     </a:ext>
                   </a:extLst>
                 </a:gridCol>
-                <a:gridCol w="1183156">
+                <a:gridCol w="1139335">
                   <a:extLst>
                     <a:ext uri="{9D8B030D-6E8A-4147-A177-3AD203B41FA5}">
-                      <a16:colId xmlns:a16="http://schemas.microsoft.com/office/drawing/2014/main" xmlns="" val="20003"/>
+                      <a16:colId xmlns="" xmlns:a16="http://schemas.microsoft.com/office/drawing/2014/main" val="20003"/>
                     </a:ext>
                   </a:extLst>
                 </a:gridCol>
-                <a:gridCol w="1183156">
+                <a:gridCol w="1139335">
                   <a:extLst>
                     <a:ext uri="{9D8B030D-6E8A-4147-A177-3AD203B41FA5}">
-                      <a16:colId xmlns:a16="http://schemas.microsoft.com/office/drawing/2014/main" xmlns="" val="886844001"/>
+                      <a16:colId xmlns="" xmlns:a16="http://schemas.microsoft.com/office/drawing/2014/main" val="886844001"/>
                     </a:ext>
                   </a:extLst>
                 </a:gridCol>
-                <a:gridCol w="1183156">
+                <a:gridCol w="1139335">
                   <a:extLst>
                     <a:ext uri="{9D8B030D-6E8A-4147-A177-3AD203B41FA5}">
-                      <a16:colId xmlns:a16="http://schemas.microsoft.com/office/drawing/2014/main" xmlns="" val="1355434412"/>
+                      <a16:colId xmlns="" xmlns:a16="http://schemas.microsoft.com/office/drawing/2014/main" val="1355434412"/>
                     </a:ext>
                   </a:extLst>
                 </a:gridCol>
@@ -7549,7 +7172,7 @@
                 </a:tc>
                 <a:extLst>
                   <a:ext uri="{0D108BD9-81ED-4DB2-BD59-A6C34878D82A}">
-                    <a16:rowId xmlns:a16="http://schemas.microsoft.com/office/drawing/2014/main" xmlns="" val="10000"/>
+                    <a16:rowId xmlns="" xmlns:a16="http://schemas.microsoft.com/office/drawing/2014/main" val="10000"/>
                   </a:ext>
                 </a:extLst>
               </a:tr>
@@ -7889,7 +7512,7 @@
                 </a:tc>
                 <a:extLst>
                   <a:ext uri="{0D108BD9-81ED-4DB2-BD59-A6C34878D82A}">
-                    <a16:rowId xmlns:a16="http://schemas.microsoft.com/office/drawing/2014/main" xmlns="" val="10001"/>
+                    <a16:rowId xmlns="" xmlns:a16="http://schemas.microsoft.com/office/drawing/2014/main" val="10001"/>
                   </a:ext>
                 </a:extLst>
               </a:tr>
@@ -8229,7 +7852,7 @@
                 </a:tc>
                 <a:extLst>
                   <a:ext uri="{0D108BD9-81ED-4DB2-BD59-A6C34878D82A}">
-                    <a16:rowId xmlns:a16="http://schemas.microsoft.com/office/drawing/2014/main" xmlns="" val="10002"/>
+                    <a16:rowId xmlns="" xmlns:a16="http://schemas.microsoft.com/office/drawing/2014/main" val="10002"/>
                   </a:ext>
                 </a:extLst>
               </a:tr>
@@ -8309,28 +7932,28 @@
                   <a:gridCol w="731936">
                     <a:extLst>
                       <a:ext uri="{9D8B030D-6E8A-4147-A177-3AD203B41FA5}">
-                        <a16:colId xmlns="" xmlns:a16="http://schemas.microsoft.com/office/drawing/2014/main" val="20000"/>
+                        <a16:colId xmlns:a16="http://schemas.microsoft.com/office/drawing/2014/main" xmlns="" val="20000"/>
                       </a:ext>
                     </a:extLst>
                   </a:gridCol>
                   <a:gridCol w="600609">
                     <a:extLst>
                       <a:ext uri="{9D8B030D-6E8A-4147-A177-3AD203B41FA5}">
-                        <a16:colId xmlns="" xmlns:a16="http://schemas.microsoft.com/office/drawing/2014/main" val="20001"/>
+                        <a16:colId xmlns:a16="http://schemas.microsoft.com/office/drawing/2014/main" xmlns="" val="20001"/>
                       </a:ext>
                     </a:extLst>
                   </a:gridCol>
                   <a:gridCol w="501348">
                     <a:extLst>
                       <a:ext uri="{9D8B030D-6E8A-4147-A177-3AD203B41FA5}">
-                        <a16:colId xmlns="" xmlns:a16="http://schemas.microsoft.com/office/drawing/2014/main" val="20002"/>
+                        <a16:colId xmlns:a16="http://schemas.microsoft.com/office/drawing/2014/main" xmlns="" val="20002"/>
                       </a:ext>
                     </a:extLst>
                   </a:gridCol>
                   <a:gridCol w="1222015">
                     <a:extLst>
                       <a:ext uri="{9D8B030D-6E8A-4147-A177-3AD203B41FA5}">
-                        <a16:colId xmlns="" xmlns:a16="http://schemas.microsoft.com/office/drawing/2014/main" val="20003"/>
+                        <a16:colId xmlns:a16="http://schemas.microsoft.com/office/drawing/2014/main" xmlns="" val="20003"/>
                       </a:ext>
                     </a:extLst>
                   </a:gridCol>
@@ -8420,7 +8043,7 @@
                   </a:tc>
                   <a:extLst>
                     <a:ext uri="{0D108BD9-81ED-4DB2-BD59-A6C34878D82A}">
-                      <a16:rowId xmlns="" xmlns:a16="http://schemas.microsoft.com/office/drawing/2014/main" val="10000"/>
+                      <a16:rowId xmlns:a16="http://schemas.microsoft.com/office/drawing/2014/main" xmlns="" val="10000"/>
                     </a:ext>
                   </a:extLst>
                 </a:tr>
@@ -8485,7 +8108,7 @@
                   </a:tc>
                   <a:extLst>
                     <a:ext uri="{0D108BD9-81ED-4DB2-BD59-A6C34878D82A}">
-                      <a16:rowId xmlns="" xmlns:a16="http://schemas.microsoft.com/office/drawing/2014/main" val="10001"/>
+                      <a16:rowId xmlns:a16="http://schemas.microsoft.com/office/drawing/2014/main" xmlns="" val="10001"/>
                     </a:ext>
                   </a:extLst>
                 </a:tr>
@@ -8548,7 +8171,7 @@
                   </a:tc>
                   <a:extLst>
                     <a:ext uri="{0D108BD9-81ED-4DB2-BD59-A6C34878D82A}">
-                      <a16:rowId xmlns="" xmlns:a16="http://schemas.microsoft.com/office/drawing/2014/main" val="10002"/>
+                      <a16:rowId xmlns:a16="http://schemas.microsoft.com/office/drawing/2014/main" xmlns="" val="10002"/>
                     </a:ext>
                   </a:extLst>
                 </a:tr>
@@ -8611,7 +8234,7 @@
                   </a:tc>
                   <a:extLst>
                     <a:ext uri="{0D108BD9-81ED-4DB2-BD59-A6C34878D82A}">
-                      <a16:rowId xmlns="" xmlns:a16="http://schemas.microsoft.com/office/drawing/2014/main" val="10003"/>
+                      <a16:rowId xmlns:a16="http://schemas.microsoft.com/office/drawing/2014/main" xmlns="" val="10003"/>
                     </a:ext>
                   </a:extLst>
                 </a:tr>
@@ -9639,6 +9262,433 @@
           </a:p>
         </p:txBody>
       </p:sp>
+      <p:sp>
+        <p:nvSpPr>
+          <p:cNvPr id="12" name="Text Box 191"/>
+          <p:cNvSpPr txBox="1">
+            <a:spLocks noChangeArrowheads="1"/>
+          </p:cNvSpPr>
+          <p:nvPr/>
+        </p:nvSpPr>
+        <p:spPr bwMode="auto">
+          <a:xfrm>
+            <a:off x="18288000" y="3048001"/>
+            <a:ext cx="8229600" cy="8374257"/>
+          </a:xfrm>
+          <a:prstGeom prst="rect">
+            <a:avLst/>
+          </a:prstGeom>
+          <a:noFill/>
+          <a:ln w="12700">
+            <a:solidFill>
+              <a:schemeClr val="accent1">
+                <a:lumMod val="75000"/>
+              </a:schemeClr>
+            </a:solidFill>
+          </a:ln>
+          <a:effectLst/>
+        </p:spPr>
+        <p:txBody>
+          <a:bodyPr lIns="81618" tIns="81618" rIns="81618" bIns="81618">
+            <a:spAutoFit/>
+          </a:bodyPr>
+          <a:lstStyle>
+            <a:lvl1pPr eaLnBrk="0" hangingPunct="0">
+              <a:defRPr sz="2200">
+                <a:solidFill>
+                  <a:schemeClr val="tx1"/>
+                </a:solidFill>
+                <a:latin typeface="Arial" charset="0"/>
+              </a:defRPr>
+            </a:lvl1pPr>
+            <a:lvl2pPr marL="742950" indent="-285750" eaLnBrk="0" hangingPunct="0">
+              <a:defRPr sz="2200">
+                <a:solidFill>
+                  <a:schemeClr val="tx1"/>
+                </a:solidFill>
+                <a:latin typeface="Arial" charset="0"/>
+              </a:defRPr>
+            </a:lvl2pPr>
+            <a:lvl3pPr marL="1143000" indent="-228600" eaLnBrk="0" hangingPunct="0">
+              <a:defRPr sz="2200">
+                <a:solidFill>
+                  <a:schemeClr val="tx1"/>
+                </a:solidFill>
+                <a:latin typeface="Arial" charset="0"/>
+              </a:defRPr>
+            </a:lvl3pPr>
+            <a:lvl4pPr marL="1600200" indent="-228600" eaLnBrk="0" hangingPunct="0">
+              <a:defRPr sz="2200">
+                <a:solidFill>
+                  <a:schemeClr val="tx1"/>
+                </a:solidFill>
+                <a:latin typeface="Arial" charset="0"/>
+              </a:defRPr>
+            </a:lvl4pPr>
+            <a:lvl5pPr marL="2057400" indent="-228600" eaLnBrk="0" hangingPunct="0">
+              <a:defRPr sz="2200">
+                <a:solidFill>
+                  <a:schemeClr val="tx1"/>
+                </a:solidFill>
+                <a:latin typeface="Arial" charset="0"/>
+              </a:defRPr>
+            </a:lvl5pPr>
+            <a:lvl6pPr marL="2514600" indent="-228600" eaLnBrk="0" fontAlgn="base" hangingPunct="0">
+              <a:spcBef>
+                <a:spcPct val="0"/>
+              </a:spcBef>
+              <a:spcAft>
+                <a:spcPct val="0"/>
+              </a:spcAft>
+              <a:defRPr sz="2200">
+                <a:solidFill>
+                  <a:schemeClr val="tx1"/>
+                </a:solidFill>
+                <a:latin typeface="Arial" charset="0"/>
+              </a:defRPr>
+            </a:lvl6pPr>
+            <a:lvl7pPr marL="2971800" indent="-228600" eaLnBrk="0" fontAlgn="base" hangingPunct="0">
+              <a:spcBef>
+                <a:spcPct val="0"/>
+              </a:spcBef>
+              <a:spcAft>
+                <a:spcPct val="0"/>
+              </a:spcAft>
+              <a:defRPr sz="2200">
+                <a:solidFill>
+                  <a:schemeClr val="tx1"/>
+                </a:solidFill>
+                <a:latin typeface="Arial" charset="0"/>
+              </a:defRPr>
+            </a:lvl7pPr>
+            <a:lvl8pPr marL="3429000" indent="-228600" eaLnBrk="0" fontAlgn="base" hangingPunct="0">
+              <a:spcBef>
+                <a:spcPct val="0"/>
+              </a:spcBef>
+              <a:spcAft>
+                <a:spcPct val="0"/>
+              </a:spcAft>
+              <a:defRPr sz="2200">
+                <a:solidFill>
+                  <a:schemeClr val="tx1"/>
+                </a:solidFill>
+                <a:latin typeface="Arial" charset="0"/>
+              </a:defRPr>
+            </a:lvl8pPr>
+            <a:lvl9pPr marL="3886200" indent="-228600" eaLnBrk="0" fontAlgn="base" hangingPunct="0">
+              <a:spcBef>
+                <a:spcPct val="0"/>
+              </a:spcBef>
+              <a:spcAft>
+                <a:spcPct val="0"/>
+              </a:spcAft>
+              <a:defRPr sz="2200">
+                <a:solidFill>
+                  <a:schemeClr val="tx1"/>
+                </a:solidFill>
+                <a:latin typeface="Arial" charset="0"/>
+              </a:defRPr>
+            </a:lvl9pPr>
+          </a:lstStyle>
+          <a:p>
+            <a:pPr marL="285750" indent="-285750" eaLnBrk="1" hangingPunct="1">
+              <a:buFont typeface="Arial" panose="020B0604020202020204" pitchFamily="34" charset="0"/>
+              <a:buChar char="•"/>
+            </a:pPr>
+            <a:r>
+              <a:rPr lang="en-US" sz="1667" dirty="0">
+                <a:latin typeface="Calibri" pitchFamily="34" charset="0"/>
+              </a:rPr>
+              <a:t>Intuitively, our </a:t>
+            </a:r>
+            <a:r>
+              <a:rPr lang="en-US" sz="1667" i="1" dirty="0">
+                <a:latin typeface="Calibri" pitchFamily="34" charset="0"/>
+              </a:rPr>
+              <a:t>k</a:t>
+            </a:r>
+            <a:r>
+              <a:rPr lang="en-US" sz="1667" dirty="0">
+                <a:latin typeface="Calibri" pitchFamily="34" charset="0"/>
+              </a:rPr>
+              <a:t>-means attacks performed best with higher </a:t>
+            </a:r>
+            <a:r>
+              <a:rPr lang="en-US" sz="1667" i="1" dirty="0">
+                <a:latin typeface="Calibri" pitchFamily="34" charset="0"/>
+              </a:rPr>
+              <a:t>k </a:t>
+            </a:r>
+            <a:r>
+              <a:rPr lang="en-US" sz="1667" dirty="0">
+                <a:latin typeface="Calibri" pitchFamily="34" charset="0"/>
+              </a:rPr>
+              <a:t>(until 32-64 range with cluster method), reaching </a:t>
+            </a:r>
+            <a:r>
+              <a:rPr lang="en-US" sz="1667" b="1" dirty="0">
+                <a:latin typeface="Calibri" pitchFamily="34" charset="0"/>
+              </a:rPr>
+              <a:t>77% success rate </a:t>
+            </a:r>
+            <a:r>
+              <a:rPr lang="en-US" sz="1667" dirty="0">
+                <a:latin typeface="Calibri" pitchFamily="34" charset="0"/>
+              </a:rPr>
+              <a:t>(undetected spoof) against a 5-layer deep neural net. Also intuitively, using our multivariate Gaussian distribution model to introduce humanistic perturbations and augment the number of generated adversarial examples, we achieve a lower maximum </a:t>
+            </a:r>
+            <a:r>
+              <a:rPr lang="en-US" sz="1667" b="1" dirty="0">
+                <a:latin typeface="Calibri" pitchFamily="34" charset="0"/>
+              </a:rPr>
+              <a:t>67% success rate</a:t>
+            </a:r>
+            <a:r>
+              <a:rPr lang="en-US" sz="1667" dirty="0">
+                <a:latin typeface="Calibri" pitchFamily="34" charset="0"/>
+              </a:rPr>
+              <a:t>. </a:t>
+            </a:r>
+          </a:p>
+          <a:p>
+            <a:pPr marL="285750" indent="-285750" eaLnBrk="1" hangingPunct="1">
+              <a:buFont typeface="Arial" panose="020B0604020202020204" pitchFamily="34" charset="0"/>
+              <a:buChar char="•"/>
+            </a:pPr>
+            <a:r>
+              <a:rPr lang="en-US" sz="1667" dirty="0">
+                <a:latin typeface="Calibri" pitchFamily="34" charset="0"/>
+              </a:rPr>
+              <a:t>Secondarily, and less intuitively, based on the adversarial success rate metric of model robustness, we find that </a:t>
+            </a:r>
+            <a:r>
+              <a:rPr lang="en-US" sz="1667" b="1" dirty="0">
+                <a:latin typeface="Calibri" pitchFamily="34" charset="0"/>
+              </a:rPr>
+              <a:t>logistic regression</a:t>
+            </a:r>
+            <a:r>
+              <a:rPr lang="en-US" sz="1667" dirty="0">
+                <a:latin typeface="Calibri" pitchFamily="34" charset="0"/>
+              </a:rPr>
+              <a:t> is most resilient to our attacks (maximum success rate 20%), compared to the artificial neural net and deep neural nets.</a:t>
+            </a:r>
+          </a:p>
+          <a:p>
+            <a:pPr marL="285750" indent="-285750" eaLnBrk="1" hangingPunct="1">
+              <a:buFont typeface="Arial" panose="020B0604020202020204" pitchFamily="34" charset="0"/>
+              <a:buChar char="•"/>
+            </a:pPr>
+            <a:endParaRPr lang="en-US" sz="1667" dirty="0">
+              <a:latin typeface="Calibri" pitchFamily="34" charset="0"/>
+            </a:endParaRPr>
+          </a:p>
+          <a:p>
+            <a:pPr marL="285750" indent="-285750" eaLnBrk="1" hangingPunct="1">
+              <a:buFont typeface="Arial" panose="020B0604020202020204" pitchFamily="34" charset="0"/>
+              <a:buChar char="•"/>
+            </a:pPr>
+            <a:endParaRPr lang="en-US" sz="1667" dirty="0">
+              <a:latin typeface="Calibri" pitchFamily="34" charset="0"/>
+            </a:endParaRPr>
+          </a:p>
+          <a:p>
+            <a:pPr marL="285750" indent="-285750" eaLnBrk="1" hangingPunct="1">
+              <a:buFont typeface="Arial" panose="020B0604020202020204" pitchFamily="34" charset="0"/>
+              <a:buChar char="•"/>
+            </a:pPr>
+            <a:endParaRPr lang="en-US" sz="1667" dirty="0">
+              <a:latin typeface="Calibri" pitchFamily="34" charset="0"/>
+            </a:endParaRPr>
+          </a:p>
+          <a:p>
+            <a:pPr marL="285750" indent="-285750" eaLnBrk="1" hangingPunct="1">
+              <a:buFont typeface="Arial" panose="020B0604020202020204" pitchFamily="34" charset="0"/>
+              <a:buChar char="•"/>
+            </a:pPr>
+            <a:endParaRPr lang="en-US" sz="1667" dirty="0">
+              <a:latin typeface="Calibri" pitchFamily="34" charset="0"/>
+            </a:endParaRPr>
+          </a:p>
+          <a:p>
+            <a:pPr marL="285750" indent="-285750" eaLnBrk="1" hangingPunct="1">
+              <a:buFont typeface="Arial" panose="020B0604020202020204" pitchFamily="34" charset="0"/>
+              <a:buChar char="•"/>
+            </a:pPr>
+            <a:endParaRPr lang="en-US" sz="1667" dirty="0">
+              <a:latin typeface="Calibri" pitchFamily="34" charset="0"/>
+            </a:endParaRPr>
+          </a:p>
+          <a:p>
+            <a:pPr marL="285750" indent="-285750" eaLnBrk="1" hangingPunct="1">
+              <a:buFont typeface="Arial" panose="020B0604020202020204" pitchFamily="34" charset="0"/>
+              <a:buChar char="•"/>
+            </a:pPr>
+            <a:endParaRPr lang="en-US" sz="1667" dirty="0">
+              <a:latin typeface="Calibri" pitchFamily="34" charset="0"/>
+            </a:endParaRPr>
+          </a:p>
+          <a:p>
+            <a:pPr marL="285750" indent="-285750" eaLnBrk="1" hangingPunct="1">
+              <a:buFont typeface="Arial" panose="020B0604020202020204" pitchFamily="34" charset="0"/>
+              <a:buChar char="•"/>
+            </a:pPr>
+            <a:endParaRPr lang="en-US" sz="1667" dirty="0">
+              <a:latin typeface="Calibri" pitchFamily="34" charset="0"/>
+            </a:endParaRPr>
+          </a:p>
+          <a:p>
+            <a:pPr marL="285750" indent="-285750" eaLnBrk="1" hangingPunct="1">
+              <a:buFont typeface="Arial" panose="020B0604020202020204" pitchFamily="34" charset="0"/>
+              <a:buChar char="•"/>
+            </a:pPr>
+            <a:endParaRPr lang="en-US" sz="1667" dirty="0">
+              <a:latin typeface="Calibri" pitchFamily="34" charset="0"/>
+            </a:endParaRPr>
+          </a:p>
+          <a:p>
+            <a:pPr marL="285750" indent="-285750" eaLnBrk="1" hangingPunct="1">
+              <a:buFont typeface="Arial" panose="020B0604020202020204" pitchFamily="34" charset="0"/>
+              <a:buChar char="•"/>
+            </a:pPr>
+            <a:endParaRPr lang="en-US" sz="1667" dirty="0">
+              <a:latin typeface="Calibri" pitchFamily="34" charset="0"/>
+            </a:endParaRPr>
+          </a:p>
+          <a:p>
+            <a:pPr marL="285750" indent="-285750" eaLnBrk="1" hangingPunct="1">
+              <a:buFont typeface="Arial" panose="020B0604020202020204" pitchFamily="34" charset="0"/>
+              <a:buChar char="•"/>
+            </a:pPr>
+            <a:endParaRPr lang="en-US" sz="1667" dirty="0">
+              <a:latin typeface="Calibri" pitchFamily="34" charset="0"/>
+            </a:endParaRPr>
+          </a:p>
+          <a:p>
+            <a:pPr marL="285750" indent="-285750" eaLnBrk="1" hangingPunct="1">
+              <a:buFont typeface="Arial" panose="020B0604020202020204" pitchFamily="34" charset="0"/>
+              <a:buChar char="•"/>
+            </a:pPr>
+            <a:endParaRPr lang="en-US" sz="1667" dirty="0">
+              <a:latin typeface="Calibri" pitchFamily="34" charset="0"/>
+            </a:endParaRPr>
+          </a:p>
+          <a:p>
+            <a:pPr marL="285750" indent="-285750" eaLnBrk="1" hangingPunct="1">
+              <a:buFont typeface="Arial" panose="020B0604020202020204" pitchFamily="34" charset="0"/>
+              <a:buChar char="•"/>
+            </a:pPr>
+            <a:endParaRPr lang="en-US" sz="1667" dirty="0">
+              <a:latin typeface="Calibri" pitchFamily="34" charset="0"/>
+            </a:endParaRPr>
+          </a:p>
+          <a:p>
+            <a:pPr marL="285750" indent="-285750" eaLnBrk="1" hangingPunct="1">
+              <a:buFont typeface="Arial" panose="020B0604020202020204" pitchFamily="34" charset="0"/>
+              <a:buChar char="•"/>
+            </a:pPr>
+            <a:endParaRPr lang="en-US" sz="1667" dirty="0">
+              <a:latin typeface="Calibri" pitchFamily="34" charset="0"/>
+            </a:endParaRPr>
+          </a:p>
+          <a:p>
+            <a:pPr marL="285750" indent="-285750" eaLnBrk="1" hangingPunct="1">
+              <a:buFont typeface="Arial" panose="020B0604020202020204" pitchFamily="34" charset="0"/>
+              <a:buChar char="•"/>
+            </a:pPr>
+            <a:endParaRPr lang="en-US" sz="1667" dirty="0">
+              <a:latin typeface="Calibri" pitchFamily="34" charset="0"/>
+            </a:endParaRPr>
+          </a:p>
+          <a:p>
+            <a:pPr marL="285750" indent="-285750" eaLnBrk="1" hangingPunct="1">
+              <a:buFont typeface="Arial" panose="020B0604020202020204" pitchFamily="34" charset="0"/>
+              <a:buChar char="•"/>
+            </a:pPr>
+            <a:endParaRPr lang="en-US" sz="1667" dirty="0">
+              <a:latin typeface="Calibri" pitchFamily="34" charset="0"/>
+            </a:endParaRPr>
+          </a:p>
+          <a:p>
+            <a:pPr marL="285750" indent="-285750" eaLnBrk="1" hangingPunct="1">
+              <a:buFont typeface="Arial" panose="020B0604020202020204" pitchFamily="34" charset="0"/>
+              <a:buChar char="•"/>
+            </a:pPr>
+            <a:endParaRPr lang="en-US" sz="1667" dirty="0">
+              <a:latin typeface="Calibri" pitchFamily="34" charset="0"/>
+            </a:endParaRPr>
+          </a:p>
+          <a:p>
+            <a:pPr marL="285750" indent="-285750" eaLnBrk="1" hangingPunct="1">
+              <a:buFont typeface="Arial" panose="020B0604020202020204" pitchFamily="34" charset="0"/>
+              <a:buChar char="•"/>
+            </a:pPr>
+            <a:endParaRPr lang="en-US" sz="1667" dirty="0">
+              <a:latin typeface="Calibri" pitchFamily="34" charset="0"/>
+            </a:endParaRPr>
+          </a:p>
+          <a:p>
+            <a:pPr marL="285750" indent="-285750" eaLnBrk="1" hangingPunct="1">
+              <a:buFont typeface="Arial" panose="020B0604020202020204" pitchFamily="34" charset="0"/>
+              <a:buChar char="•"/>
+            </a:pPr>
+            <a:endParaRPr lang="en-US" sz="1667" dirty="0">
+              <a:latin typeface="Calibri" pitchFamily="34" charset="0"/>
+            </a:endParaRPr>
+          </a:p>
+          <a:p>
+            <a:pPr marL="285750" indent="-285750" eaLnBrk="1" hangingPunct="1">
+              <a:buFont typeface="Arial" panose="020B0604020202020204" pitchFamily="34" charset="0"/>
+              <a:buChar char="•"/>
+            </a:pPr>
+            <a:endParaRPr lang="en-US" sz="1667" dirty="0">
+              <a:latin typeface="Calibri" pitchFamily="34" charset="0"/>
+            </a:endParaRPr>
+          </a:p>
+          <a:p>
+            <a:pPr marL="285750" indent="-285750" eaLnBrk="1" hangingPunct="1">
+              <a:buFont typeface="Arial" panose="020B0604020202020204" pitchFamily="34" charset="0"/>
+              <a:buChar char="•"/>
+            </a:pPr>
+            <a:endParaRPr lang="en-US" sz="1667" dirty="0">
+              <a:latin typeface="Calibri" pitchFamily="34" charset="0"/>
+            </a:endParaRPr>
+          </a:p>
+          <a:p>
+            <a:pPr marL="285750" indent="-285750" eaLnBrk="1" hangingPunct="1">
+              <a:buFont typeface="Arial" panose="020B0604020202020204" pitchFamily="34" charset="0"/>
+              <a:buChar char="•"/>
+            </a:pPr>
+            <a:endParaRPr lang="en-US" sz="1667" dirty="0">
+              <a:latin typeface="Calibri" pitchFamily="34" charset="0"/>
+            </a:endParaRPr>
+          </a:p>
+          <a:p>
+            <a:pPr marL="285750" indent="-285750" eaLnBrk="1" hangingPunct="1">
+              <a:buFont typeface="Arial" panose="020B0604020202020204" pitchFamily="34" charset="0"/>
+              <a:buChar char="•"/>
+            </a:pPr>
+            <a:endParaRPr lang="en-US" sz="1667" dirty="0">
+              <a:latin typeface="Calibri" pitchFamily="34" charset="0"/>
+            </a:endParaRPr>
+          </a:p>
+          <a:p>
+            <a:pPr eaLnBrk="1" hangingPunct="1"/>
+            <a:endParaRPr lang="en-US" sz="1667" dirty="0">
+              <a:latin typeface="Calibri" pitchFamily="34" charset="0"/>
+            </a:endParaRPr>
+          </a:p>
+          <a:p>
+            <a:pPr eaLnBrk="1" hangingPunct="1"/>
+            <a:r>
+              <a:rPr lang="en-US" sz="1667" dirty="0">
+                <a:latin typeface="Calibri" pitchFamily="34" charset="0"/>
+              </a:rPr>
+              <a:t> </a:t>
+            </a:r>
+          </a:p>
+        </p:txBody>
+      </p:sp>
     </p:spTree>
     <p:extLst>
       <p:ext uri="{BB962C8B-B14F-4D97-AF65-F5344CB8AC3E}">

</xml_diff>